<commit_message>
altera nome da faculdade
</commit_message>
<xml_diff>
--- a/documentacao/G5_Apresentacao1sem2014.pptx
+++ b/documentacao/G5_Apresentacao1sem2014.pptx
@@ -229,7 +229,7 @@
             <a:fld id="{387DC7E4-63C1-42C9-AC56-2D8DD4349572}" type="datetimeFigureOut">
               <a:rPr lang="pt-BR" smtClean="0"/>
               <a:pPr/>
-              <a:t>4/2/2014</a:t>
+              <a:t>13/03/2014</a:t>
             </a:fld>
             <a:endParaRPr lang="pt-BR"/>
           </a:p>
@@ -305,7 +305,7 @@
     </p:spTree>
     <p:extLst>
       <p:ext uri="{BB962C8B-B14F-4D97-AF65-F5344CB8AC3E}">
-        <p14:creationId xmlns:p14="http://schemas.microsoft.com/office/powerpoint/2010/main" xmlns="" val="3690707936"/>
+        <p14:creationId xmlns="" xmlns:p14="http://schemas.microsoft.com/office/powerpoint/2010/main" val="3690707936"/>
       </p:ext>
     </p:extLst>
   </p:cSld>
@@ -619,7 +619,7 @@
     </p:spTree>
     <p:extLst>
       <p:ext uri="{BB962C8B-B14F-4D97-AF65-F5344CB8AC3E}">
-        <p14:creationId xmlns:p14="http://schemas.microsoft.com/office/powerpoint/2010/main" xmlns="" val="753547333"/>
+        <p14:creationId xmlns="" xmlns:p14="http://schemas.microsoft.com/office/powerpoint/2010/main" val="753547333"/>
       </p:ext>
     </p:extLst>
   </p:cSld>
@@ -5013,12 +5013,9 @@
           <a:p>
             <a:r>
               <a:rPr lang="pt-BR" dirty="0" err="1" smtClean="0"/>
-              <a:t>Veris</a:t>
-            </a:r>
-            <a:r>
-              <a:rPr lang="pt-BR" dirty="0" smtClean="0"/>
-              <a:t> Faculdades</a:t>
-            </a:r>
+              <a:t>Metrocamp</a:t>
+            </a:r>
+            <a:endParaRPr lang="pt-BR" dirty="0" smtClean="0"/>
           </a:p>
           <a:p>
             <a:r>
@@ -5281,7 +5278,6 @@
               <a:rPr lang="pt-BR" dirty="0" smtClean="0"/>
               <a:t>Legível</a:t>
             </a:r>
-            <a:endParaRPr lang="pt-BR" dirty="0" smtClean="0"/>
           </a:p>
           <a:p>
             <a:endParaRPr lang="pt-BR" dirty="0"/>

</xml_diff>

<commit_message>
Atualizado documento de Apresentação
</commit_message>
<xml_diff>
--- a/documentacao/G5_Apresentacao1sem2014.pptx
+++ b/documentacao/G5_Apresentacao1sem2014.pptx
@@ -5,16 +5,17 @@
     <p:sldMasterId id="2147483657" r:id="rId1"/>
   </p:sldMasterIdLst>
   <p:notesMasterIdLst>
-    <p:notesMasterId r:id="rId6"/>
+    <p:notesMasterId r:id="rId7"/>
   </p:notesMasterIdLst>
   <p:handoutMasterIdLst>
-    <p:handoutMasterId r:id="rId7"/>
+    <p:handoutMasterId r:id="rId8"/>
   </p:handoutMasterIdLst>
   <p:sldIdLst>
     <p:sldId id="256" r:id="rId2"/>
     <p:sldId id="258" r:id="rId3"/>
     <p:sldId id="259" r:id="rId4"/>
-    <p:sldId id="263" r:id="rId5"/>
+    <p:sldId id="264" r:id="rId5"/>
+    <p:sldId id="263" r:id="rId6"/>
   </p:sldIdLst>
   <p:sldSz cx="9144000" cy="6858000" type="screen4x3"/>
   <p:notesSz cx="7010400" cy="9296400"/>
@@ -229,7 +230,7 @@
             <a:fld id="{387DC7E4-63C1-42C9-AC56-2D8DD4349572}" type="datetimeFigureOut">
               <a:rPr lang="pt-BR" smtClean="0"/>
               <a:pPr/>
-              <a:t>13/03/2014</a:t>
+              <a:t>24/03/2014</a:t>
             </a:fld>
             <a:endParaRPr lang="pt-BR"/>
           </a:p>
@@ -5391,9 +5392,9 @@
       </p:grpSpPr>
       <p:sp>
         <p:nvSpPr>
-          <p:cNvPr id="19458" name="Rectangle 2"/>
-          <p:cNvSpPr>
-            <a:spLocks noGrp="1" noChangeArrowheads="1"/>
+          <p:cNvPr id="2" name="Título 1"/>
+          <p:cNvSpPr>
+            <a:spLocks noGrp="1"/>
           </p:cNvSpPr>
           <p:nvPr>
             <p:ph type="title"/>
@@ -5406,7 +5407,7 @@
           <a:p>
             <a:r>
               <a:rPr lang="pt-BR" dirty="0" smtClean="0"/>
-              <a:t>Conclusão</a:t>
+              <a:t>Escopo do Sistema	</a:t>
             </a:r>
             <a:endParaRPr lang="pt-BR" dirty="0"/>
           </a:p>
@@ -5414,12 +5415,12 @@
       </p:sp>
       <p:sp>
         <p:nvSpPr>
-          <p:cNvPr id="19459" name="Rectangle 3"/>
-          <p:cNvSpPr>
-            <a:spLocks noGrp="1" noChangeArrowheads="1"/>
-          </p:cNvSpPr>
-          <p:nvPr>
-            <p:ph type="body" idx="1"/>
+          <p:cNvPr id="3" name="Espaço Reservado para Conteúdo 2"/>
+          <p:cNvSpPr>
+            <a:spLocks noGrp="1"/>
+          </p:cNvSpPr>
+          <p:nvPr>
+            <p:ph idx="1"/>
           </p:nvPr>
         </p:nvSpPr>
         <p:spPr/>
@@ -5429,7 +5430,7 @@
           <a:p>
             <a:r>
               <a:rPr lang="pt-BR" dirty="0" smtClean="0"/>
-              <a:t>Ressalte os resultados alcançados e futuras expansões.</a:t>
+              <a:t>Apresente o escopo do sistema</a:t>
             </a:r>
             <a:endParaRPr lang="pt-BR" dirty="0"/>
           </a:p>
@@ -5437,7 +5438,7 @@
       </p:sp>
       <p:sp>
         <p:nvSpPr>
-          <p:cNvPr id="6" name="Espaço Reservado para Data 5"/>
+          <p:cNvPr id="4" name="Espaço Reservado para Data 3"/>
           <p:cNvSpPr>
             <a:spLocks noGrp="1"/>
           </p:cNvSpPr>
@@ -5456,7 +5457,30 @@
       </p:sp>
       <p:sp>
         <p:nvSpPr>
-          <p:cNvPr id="7" name="Espaço Reservado para Número de Slide 6"/>
+          <p:cNvPr id="5" name="Espaço Reservado para Rodapé 4"/>
+          <p:cNvSpPr>
+            <a:spLocks noGrp="1"/>
+          </p:cNvSpPr>
+          <p:nvPr>
+            <p:ph type="ftr" sz="quarter" idx="11"/>
+          </p:nvPr>
+        </p:nvSpPr>
+        <p:spPr/>
+        <p:txBody>
+          <a:bodyPr/>
+          <a:lstStyle/>
+          <a:p>
+            <a:r>
+              <a:rPr lang="pt-BR" smtClean="0"/>
+              <a:t>Veris Faculdades TCM/3ADS</a:t>
+            </a:r>
+            <a:endParaRPr lang="pt-BR" dirty="0"/>
+          </a:p>
+        </p:txBody>
+      </p:sp>
+      <p:sp>
+        <p:nvSpPr>
+          <p:cNvPr id="6" name="Espaço Reservado para Número de Slide 5"/>
           <p:cNvSpPr>
             <a:spLocks noGrp="1"/>
           </p:cNvSpPr>
@@ -5474,6 +5498,125 @@
               <a:pPr/>
               <a:t>4</a:t>
             </a:fld>
+            <a:endParaRPr lang="pt-BR"/>
+          </a:p>
+        </p:txBody>
+      </p:sp>
+    </p:spTree>
+    <p:extLst>
+      <p:ext uri="{BB962C8B-B14F-4D97-AF65-F5344CB8AC3E}">
+        <p14:creationId xmlns:p14="http://schemas.microsoft.com/office/powerpoint/2010/main" val="2121693485"/>
+      </p:ext>
+    </p:extLst>
+  </p:cSld>
+  <p:clrMapOvr>
+    <a:masterClrMapping/>
+  </p:clrMapOvr>
+</p:sld>
+</file>
+
+<file path=ppt/slides/slide5.xml><?xml version="1.0" encoding="utf-8"?>
+<p:sld xmlns:a="http://schemas.openxmlformats.org/drawingml/2006/main" xmlns:r="http://schemas.openxmlformats.org/officeDocument/2006/relationships" xmlns:p="http://schemas.openxmlformats.org/presentationml/2006/main">
+  <p:cSld>
+    <p:spTree>
+      <p:nvGrpSpPr>
+        <p:cNvPr id="1" name=""/>
+        <p:cNvGrpSpPr/>
+        <p:nvPr/>
+      </p:nvGrpSpPr>
+      <p:grpSpPr>
+        <a:xfrm>
+          <a:off x="0" y="0"/>
+          <a:ext cx="0" cy="0"/>
+          <a:chOff x="0" y="0"/>
+          <a:chExt cx="0" cy="0"/>
+        </a:xfrm>
+      </p:grpSpPr>
+      <p:sp>
+        <p:nvSpPr>
+          <p:cNvPr id="19458" name="Rectangle 2"/>
+          <p:cNvSpPr>
+            <a:spLocks noGrp="1" noChangeArrowheads="1"/>
+          </p:cNvSpPr>
+          <p:nvPr>
+            <p:ph type="title"/>
+          </p:nvPr>
+        </p:nvSpPr>
+        <p:spPr/>
+        <p:txBody>
+          <a:bodyPr/>
+          <a:lstStyle/>
+          <a:p>
+            <a:r>
+              <a:rPr lang="pt-BR" dirty="0" smtClean="0"/>
+              <a:t>Conclusão</a:t>
+            </a:r>
+            <a:endParaRPr lang="pt-BR" dirty="0"/>
+          </a:p>
+        </p:txBody>
+      </p:sp>
+      <p:sp>
+        <p:nvSpPr>
+          <p:cNvPr id="19459" name="Rectangle 3"/>
+          <p:cNvSpPr>
+            <a:spLocks noGrp="1" noChangeArrowheads="1"/>
+          </p:cNvSpPr>
+          <p:nvPr>
+            <p:ph type="body" idx="1"/>
+          </p:nvPr>
+        </p:nvSpPr>
+        <p:spPr/>
+        <p:txBody>
+          <a:bodyPr/>
+          <a:lstStyle/>
+          <a:p>
+            <a:r>
+              <a:rPr lang="pt-BR" dirty="0" smtClean="0"/>
+              <a:t>Ressalte os resultados alcançados e futuras expansões.</a:t>
+            </a:r>
+            <a:endParaRPr lang="pt-BR" dirty="0"/>
+          </a:p>
+        </p:txBody>
+      </p:sp>
+      <p:sp>
+        <p:nvSpPr>
+          <p:cNvPr id="6" name="Espaço Reservado para Data 5"/>
+          <p:cNvSpPr>
+            <a:spLocks noGrp="1"/>
+          </p:cNvSpPr>
+          <p:nvPr>
+            <p:ph type="dt" sz="half" idx="10"/>
+          </p:nvPr>
+        </p:nvSpPr>
+        <p:spPr/>
+        <p:txBody>
+          <a:bodyPr/>
+          <a:lstStyle/>
+          <a:p>
+            <a:endParaRPr lang="pt-BR"/>
+          </a:p>
+        </p:txBody>
+      </p:sp>
+      <p:sp>
+        <p:nvSpPr>
+          <p:cNvPr id="7" name="Espaço Reservado para Número de Slide 6"/>
+          <p:cNvSpPr>
+            <a:spLocks noGrp="1"/>
+          </p:cNvSpPr>
+          <p:nvPr>
+            <p:ph type="sldNum" sz="quarter" idx="12"/>
+          </p:nvPr>
+        </p:nvSpPr>
+        <p:spPr/>
+        <p:txBody>
+          <a:bodyPr/>
+          <a:lstStyle/>
+          <a:p>
+            <a:fld id="{516476CB-12D4-456A-BCEE-8469A8C40045}" type="slidenum">
+              <a:rPr lang="pt-BR" smtClean="0"/>
+              <a:pPr/>
+              <a:t>5</a:t>
+            </a:fld>
             <a:endParaRPr lang="pt-BR" dirty="0"/>
           </a:p>
         </p:txBody>
@@ -5499,11 +5642,7 @@
             </a:r>
             <a:r>
               <a:rPr lang="pt-BR" dirty="0" smtClean="0"/>
-              <a:t> </a:t>
-            </a:r>
-            <a:r>
-              <a:rPr lang="pt-BR" dirty="0" smtClean="0"/>
-              <a:t>Faculdades TCM/3ADS</a:t>
+              <a:t> Faculdades TCM/3ADS</a:t>
             </a:r>
             <a:endParaRPr lang="pt-BR" dirty="0"/>
           </a:p>

</xml_diff>

<commit_message>
Falta atualizar a lista de tabelas, e mais algumas coisas
</commit_message>
<xml_diff>
--- a/documentacao/G5_Apresentacao1sem2014.pptx
+++ b/documentacao/G5_Apresentacao1sem2014.pptx
@@ -5,16 +5,17 @@
     <p:sldMasterId id="2147483657" r:id="rId1"/>
   </p:sldMasterIdLst>
   <p:notesMasterIdLst>
-    <p:notesMasterId r:id="rId6"/>
+    <p:notesMasterId r:id="rId7"/>
   </p:notesMasterIdLst>
   <p:handoutMasterIdLst>
-    <p:handoutMasterId r:id="rId7"/>
+    <p:handoutMasterId r:id="rId8"/>
   </p:handoutMasterIdLst>
   <p:sldIdLst>
     <p:sldId id="256" r:id="rId2"/>
     <p:sldId id="258" r:id="rId3"/>
     <p:sldId id="259" r:id="rId4"/>
-    <p:sldId id="263" r:id="rId5"/>
+    <p:sldId id="264" r:id="rId5"/>
+    <p:sldId id="263" r:id="rId6"/>
   </p:sldIdLst>
   <p:sldSz cx="9144000" cy="6858000" type="screen4x3"/>
   <p:notesSz cx="7010400" cy="9296400"/>
@@ -145,7 +146,7 @@
   </p:defaultTextStyle>
   <p:extLst>
     <p:ext uri="{EFAFB233-063F-42B5-8137-9DF3F51BA10A}">
-      <p15:sldGuideLst xmlns:p15="http://schemas.microsoft.com/office/powerpoint/2012/main">
+      <p15:sldGuideLst xmlns:p15="http://schemas.microsoft.com/office/powerpoint/2012/main" xmlns="">
         <p15:guide id="1" orient="horz" pos="2160">
           <p15:clr>
             <a:srgbClr val="A4A3A4"/>
@@ -159,7 +160,7 @@
       </p15:sldGuideLst>
     </p:ext>
     <p:ext uri="{2D200454-40CA-4A62-9FC3-DE9A4176ACB9}">
-      <p15:notesGuideLst xmlns:p15="http://schemas.microsoft.com/office/powerpoint/2012/main">
+      <p15:notesGuideLst xmlns:p15="http://schemas.microsoft.com/office/powerpoint/2012/main" xmlns="">
         <p15:guide id="1" orient="horz" pos="2928">
           <p15:clr>
             <a:srgbClr val="A4A3A4"/>
@@ -259,7 +260,7 @@
             <a:fld id="{387DC7E4-63C1-42C9-AC56-2D8DD4349572}" type="datetimeFigureOut">
               <a:rPr lang="pt-BR" smtClean="0"/>
               <a:pPr/>
-              <a:t>28/03/2014</a:t>
+              <a:t>29/3/2014</a:t>
             </a:fld>
             <a:endParaRPr lang="pt-BR"/>
           </a:p>
@@ -335,7 +336,7 @@
     </p:spTree>
     <p:extLst>
       <p:ext uri="{BB962C8B-B14F-4D97-AF65-F5344CB8AC3E}">
-        <p14:creationId xmlns:p14="http://schemas.microsoft.com/office/powerpoint/2010/main" val="3690707936"/>
+        <p14:creationId xmlns:p14="http://schemas.microsoft.com/office/powerpoint/2010/main" xmlns="" val="3690707936"/>
       </p:ext>
     </p:extLst>
   </p:cSld>
@@ -649,7 +650,7 @@
     </p:spTree>
     <p:extLst>
       <p:ext uri="{BB962C8B-B14F-4D97-AF65-F5344CB8AC3E}">
-        <p14:creationId xmlns:p14="http://schemas.microsoft.com/office/powerpoint/2010/main" val="753547333"/>
+        <p14:creationId xmlns:p14="http://schemas.microsoft.com/office/powerpoint/2010/main" xmlns="" val="753547333"/>
       </p:ext>
     </p:extLst>
   </p:cSld>
@@ -858,7 +859,7 @@
     </p:spTree>
     <p:extLst>
       <p:ext uri="{BB962C8B-B14F-4D97-AF65-F5344CB8AC3E}">
-        <p14:creationId xmlns:p14="http://schemas.microsoft.com/office/powerpoint/2010/main" val="3859550129"/>
+        <p14:creationId xmlns:p14="http://schemas.microsoft.com/office/powerpoint/2010/main" xmlns="" val="3859550129"/>
       </p:ext>
     </p:extLst>
   </p:cSld>
@@ -5507,10 +5508,10 @@
           <p:nvPr/>
         </p:nvPicPr>
         <p:blipFill>
-          <a:blip r:embed="rId2">
+          <a:blip r:embed="rId2" cstate="print">
             <a:extLst>
               <a:ext uri="{28A0092B-C50C-407E-A947-70E740481C1C}">
-                <a14:useLocalDpi xmlns:a14="http://schemas.microsoft.com/office/drawing/2010/main" val="0"/>
+                <a14:useLocalDpi xmlns:a14="http://schemas.microsoft.com/office/drawing/2010/main" xmlns="" val="0"/>
               </a:ext>
             </a:extLst>
           </a:blip>
@@ -5565,6 +5566,234 @@
       </p:grpSpPr>
       <p:sp>
         <p:nvSpPr>
+          <p:cNvPr id="2" name="Título 1"/>
+          <p:cNvSpPr>
+            <a:spLocks noGrp="1"/>
+          </p:cNvSpPr>
+          <p:nvPr>
+            <p:ph type="title"/>
+          </p:nvPr>
+        </p:nvSpPr>
+        <p:spPr/>
+        <p:txBody>
+          <a:bodyPr/>
+          <a:lstStyle/>
+          <a:p>
+            <a:pPr algn="ctr"/>
+            <a:r>
+              <a:rPr lang="en-US" dirty="0" smtClean="0"/>
+              <a:t>ESCOPO</a:t>
+            </a:r>
+            <a:endParaRPr lang="pt-BR" dirty="0"/>
+          </a:p>
+        </p:txBody>
+      </p:sp>
+      <p:sp>
+        <p:nvSpPr>
+          <p:cNvPr id="3" name="Espaço Reservado para Conteúdo 2"/>
+          <p:cNvSpPr>
+            <a:spLocks noGrp="1"/>
+          </p:cNvSpPr>
+          <p:nvPr>
+            <p:ph idx="1"/>
+          </p:nvPr>
+        </p:nvSpPr>
+        <p:spPr/>
+        <p:txBody>
+          <a:bodyPr/>
+          <a:lstStyle/>
+          <a:p>
+            <a:pPr>
+              <a:buNone/>
+            </a:pPr>
+            <a:r>
+              <a:rPr lang="pt-BR" sz="2400" dirty="0" smtClean="0"/>
+              <a:t>    O </a:t>
+            </a:r>
+            <a:r>
+              <a:rPr lang="pt-BR" sz="2400" dirty="0" smtClean="0"/>
+              <a:t>objetivo principal do sistema que é permitir </a:t>
+            </a:r>
+            <a:r>
+              <a:rPr lang="pt-BR" sz="2400" dirty="0" smtClean="0"/>
+              <a:t>acompanhamento </a:t>
+            </a:r>
+            <a:r>
+              <a:rPr lang="pt-BR" sz="2400" dirty="0" smtClean="0"/>
+              <a:t>melhor dos pais/responsáveis na vida escolar de seus </a:t>
+            </a:r>
+            <a:r>
+              <a:rPr lang="pt-BR" sz="2400" dirty="0" smtClean="0"/>
+              <a:t>filhos do ensino fundamental.</a:t>
+            </a:r>
+          </a:p>
+          <a:p>
+            <a:pPr>
+              <a:buNone/>
+            </a:pPr>
+            <a:r>
+              <a:rPr lang="pt-BR" sz="2400" dirty="0" smtClean="0"/>
+              <a:t> </a:t>
+            </a:r>
+            <a:r>
+              <a:rPr lang="pt-BR" sz="2400" dirty="0" smtClean="0"/>
+              <a:t>   O </a:t>
+            </a:r>
+            <a:r>
+              <a:rPr lang="pt-BR" sz="2400" dirty="0" smtClean="0"/>
+              <a:t>sistema programará os casos de uso de ocorrências e tarefas, com informações registradas por </a:t>
+            </a:r>
+            <a:r>
+              <a:rPr lang="pt-BR" sz="2400" dirty="0" smtClean="0"/>
+              <a:t>dia, para consultas e inserção </a:t>
+            </a:r>
+            <a:r>
+              <a:rPr lang="pt-BR" sz="2400" dirty="0" smtClean="0"/>
+              <a:t>diária de </a:t>
+            </a:r>
+            <a:r>
+              <a:rPr lang="pt-BR" sz="2400" dirty="0" smtClean="0"/>
+              <a:t>informações. </a:t>
+            </a:r>
+          </a:p>
+          <a:p>
+            <a:pPr>
+              <a:buNone/>
+            </a:pPr>
+            <a:r>
+              <a:rPr lang="pt-BR" sz="2400" dirty="0" smtClean="0"/>
+              <a:t>	</a:t>
+            </a:r>
+            <a:r>
+              <a:rPr lang="pt-BR" sz="2400" dirty="0" smtClean="0"/>
+              <a:t>No entanto,</a:t>
+            </a:r>
+            <a:r>
+              <a:rPr lang="pt-BR" sz="2400" dirty="0" smtClean="0"/>
+              <a:t> </a:t>
+            </a:r>
+            <a:r>
+              <a:rPr lang="pt-BR" sz="2400" dirty="0" smtClean="0"/>
+              <a:t>há necessidade da estruturação das turmas </a:t>
+            </a:r>
+            <a:r>
+              <a:rPr lang="pt-BR" sz="2400" dirty="0" smtClean="0"/>
+              <a:t>de uma escola, com o cadastro de professores e </a:t>
+            </a:r>
+            <a:r>
+              <a:rPr lang="pt-BR" sz="2400" dirty="0" smtClean="0"/>
+              <a:t>alunos e suas turmas, e ainda outro banco de dados com os boletins bimestrais para notas e faltas. </a:t>
+            </a:r>
+          </a:p>
+          <a:p>
+            <a:pPr>
+              <a:buNone/>
+            </a:pPr>
+            <a:r>
+              <a:rPr lang="pt-BR" sz="2400" dirty="0" smtClean="0"/>
+              <a:t> </a:t>
+            </a:r>
+            <a:r>
+              <a:rPr lang="pt-BR" sz="2400" dirty="0" smtClean="0"/>
+              <a:t>   </a:t>
+            </a:r>
+            <a:endParaRPr lang="pt-BR" dirty="0"/>
+          </a:p>
+        </p:txBody>
+      </p:sp>
+      <p:sp>
+        <p:nvSpPr>
+          <p:cNvPr id="4" name="Espaço Reservado para Data 3"/>
+          <p:cNvSpPr>
+            <a:spLocks noGrp="1"/>
+          </p:cNvSpPr>
+          <p:nvPr>
+            <p:ph type="dt" sz="half" idx="10"/>
+          </p:nvPr>
+        </p:nvSpPr>
+        <p:spPr/>
+        <p:txBody>
+          <a:bodyPr/>
+          <a:lstStyle/>
+          <a:p>
+            <a:endParaRPr lang="pt-BR"/>
+          </a:p>
+        </p:txBody>
+      </p:sp>
+      <p:sp>
+        <p:nvSpPr>
+          <p:cNvPr id="5" name="Espaço Reservado para Rodapé 4"/>
+          <p:cNvSpPr>
+            <a:spLocks noGrp="1"/>
+          </p:cNvSpPr>
+          <p:nvPr>
+            <p:ph type="ftr" sz="quarter" idx="11"/>
+          </p:nvPr>
+        </p:nvSpPr>
+        <p:spPr/>
+        <p:txBody>
+          <a:bodyPr/>
+          <a:lstStyle/>
+          <a:p>
+            <a:r>
+              <a:rPr lang="pt-BR" smtClean="0"/>
+              <a:t>Veris Faculdades TCM/3ADS</a:t>
+            </a:r>
+            <a:endParaRPr lang="pt-BR" dirty="0"/>
+          </a:p>
+        </p:txBody>
+      </p:sp>
+      <p:sp>
+        <p:nvSpPr>
+          <p:cNvPr id="6" name="Espaço Reservado para Número de Slide 5"/>
+          <p:cNvSpPr>
+            <a:spLocks noGrp="1"/>
+          </p:cNvSpPr>
+          <p:nvPr>
+            <p:ph type="sldNum" sz="quarter" idx="12"/>
+          </p:nvPr>
+        </p:nvSpPr>
+        <p:spPr/>
+        <p:txBody>
+          <a:bodyPr/>
+          <a:lstStyle/>
+          <a:p>
+            <a:fld id="{516476CB-12D4-456A-BCEE-8469A8C40045}" type="slidenum">
+              <a:rPr lang="pt-BR" smtClean="0"/>
+              <a:pPr/>
+              <a:t>4</a:t>
+            </a:fld>
+            <a:endParaRPr lang="pt-BR"/>
+          </a:p>
+        </p:txBody>
+      </p:sp>
+    </p:spTree>
+  </p:cSld>
+  <p:clrMapOvr>
+    <a:masterClrMapping/>
+  </p:clrMapOvr>
+</p:sld>
+</file>
+
+<file path=ppt/slides/slide5.xml><?xml version="1.0" encoding="utf-8"?>
+<p:sld xmlns:a="http://schemas.openxmlformats.org/drawingml/2006/main" xmlns:r="http://schemas.openxmlformats.org/officeDocument/2006/relationships" xmlns:p="http://schemas.openxmlformats.org/presentationml/2006/main">
+  <p:cSld>
+    <p:spTree>
+      <p:nvGrpSpPr>
+        <p:cNvPr id="1" name=""/>
+        <p:cNvGrpSpPr/>
+        <p:nvPr/>
+      </p:nvGrpSpPr>
+      <p:grpSpPr>
+        <a:xfrm>
+          <a:off x="0" y="0"/>
+          <a:ext cx="0" cy="0"/>
+          <a:chOff x="0" y="0"/>
+          <a:chExt cx="0" cy="0"/>
+        </a:xfrm>
+      </p:grpSpPr>
+      <p:sp>
+        <p:nvSpPr>
           <p:cNvPr id="19458" name="Rectangle 2"/>
           <p:cNvSpPr>
             <a:spLocks noGrp="1" noChangeArrowheads="1"/>
@@ -5602,8 +5831,116 @@
           <a:lstStyle/>
           <a:p>
             <a:r>
-              <a:rPr lang="pt-BR" dirty="0" smtClean="0"/>
-              <a:t>Ressalte os resultados alcançados e futuras expansões.</a:t>
+              <a:rPr lang="en-US" dirty="0" err="1" smtClean="0"/>
+              <a:t>Esse</a:t>
+            </a:r>
+            <a:r>
+              <a:rPr lang="en-US" dirty="0" smtClean="0"/>
+              <a:t> </a:t>
+            </a:r>
+            <a:r>
+              <a:rPr lang="en-US" dirty="0" err="1" smtClean="0"/>
+              <a:t>sistema</a:t>
+            </a:r>
+            <a:r>
+              <a:rPr lang="en-US" dirty="0" smtClean="0"/>
+              <a:t>, no </a:t>
+            </a:r>
+            <a:r>
+              <a:rPr lang="en-US" dirty="0" err="1" smtClean="0"/>
+              <a:t>futuro</a:t>
+            </a:r>
+            <a:r>
+              <a:rPr lang="en-US" dirty="0" smtClean="0"/>
+              <a:t>, </a:t>
+            </a:r>
+            <a:r>
+              <a:rPr lang="en-US" dirty="0" err="1" smtClean="0"/>
+              <a:t>poderá</a:t>
+            </a:r>
+            <a:r>
+              <a:rPr lang="en-US" dirty="0" smtClean="0"/>
+              <a:t> </a:t>
+            </a:r>
+            <a:r>
+              <a:rPr lang="en-US" dirty="0" err="1" smtClean="0"/>
+              <a:t>permitir</a:t>
+            </a:r>
+            <a:r>
+              <a:rPr lang="en-US" dirty="0" smtClean="0"/>
+              <a:t> </a:t>
+            </a:r>
+            <a:r>
+              <a:rPr lang="en-US" dirty="0" err="1" smtClean="0"/>
+              <a:t>que</a:t>
+            </a:r>
+            <a:r>
+              <a:rPr lang="en-US" dirty="0" smtClean="0"/>
+              <a:t> </a:t>
+            </a:r>
+            <a:r>
+              <a:rPr lang="en-US" dirty="0" err="1" smtClean="0"/>
+              <a:t>diversas</a:t>
+            </a:r>
+            <a:r>
+              <a:rPr lang="en-US" dirty="0" smtClean="0"/>
+              <a:t> </a:t>
+            </a:r>
+            <a:r>
+              <a:rPr lang="en-US" dirty="0" err="1" smtClean="0"/>
+              <a:t>escolas</a:t>
+            </a:r>
+            <a:r>
+              <a:rPr lang="en-US" dirty="0" smtClean="0"/>
+              <a:t> </a:t>
+            </a:r>
+            <a:r>
+              <a:rPr lang="en-US" dirty="0" err="1" smtClean="0"/>
+              <a:t>consigam</a:t>
+            </a:r>
+            <a:r>
+              <a:rPr lang="en-US" dirty="0" smtClean="0"/>
+              <a:t> </a:t>
+            </a:r>
+            <a:r>
+              <a:rPr lang="en-US" dirty="0" err="1" smtClean="0"/>
+              <a:t>interagir</a:t>
+            </a:r>
+            <a:r>
+              <a:rPr lang="en-US" dirty="0" smtClean="0"/>
+              <a:t> on-line com </a:t>
+            </a:r>
+            <a:r>
+              <a:rPr lang="en-US" dirty="0" err="1" smtClean="0"/>
+              <a:t>os</a:t>
+            </a:r>
+            <a:r>
+              <a:rPr lang="en-US" dirty="0" smtClean="0"/>
+              <a:t> </a:t>
+            </a:r>
+            <a:r>
+              <a:rPr lang="en-US" dirty="0" err="1" smtClean="0"/>
+              <a:t>pais</a:t>
+            </a:r>
+            <a:r>
+              <a:rPr lang="en-US" dirty="0" smtClean="0"/>
+              <a:t>/</a:t>
+            </a:r>
+            <a:r>
+              <a:rPr lang="en-US" dirty="0" err="1" smtClean="0"/>
+              <a:t>responsáveis</a:t>
+            </a:r>
+            <a:r>
+              <a:rPr lang="en-US" dirty="0" smtClean="0"/>
+              <a:t> dos </a:t>
+            </a:r>
+            <a:r>
+              <a:rPr lang="en-US" dirty="0" err="1" smtClean="0"/>
+              <a:t>alunos</a:t>
+            </a:r>
+            <a:r>
+              <a:rPr lang="en-US" smtClean="0"/>
+              <a:t>.</a:t>
             </a:r>
             <a:endParaRPr lang="pt-BR" dirty="0"/>
           </a:p>
@@ -5650,7 +5987,7 @@
             <a:fld id="{516476CB-12D4-456A-BCEE-8469A8C40045}" type="slidenum">
               <a:rPr lang="pt-BR" smtClean="0"/>
               <a:pPr/>
-              <a:t>4</a:t>
+              <a:t>5</a:t>
             </a:fld>
             <a:endParaRPr lang="pt-BR" dirty="0"/>
           </a:p>

</xml_diff>

<commit_message>
- Atualização slide G5_Apresentacao1sem2014.pptx
</commit_message>
<xml_diff>
--- a/documentacao/G5_Apresentacao1sem2014.pptx
+++ b/documentacao/G5_Apresentacao1sem2014.pptx
@@ -146,7 +146,7 @@
   </p:defaultTextStyle>
   <p:extLst>
     <p:ext uri="{EFAFB233-063F-42B5-8137-9DF3F51BA10A}">
-      <p15:sldGuideLst xmlns="" xmlns:p15="http://schemas.microsoft.com/office/powerpoint/2012/main">
+      <p15:sldGuideLst xmlns:p15="http://schemas.microsoft.com/office/powerpoint/2012/main" xmlns="">
         <p15:guide id="1" orient="horz" pos="2160">
           <p15:clr>
             <a:srgbClr val="A4A3A4"/>
@@ -160,7 +160,7 @@
       </p15:sldGuideLst>
     </p:ext>
     <p:ext uri="{2D200454-40CA-4A62-9FC3-DE9A4176ACB9}">
-      <p15:notesGuideLst xmlns="" xmlns:p15="http://schemas.microsoft.com/office/powerpoint/2012/main">
+      <p15:notesGuideLst xmlns:p15="http://schemas.microsoft.com/office/powerpoint/2012/main" xmlns="">
         <p15:guide id="1" orient="horz" pos="2928">
           <p15:clr>
             <a:srgbClr val="A4A3A4"/>
@@ -260,7 +260,7 @@
             <a:fld id="{387DC7E4-63C1-42C9-AC56-2D8DD4349572}" type="datetimeFigureOut">
               <a:rPr lang="pt-BR" smtClean="0"/>
               <a:pPr/>
-              <a:t>30/3/2014</a:t>
+              <a:t>31/03/2014</a:t>
             </a:fld>
             <a:endParaRPr lang="pt-BR"/>
           </a:p>
@@ -336,7 +336,7 @@
     </p:spTree>
     <p:extLst>
       <p:ext uri="{BB962C8B-B14F-4D97-AF65-F5344CB8AC3E}">
-        <p14:creationId xmlns="" xmlns:p14="http://schemas.microsoft.com/office/powerpoint/2010/main" val="3690707936"/>
+        <p14:creationId xmlns:p14="http://schemas.microsoft.com/office/powerpoint/2010/main" val="3690707936"/>
       </p:ext>
     </p:extLst>
   </p:cSld>
@@ -650,7 +650,7 @@
     </p:spTree>
     <p:extLst>
       <p:ext uri="{BB962C8B-B14F-4D97-AF65-F5344CB8AC3E}">
-        <p14:creationId xmlns="" xmlns:p14="http://schemas.microsoft.com/office/powerpoint/2010/main" val="753547333"/>
+        <p14:creationId xmlns:p14="http://schemas.microsoft.com/office/powerpoint/2010/main" val="753547333"/>
       </p:ext>
     </p:extLst>
   </p:cSld>
@@ -859,7 +859,7 @@
     </p:spTree>
     <p:extLst>
       <p:ext uri="{BB962C8B-B14F-4D97-AF65-F5344CB8AC3E}">
-        <p14:creationId xmlns="" xmlns:p14="http://schemas.microsoft.com/office/powerpoint/2010/main" val="3859550129"/>
+        <p14:creationId xmlns:p14="http://schemas.microsoft.com/office/powerpoint/2010/main" val="3859550129"/>
       </p:ext>
     </p:extLst>
   </p:cSld>
@@ -5020,13 +5020,8 @@
             </a:r>
             <a:r>
               <a:rPr lang="pt-BR" dirty="0" smtClean="0"/>
-              <a:t>               Luiza Helena </a:t>
-            </a:r>
-            <a:r>
-              <a:rPr lang="pt-BR" dirty="0" smtClean="0"/>
-              <a:t>Favaretto</a:t>
-            </a:r>
-            <a:endParaRPr lang="pt-BR" dirty="0" smtClean="0"/>
+              <a:t>               Luiza Helena Favaretto</a:t>
+            </a:r>
           </a:p>
           <a:p>
             <a:r>
@@ -5553,7 +5548,7 @@
           <a:blip r:embed="rId2" cstate="print">
             <a:extLst>
               <a:ext uri="{28A0092B-C50C-407E-A947-70E740481C1C}">
-                <a14:useLocalDpi xmlns="" xmlns:a14="http://schemas.microsoft.com/office/drawing/2010/main" val="0"/>
+                <a14:useLocalDpi xmlns:a14="http://schemas.microsoft.com/office/drawing/2010/main" val="0"/>
               </a:ext>
             </a:extLst>
           </a:blip>
@@ -5757,7 +5752,11 @@
           <a:bodyPr/>
           <a:lstStyle/>
           <a:p>
-            <a:endParaRPr lang="pt-BR"/>
+            <a:r>
+              <a:rPr lang="pt-BR" dirty="0" smtClean="0"/>
+              <a:t>31/03/2014</a:t>
+            </a:r>
+            <a:endParaRPr lang="pt-BR" dirty="0"/>
           </a:p>
         </p:txBody>
       </p:sp>
@@ -5777,8 +5776,24 @@
           <a:lstStyle/>
           <a:p>
             <a:r>
-              <a:rPr lang="pt-BR" smtClean="0"/>
-              <a:t>Veris Faculdades TCM/3ADS</a:t>
+              <a:rPr lang="pt-BR" dirty="0" err="1" smtClean="0"/>
+              <a:t>Metrocam</a:t>
+            </a:r>
+            <a:r>
+              <a:rPr lang="pt-BR" dirty="0" err="1" smtClean="0"/>
+              <a:t>p</a:t>
+            </a:r>
+            <a:r>
+              <a:rPr lang="pt-BR" dirty="0" smtClean="0"/>
+              <a:t> </a:t>
+            </a:r>
+            <a:r>
+              <a:rPr lang="pt-BR" dirty="0" smtClean="0"/>
+              <a:t>Faculdades </a:t>
+            </a:r>
+            <a:r>
+              <a:rPr lang="pt-BR" dirty="0" smtClean="0"/>
+              <a:t>TCM/3ADS</a:t>
             </a:r>
             <a:endParaRPr lang="pt-BR" dirty="0"/>
           </a:p>

</xml_diff>

<commit_message>
Inserção dos casos de uso nos slides de apresentação
</commit_message>
<xml_diff>
--- a/documentacao/G5_Apresentacao1sem2014.pptx
+++ b/documentacao/G5_Apresentacao1sem2014.pptx
@@ -5,17 +5,20 @@
     <p:sldMasterId id="2147483657" r:id="rId1"/>
   </p:sldMasterIdLst>
   <p:notesMasterIdLst>
-    <p:notesMasterId r:id="rId7"/>
+    <p:notesMasterId r:id="rId10"/>
   </p:notesMasterIdLst>
   <p:handoutMasterIdLst>
-    <p:handoutMasterId r:id="rId8"/>
+    <p:handoutMasterId r:id="rId11"/>
   </p:handoutMasterIdLst>
   <p:sldIdLst>
     <p:sldId id="256" r:id="rId2"/>
     <p:sldId id="258" r:id="rId3"/>
     <p:sldId id="259" r:id="rId4"/>
-    <p:sldId id="264" r:id="rId5"/>
-    <p:sldId id="263" r:id="rId6"/>
+    <p:sldId id="265" r:id="rId5"/>
+    <p:sldId id="266" r:id="rId6"/>
+    <p:sldId id="267" r:id="rId7"/>
+    <p:sldId id="264" r:id="rId8"/>
+    <p:sldId id="263" r:id="rId9"/>
   </p:sldIdLst>
   <p:sldSz cx="9144000" cy="6858000" type="screen4x3"/>
   <p:notesSz cx="7010400" cy="9296400"/>
@@ -146,7 +149,7 @@
   </p:defaultTextStyle>
   <p:extLst>
     <p:ext uri="{EFAFB233-063F-42B5-8137-9DF3F51BA10A}">
-      <p15:sldGuideLst xmlns:p15="http://schemas.microsoft.com/office/powerpoint/2012/main" xmlns="">
+      <p15:sldGuideLst xmlns="" xmlns:p15="http://schemas.microsoft.com/office/powerpoint/2012/main">
         <p15:guide id="1" orient="horz" pos="2160">
           <p15:clr>
             <a:srgbClr val="A4A3A4"/>
@@ -160,7 +163,7 @@
       </p15:sldGuideLst>
     </p:ext>
     <p:ext uri="{2D200454-40CA-4A62-9FC3-DE9A4176ACB9}">
-      <p15:notesGuideLst xmlns:p15="http://schemas.microsoft.com/office/powerpoint/2012/main" xmlns="">
+      <p15:notesGuideLst xmlns="" xmlns:p15="http://schemas.microsoft.com/office/powerpoint/2012/main">
         <p15:guide id="1" orient="horz" pos="2928">
           <p15:clr>
             <a:srgbClr val="A4A3A4"/>
@@ -260,7 +263,7 @@
             <a:fld id="{387DC7E4-63C1-42C9-AC56-2D8DD4349572}" type="datetimeFigureOut">
               <a:rPr lang="pt-BR" smtClean="0"/>
               <a:pPr/>
-              <a:t>31/03/2014</a:t>
+              <a:t>17/05/2014</a:t>
             </a:fld>
             <a:endParaRPr lang="pt-BR"/>
           </a:p>
@@ -336,7 +339,7 @@
     </p:spTree>
     <p:extLst>
       <p:ext uri="{BB962C8B-B14F-4D97-AF65-F5344CB8AC3E}">
-        <p14:creationId xmlns:p14="http://schemas.microsoft.com/office/powerpoint/2010/main" val="3690707936"/>
+        <p14:creationId xmlns:p14="http://schemas.microsoft.com/office/powerpoint/2010/main" xmlns="" val="3690707936"/>
       </p:ext>
     </p:extLst>
   </p:cSld>
@@ -650,7 +653,7 @@
     </p:spTree>
     <p:extLst>
       <p:ext uri="{BB962C8B-B14F-4D97-AF65-F5344CB8AC3E}">
-        <p14:creationId xmlns:p14="http://schemas.microsoft.com/office/powerpoint/2010/main" val="753547333"/>
+        <p14:creationId xmlns:p14="http://schemas.microsoft.com/office/powerpoint/2010/main" xmlns="" val="753547333"/>
       </p:ext>
     </p:extLst>
   </p:cSld>
@@ -859,7 +862,7 @@
     </p:spTree>
     <p:extLst>
       <p:ext uri="{BB962C8B-B14F-4D97-AF65-F5344CB8AC3E}">
-        <p14:creationId xmlns:p14="http://schemas.microsoft.com/office/powerpoint/2010/main" val="3859550129"/>
+        <p14:creationId xmlns:p14="http://schemas.microsoft.com/office/powerpoint/2010/main" xmlns="" val="3859550129"/>
       </p:ext>
     </p:extLst>
   </p:cSld>
@@ -5548,7 +5551,7 @@
           <a:blip r:embed="rId2" cstate="print">
             <a:extLst>
               <a:ext uri="{28A0092B-C50C-407E-A947-70E740481C1C}">
-                <a14:useLocalDpi xmlns:a14="http://schemas.microsoft.com/office/drawing/2010/main" val="0"/>
+                <a14:useLocalDpi xmlns:a14="http://schemas.microsoft.com/office/drawing/2010/main" xmlns="" val="0"/>
               </a:ext>
             </a:extLst>
           </a:blip>
@@ -5675,6 +5678,493 @@
           <a:bodyPr/>
           <a:lstStyle/>
           <a:p>
+            <a:r>
+              <a:rPr lang="pt-BR" dirty="0" smtClean="0"/>
+              <a:t>Diagrama Caso de Uso</a:t>
+            </a:r>
+            <a:br>
+              <a:rPr lang="pt-BR" dirty="0" smtClean="0"/>
+            </a:br>
+            <a:endParaRPr lang="pt-BR" dirty="0"/>
+          </a:p>
+        </p:txBody>
+      </p:sp>
+      <p:pic>
+        <p:nvPicPr>
+          <p:cNvPr id="7" name="Espaço Reservado para Conteúdo 6" descr="Aluno e Pai.png"/>
+          <p:cNvPicPr>
+            <a:picLocks noGrp="1" noChangeAspect="1"/>
+          </p:cNvPicPr>
+          <p:nvPr>
+            <p:ph idx="1"/>
+          </p:nvPr>
+        </p:nvPicPr>
+        <p:blipFill>
+          <a:blip r:embed="rId2"/>
+          <a:stretch>
+            <a:fillRect/>
+          </a:stretch>
+        </p:blipFill>
+        <p:spPr>
+          <a:xfrm>
+            <a:off x="1740940" y="1600200"/>
+            <a:ext cx="5662120" cy="4530725"/>
+          </a:xfrm>
+        </p:spPr>
+      </p:pic>
+      <p:sp>
+        <p:nvSpPr>
+          <p:cNvPr id="4" name="Espaço Reservado para Data 3"/>
+          <p:cNvSpPr>
+            <a:spLocks noGrp="1"/>
+          </p:cNvSpPr>
+          <p:nvPr>
+            <p:ph type="dt" sz="half" idx="10"/>
+          </p:nvPr>
+        </p:nvSpPr>
+        <p:spPr/>
+        <p:txBody>
+          <a:bodyPr/>
+          <a:lstStyle/>
+          <a:p>
+            <a:endParaRPr lang="pt-BR" dirty="0"/>
+          </a:p>
+        </p:txBody>
+      </p:sp>
+      <p:sp>
+        <p:nvSpPr>
+          <p:cNvPr id="5" name="Espaço Reservado para Rodapé 4"/>
+          <p:cNvSpPr>
+            <a:spLocks noGrp="1"/>
+          </p:cNvSpPr>
+          <p:nvPr>
+            <p:ph type="ftr" sz="quarter" idx="11"/>
+          </p:nvPr>
+        </p:nvSpPr>
+        <p:spPr/>
+        <p:txBody>
+          <a:bodyPr/>
+          <a:lstStyle/>
+          <a:p>
+            <a:r>
+              <a:rPr lang="pt-BR" dirty="0" err="1" smtClean="0"/>
+              <a:t>Metrocamp</a:t>
+            </a:r>
+            <a:r>
+              <a:rPr lang="pt-BR" dirty="0" smtClean="0"/>
+              <a:t> Faculdades TCM/3ADS</a:t>
+            </a:r>
+            <a:endParaRPr lang="pt-BR" dirty="0"/>
+          </a:p>
+        </p:txBody>
+      </p:sp>
+      <p:sp>
+        <p:nvSpPr>
+          <p:cNvPr id="6" name="Espaço Reservado para Número de Slide 5"/>
+          <p:cNvSpPr>
+            <a:spLocks noGrp="1"/>
+          </p:cNvSpPr>
+          <p:nvPr>
+            <p:ph type="sldNum" sz="quarter" idx="12"/>
+          </p:nvPr>
+        </p:nvSpPr>
+        <p:spPr/>
+        <p:txBody>
+          <a:bodyPr/>
+          <a:lstStyle/>
+          <a:p>
+            <a:fld id="{516476CB-12D4-456A-BCEE-8469A8C40045}" type="slidenum">
+              <a:rPr lang="pt-BR" smtClean="0"/>
+              <a:pPr/>
+              <a:t>4</a:t>
+            </a:fld>
+            <a:endParaRPr lang="pt-BR"/>
+          </a:p>
+        </p:txBody>
+      </p:sp>
+    </p:spTree>
+  </p:cSld>
+  <p:clrMapOvr>
+    <a:masterClrMapping/>
+  </p:clrMapOvr>
+  <p:transition spd="slow">
+    <p:wipe dir="r"/>
+  </p:transition>
+  <p:timing>
+    <p:tnLst>
+      <p:par>
+        <p:cTn id="1" dur="indefinite" restart="never" nodeType="tmRoot"/>
+      </p:par>
+    </p:tnLst>
+  </p:timing>
+</p:sld>
+</file>
+
+<file path=ppt/slides/slide5.xml><?xml version="1.0" encoding="utf-8"?>
+<p:sld xmlns:a="http://schemas.openxmlformats.org/drawingml/2006/main" xmlns:r="http://schemas.openxmlformats.org/officeDocument/2006/relationships" xmlns:p="http://schemas.openxmlformats.org/presentationml/2006/main">
+  <p:cSld>
+    <p:spTree>
+      <p:nvGrpSpPr>
+        <p:cNvPr id="1" name=""/>
+        <p:cNvGrpSpPr/>
+        <p:nvPr/>
+      </p:nvGrpSpPr>
+      <p:grpSpPr>
+        <a:xfrm>
+          <a:off x="0" y="0"/>
+          <a:ext cx="0" cy="0"/>
+          <a:chOff x="0" y="0"/>
+          <a:chExt cx="0" cy="0"/>
+        </a:xfrm>
+      </p:grpSpPr>
+      <p:sp>
+        <p:nvSpPr>
+          <p:cNvPr id="2" name="Título 1"/>
+          <p:cNvSpPr>
+            <a:spLocks noGrp="1"/>
+          </p:cNvSpPr>
+          <p:nvPr>
+            <p:ph type="title"/>
+          </p:nvPr>
+        </p:nvSpPr>
+        <p:spPr/>
+        <p:txBody>
+          <a:bodyPr/>
+          <a:lstStyle/>
+          <a:p>
+            <a:r>
+              <a:rPr lang="pt-BR" dirty="0" smtClean="0"/>
+              <a:t>Diagrama Caso de </a:t>
+            </a:r>
+            <a:r>
+              <a:rPr lang="pt-BR" dirty="0" smtClean="0"/>
+              <a:t>Uso</a:t>
+            </a:r>
+            <a:br>
+              <a:rPr lang="pt-BR" dirty="0" smtClean="0"/>
+            </a:br>
+            <a:endParaRPr lang="pt-BR" dirty="0"/>
+          </a:p>
+        </p:txBody>
+      </p:sp>
+      <p:pic>
+        <p:nvPicPr>
+          <p:cNvPr id="7" name="Espaço Reservado para Conteúdo 6" descr="Professor e Secretaria.png"/>
+          <p:cNvPicPr>
+            <a:picLocks noGrp="1" noChangeAspect="1"/>
+          </p:cNvPicPr>
+          <p:nvPr>
+            <p:ph idx="1"/>
+          </p:nvPr>
+        </p:nvPicPr>
+        <p:blipFill>
+          <a:blip r:embed="rId2"/>
+          <a:stretch>
+            <a:fillRect/>
+          </a:stretch>
+        </p:blipFill>
+        <p:spPr>
+          <a:xfrm>
+            <a:off x="2013850" y="1600200"/>
+            <a:ext cx="5116300" cy="4530725"/>
+          </a:xfrm>
+        </p:spPr>
+      </p:pic>
+      <p:sp>
+        <p:nvSpPr>
+          <p:cNvPr id="4" name="Espaço Reservado para Data 3"/>
+          <p:cNvSpPr>
+            <a:spLocks noGrp="1"/>
+          </p:cNvSpPr>
+          <p:nvPr>
+            <p:ph type="dt" sz="half" idx="10"/>
+          </p:nvPr>
+        </p:nvSpPr>
+        <p:spPr/>
+        <p:txBody>
+          <a:bodyPr/>
+          <a:lstStyle/>
+          <a:p>
+            <a:endParaRPr lang="pt-BR"/>
+          </a:p>
+        </p:txBody>
+      </p:sp>
+      <p:sp>
+        <p:nvSpPr>
+          <p:cNvPr id="5" name="Espaço Reservado para Rodapé 4"/>
+          <p:cNvSpPr>
+            <a:spLocks noGrp="1"/>
+          </p:cNvSpPr>
+          <p:nvPr>
+            <p:ph type="ftr" sz="quarter" idx="11"/>
+          </p:nvPr>
+        </p:nvSpPr>
+        <p:spPr/>
+        <p:txBody>
+          <a:bodyPr/>
+          <a:lstStyle/>
+          <a:p>
+            <a:r>
+              <a:rPr lang="pt-BR" dirty="0" err="1" smtClean="0"/>
+              <a:t>Metrocamp</a:t>
+            </a:r>
+            <a:r>
+              <a:rPr lang="pt-BR" dirty="0" smtClean="0"/>
+              <a:t> Faculdades </a:t>
+            </a:r>
+            <a:r>
+              <a:rPr lang="pt-BR" dirty="0" smtClean="0"/>
+              <a:t>TCM/3ADS</a:t>
+            </a:r>
+          </a:p>
+          <a:p>
+            <a:endParaRPr lang="pt-BR" dirty="0"/>
+          </a:p>
+        </p:txBody>
+      </p:sp>
+      <p:sp>
+        <p:nvSpPr>
+          <p:cNvPr id="6" name="Espaço Reservado para Número de Slide 5"/>
+          <p:cNvSpPr>
+            <a:spLocks noGrp="1"/>
+          </p:cNvSpPr>
+          <p:nvPr>
+            <p:ph type="sldNum" sz="quarter" idx="12"/>
+          </p:nvPr>
+        </p:nvSpPr>
+        <p:spPr/>
+        <p:txBody>
+          <a:bodyPr/>
+          <a:lstStyle/>
+          <a:p>
+            <a:fld id="{516476CB-12D4-456A-BCEE-8469A8C40045}" type="slidenum">
+              <a:rPr lang="pt-BR" smtClean="0"/>
+              <a:pPr/>
+              <a:t>5</a:t>
+            </a:fld>
+            <a:endParaRPr lang="pt-BR"/>
+          </a:p>
+        </p:txBody>
+      </p:sp>
+    </p:spTree>
+  </p:cSld>
+  <p:clrMapOvr>
+    <a:masterClrMapping/>
+  </p:clrMapOvr>
+  <p:transition spd="slow">
+    <p:wipe dir="r"/>
+  </p:transition>
+  <p:timing>
+    <p:tnLst>
+      <p:par>
+        <p:cTn id="1" dur="indefinite" restart="never" nodeType="tmRoot"/>
+      </p:par>
+    </p:tnLst>
+  </p:timing>
+</p:sld>
+</file>
+
+<file path=ppt/slides/slide6.xml><?xml version="1.0" encoding="utf-8"?>
+<p:sld xmlns:a="http://schemas.openxmlformats.org/drawingml/2006/main" xmlns:r="http://schemas.openxmlformats.org/officeDocument/2006/relationships" xmlns:p="http://schemas.openxmlformats.org/presentationml/2006/main">
+  <p:cSld>
+    <p:spTree>
+      <p:nvGrpSpPr>
+        <p:cNvPr id="1" name=""/>
+        <p:cNvGrpSpPr/>
+        <p:nvPr/>
+      </p:nvGrpSpPr>
+      <p:grpSpPr>
+        <a:xfrm>
+          <a:off x="0" y="0"/>
+          <a:ext cx="0" cy="0"/>
+          <a:chOff x="0" y="0"/>
+          <a:chExt cx="0" cy="0"/>
+        </a:xfrm>
+      </p:grpSpPr>
+      <p:sp>
+        <p:nvSpPr>
+          <p:cNvPr id="2" name="Título 1"/>
+          <p:cNvSpPr>
+            <a:spLocks noGrp="1"/>
+          </p:cNvSpPr>
+          <p:nvPr>
+            <p:ph type="title"/>
+          </p:nvPr>
+        </p:nvSpPr>
+        <p:spPr/>
+        <p:txBody>
+          <a:bodyPr/>
+          <a:lstStyle/>
+          <a:p>
+            <a:r>
+              <a:rPr lang="pt-BR" dirty="0" smtClean="0"/>
+              <a:t>Diagrama Caso de </a:t>
+            </a:r>
+            <a:r>
+              <a:rPr lang="pt-BR" dirty="0" smtClean="0"/>
+              <a:t>Uso</a:t>
+            </a:r>
+            <a:br>
+              <a:rPr lang="pt-BR" dirty="0" smtClean="0"/>
+            </a:br>
+            <a:endParaRPr lang="pt-BR" dirty="0"/>
+          </a:p>
+        </p:txBody>
+      </p:sp>
+      <p:pic>
+        <p:nvPicPr>
+          <p:cNvPr id="7" name="Espaço Reservado para Conteúdo 6" descr="Gestor.png"/>
+          <p:cNvPicPr>
+            <a:picLocks noGrp="1" noChangeAspect="1"/>
+          </p:cNvPicPr>
+          <p:nvPr>
+            <p:ph idx="1"/>
+          </p:nvPr>
+        </p:nvPicPr>
+        <p:blipFill>
+          <a:blip r:embed="rId2"/>
+          <a:stretch>
+            <a:fillRect/>
+          </a:stretch>
+        </p:blipFill>
+        <p:spPr>
+          <a:xfrm>
+            <a:off x="2013850" y="1600200"/>
+            <a:ext cx="5116300" cy="4530725"/>
+          </a:xfrm>
+        </p:spPr>
+      </p:pic>
+      <p:sp>
+        <p:nvSpPr>
+          <p:cNvPr id="4" name="Espaço Reservado para Data 3"/>
+          <p:cNvSpPr>
+            <a:spLocks noGrp="1"/>
+          </p:cNvSpPr>
+          <p:nvPr>
+            <p:ph type="dt" sz="half" idx="10"/>
+          </p:nvPr>
+        </p:nvSpPr>
+        <p:spPr/>
+        <p:txBody>
+          <a:bodyPr/>
+          <a:lstStyle/>
+          <a:p>
+            <a:endParaRPr lang="pt-BR"/>
+          </a:p>
+        </p:txBody>
+      </p:sp>
+      <p:sp>
+        <p:nvSpPr>
+          <p:cNvPr id="5" name="Espaço Reservado para Rodapé 4"/>
+          <p:cNvSpPr>
+            <a:spLocks noGrp="1"/>
+          </p:cNvSpPr>
+          <p:nvPr>
+            <p:ph type="ftr" sz="quarter" idx="11"/>
+          </p:nvPr>
+        </p:nvSpPr>
+        <p:spPr>
+          <a:xfrm>
+            <a:off x="3176598" y="6248400"/>
+            <a:ext cx="2895600" cy="457200"/>
+          </a:xfrm>
+        </p:spPr>
+        <p:txBody>
+          <a:bodyPr/>
+          <a:lstStyle/>
+          <a:p>
+            <a:r>
+              <a:rPr lang="pt-BR" dirty="0" err="1" smtClean="0"/>
+              <a:t>Metrocamp</a:t>
+            </a:r>
+            <a:r>
+              <a:rPr lang="pt-BR" dirty="0" smtClean="0"/>
+              <a:t> Faculdades </a:t>
+            </a:r>
+            <a:r>
+              <a:rPr lang="pt-BR" dirty="0" smtClean="0"/>
+              <a:t>TCM/3ADS</a:t>
+            </a:r>
+          </a:p>
+          <a:p>
+            <a:endParaRPr lang="pt-BR" dirty="0"/>
+          </a:p>
+        </p:txBody>
+      </p:sp>
+      <p:sp>
+        <p:nvSpPr>
+          <p:cNvPr id="6" name="Espaço Reservado para Número de Slide 5"/>
+          <p:cNvSpPr>
+            <a:spLocks noGrp="1"/>
+          </p:cNvSpPr>
+          <p:nvPr>
+            <p:ph type="sldNum" sz="quarter" idx="12"/>
+          </p:nvPr>
+        </p:nvSpPr>
+        <p:spPr/>
+        <p:txBody>
+          <a:bodyPr/>
+          <a:lstStyle/>
+          <a:p>
+            <a:fld id="{516476CB-12D4-456A-BCEE-8469A8C40045}" type="slidenum">
+              <a:rPr lang="pt-BR" smtClean="0"/>
+              <a:pPr/>
+              <a:t>6</a:t>
+            </a:fld>
+            <a:endParaRPr lang="pt-BR"/>
+          </a:p>
+        </p:txBody>
+      </p:sp>
+    </p:spTree>
+  </p:cSld>
+  <p:clrMapOvr>
+    <a:masterClrMapping/>
+  </p:clrMapOvr>
+  <p:transition spd="slow">
+    <p:wipe dir="r"/>
+  </p:transition>
+  <p:timing>
+    <p:tnLst>
+      <p:par>
+        <p:cTn id="1" dur="indefinite" restart="never" nodeType="tmRoot"/>
+      </p:par>
+    </p:tnLst>
+  </p:timing>
+</p:sld>
+</file>
+
+<file path=ppt/slides/slide7.xml><?xml version="1.0" encoding="utf-8"?>
+<p:sld xmlns:a="http://schemas.openxmlformats.org/drawingml/2006/main" xmlns:r="http://schemas.openxmlformats.org/officeDocument/2006/relationships" xmlns:p="http://schemas.openxmlformats.org/presentationml/2006/main">
+  <p:cSld>
+    <p:spTree>
+      <p:nvGrpSpPr>
+        <p:cNvPr id="1" name=""/>
+        <p:cNvGrpSpPr/>
+        <p:nvPr/>
+      </p:nvGrpSpPr>
+      <p:grpSpPr>
+        <a:xfrm>
+          <a:off x="0" y="0"/>
+          <a:ext cx="0" cy="0"/>
+          <a:chOff x="0" y="0"/>
+          <a:chExt cx="0" cy="0"/>
+        </a:xfrm>
+      </p:grpSpPr>
+      <p:sp>
+        <p:nvSpPr>
+          <p:cNvPr id="2" name="Título 1"/>
+          <p:cNvSpPr>
+            <a:spLocks noGrp="1"/>
+          </p:cNvSpPr>
+          <p:nvPr>
+            <p:ph type="title"/>
+          </p:nvPr>
+        </p:nvSpPr>
+        <p:spPr/>
+        <p:txBody>
+          <a:bodyPr/>
+          <a:lstStyle/>
+          <a:p>
             <a:pPr algn="ctr"/>
             <a:r>
               <a:rPr lang="en-US" dirty="0" smtClean="0"/>
@@ -5797,7 +6287,7 @@
             <a:fld id="{516476CB-12D4-456A-BCEE-8469A8C40045}" type="slidenum">
               <a:rPr lang="pt-BR" smtClean="0"/>
               <a:pPr/>
-              <a:t>4</a:t>
+              <a:t>7</a:t>
             </a:fld>
             <a:endParaRPr lang="pt-BR"/>
           </a:p>
@@ -6282,7 +6772,7 @@
 </p:sld>
 </file>
 
-<file path=ppt/slides/slide5.xml><?xml version="1.0" encoding="utf-8"?>
+<file path=ppt/slides/slide8.xml><?xml version="1.0" encoding="utf-8"?>
 <p:sld xmlns:a="http://schemas.openxmlformats.org/drawingml/2006/main" xmlns:r="http://schemas.openxmlformats.org/officeDocument/2006/relationships" xmlns:p="http://schemas.openxmlformats.org/presentationml/2006/main">
   <p:cSld>
     <p:spTree>
@@ -6481,16 +6971,11 @@
               <a:rPr lang="en-US" dirty="0" smtClean="0"/>
               <a:t>, e-mail.</a:t>
             </a:r>
-            <a:endParaRPr lang="en-US" dirty="0" smtClean="0"/>
           </a:p>
           <a:p>
             <a:r>
               <a:rPr lang="en-US" dirty="0" smtClean="0"/>
-              <a:t>Um </a:t>
-            </a:r>
-            <a:r>
-              <a:rPr lang="en-US" dirty="0" smtClean="0"/>
-              <a:t>dado </a:t>
+              <a:t>Um dado </a:t>
             </a:r>
             <a:r>
               <a:rPr lang="en-US" dirty="0" err="1" smtClean="0"/>
@@ -6546,11 +7031,7 @@
             </a:r>
             <a:r>
               <a:rPr lang="en-US" dirty="0" smtClean="0"/>
-              <a:t>, </a:t>
-            </a:r>
-            <a:r>
-              <a:rPr lang="en-US" dirty="0" smtClean="0"/>
-              <a:t>é a </a:t>
+              <a:t>, é a </a:t>
             </a:r>
             <a:r>
               <a:rPr lang="en-US" dirty="0" err="1" smtClean="0"/>
@@ -6598,11 +7079,7 @@
             </a:r>
             <a:r>
               <a:rPr lang="en-US" dirty="0" smtClean="0"/>
-              <a:t> </a:t>
-            </a:r>
-            <a:r>
-              <a:rPr lang="en-US" dirty="0" smtClean="0"/>
-              <a:t>para o </a:t>
+              <a:t> para o </a:t>
             </a:r>
             <a:r>
               <a:rPr lang="en-US" dirty="0" err="1" smtClean="0"/>
@@ -6610,11 +7087,7 @@
             </a:r>
             <a:r>
               <a:rPr lang="en-US" dirty="0" smtClean="0"/>
-              <a:t> </a:t>
-            </a:r>
-            <a:r>
-              <a:rPr lang="en-US" dirty="0" smtClean="0"/>
-              <a:t>a </a:t>
+              <a:t> a </a:t>
             </a:r>
             <a:r>
               <a:rPr lang="en-US" dirty="0" err="1" smtClean="0"/>
@@ -6735,7 +7208,7 @@
             <a:fld id="{516476CB-12D4-456A-BCEE-8469A8C40045}" type="slidenum">
               <a:rPr lang="pt-BR" smtClean="0"/>
               <a:pPr/>
-              <a:t>5</a:t>
+              <a:t>8</a:t>
             </a:fld>
             <a:endParaRPr lang="pt-BR" dirty="0"/>
           </a:p>

</xml_diff>

<commit_message>
Foi atualizado o documento e criado a apresentação.
</commit_message>
<xml_diff>
--- a/documentacao/G5_Apresentacao1sem2014.pptx
+++ b/documentacao/G5_Apresentacao1sem2014.pptx
@@ -149,7 +149,7 @@
   </p:defaultTextStyle>
   <p:extLst>
     <p:ext uri="{EFAFB233-063F-42B5-8137-9DF3F51BA10A}">
-      <p15:sldGuideLst xmlns="" xmlns:p15="http://schemas.microsoft.com/office/powerpoint/2012/main">
+      <p15:sldGuideLst xmlns:p15="http://schemas.microsoft.com/office/powerpoint/2012/main">
         <p15:guide id="1" orient="horz" pos="2160">
           <p15:clr>
             <a:srgbClr val="A4A3A4"/>
@@ -163,7 +163,7 @@
       </p15:sldGuideLst>
     </p:ext>
     <p:ext uri="{2D200454-40CA-4A62-9FC3-DE9A4176ACB9}">
-      <p15:notesGuideLst xmlns="" xmlns:p15="http://schemas.microsoft.com/office/powerpoint/2012/main">
+      <p15:notesGuideLst xmlns:p15="http://schemas.microsoft.com/office/powerpoint/2012/main">
         <p15:guide id="1" orient="horz" pos="2928">
           <p15:clr>
             <a:srgbClr val="A4A3A4"/>
@@ -4975,10 +4975,14 @@
           <a:lstStyle/>
           <a:p>
             <a:r>
-              <a:rPr lang="pt-BR" dirty="0" smtClean="0"/>
-              <a:t>Escola Digital</a:t>
-            </a:r>
-            <a:endParaRPr lang="pt-BR" dirty="0"/>
+              <a:rPr lang="pt-BR" sz="5000" dirty="0"/>
+              <a:t>GERENCIADOR DE ATIVIDADES </a:t>
+            </a:r>
+            <a:r>
+              <a:rPr lang="pt-BR" sz="4800" dirty="0"/>
+              <a:t>ESCOLARES</a:t>
+            </a:r>
+            <a:endParaRPr lang="pt-BR" sz="4800" dirty="0"/>
           </a:p>
         </p:txBody>
       </p:sp>
@@ -4992,7 +4996,12 @@
             <p:ph type="subTitle" idx="1"/>
           </p:nvPr>
         </p:nvSpPr>
-        <p:spPr/>
+        <p:spPr>
+          <a:xfrm>
+            <a:off x="1691680" y="3789040"/>
+            <a:ext cx="6400800" cy="1728192"/>
+          </a:xfrm>
+        </p:spPr>
         <p:txBody>
           <a:bodyPr/>
           <a:lstStyle/>
@@ -5197,8 +5206,13 @@
             </a:pPr>
             <a:r>
               <a:rPr lang="pt-BR" sz="2400" dirty="0" smtClean="0"/>
-              <a:t>“ Aperfeiçoar a gestão de alunos, provendo funcionalidades que otimizam o trabalho dos envolvidos, tais como: Boletim, Frequência e Ocorrência de cada aluno.”</a:t>
-            </a:r>
+              <a:t>“ Aperfeiçoar a gestão de alunos, provendo funcionalidades que otimizam o trabalho dos envolvidos, tais como: </a:t>
+            </a:r>
+            <a:r>
+              <a:rPr lang="pt-BR" sz="2400" dirty="0" smtClean="0"/>
+              <a:t>Ocorrência, Cadastro de turmas e alunos”.</a:t>
+            </a:r>
+            <a:endParaRPr lang="pt-BR" sz="2400" dirty="0" smtClean="0"/>
           </a:p>
           <a:p>
             <a:pPr marL="0" indent="0">
@@ -5212,7 +5226,15 @@
             </a:pPr>
             <a:r>
               <a:rPr lang="pt-BR" sz="2400" dirty="0" smtClean="0"/>
-              <a:t>“ Facilidade de acompanhamento dos pais a vida escolar dos filhos, trazendo comodidade e segurança.”</a:t>
+              <a:t>“ Facilidade de acompanhamento dos pais a vida escolar dos filhos, trazendo </a:t>
+            </a:r>
+            <a:r>
+              <a:rPr lang="pt-BR" sz="2400" dirty="0" smtClean="0"/>
+              <a:t>comodidade, facilidade </a:t>
+            </a:r>
+            <a:r>
+              <a:rPr lang="pt-BR" sz="2400" dirty="0" smtClean="0"/>
+              <a:t>e segurança.”</a:t>
             </a:r>
           </a:p>
           <a:p>
@@ -5255,9 +5277,10 @@
           <a:lstStyle/>
           <a:p>
             <a:r>
-              <a:rPr lang="pt-BR" dirty="0"/>
-              <a:t>17/05/2014</a:t>
-            </a:r>
+              <a:rPr lang="pt-BR" dirty="0" smtClean="0"/>
+              <a:t>10/06/2014</a:t>
+            </a:r>
+            <a:endParaRPr lang="pt-BR" dirty="0"/>
           </a:p>
         </p:txBody>
       </p:sp>
@@ -5363,8 +5386,8 @@
         </p:nvSpPr>
         <p:spPr>
           <a:xfrm>
-            <a:off x="457200" y="200869"/>
-            <a:ext cx="8229600" cy="1139825"/>
+            <a:off x="360227" y="529295"/>
+            <a:ext cx="8229600" cy="785964"/>
           </a:xfrm>
         </p:spPr>
         <p:txBody>
@@ -5373,7 +5396,15 @@
           <a:p>
             <a:r>
               <a:rPr lang="pt-BR" dirty="0" smtClean="0"/>
-              <a:t>Diagrama Caso Uso</a:t>
+              <a:t>Diagrama Caso </a:t>
+            </a:r>
+            <a:r>
+              <a:rPr lang="pt-BR" dirty="0" smtClean="0"/>
+              <a:t>Uso - Visão </a:t>
+            </a:r>
+            <a:r>
+              <a:rPr lang="pt-BR" dirty="0"/>
+              <a:t>Geral</a:t>
             </a:r>
             <a:endParaRPr lang="pt-BR" dirty="0"/>
           </a:p>
@@ -5391,7 +5422,7 @@
         </p:nvSpPr>
         <p:spPr>
           <a:xfrm>
-            <a:off x="827584" y="1600200"/>
+            <a:off x="827584" y="1698942"/>
             <a:ext cx="7859216" cy="4778058"/>
           </a:xfrm>
         </p:spPr>
@@ -5417,20 +5448,16 @@
           <a:p>
             <a:r>
               <a:rPr lang="pt-BR" dirty="0" smtClean="0"/>
-              <a:t>Boletim</a:t>
-            </a:r>
+              <a:t>Aluno</a:t>
+            </a:r>
+            <a:endParaRPr lang="pt-BR" dirty="0" smtClean="0"/>
           </a:p>
           <a:p>
             <a:r>
               <a:rPr lang="pt-BR" dirty="0" smtClean="0"/>
-              <a:t>Frequência</a:t>
-            </a:r>
-          </a:p>
-          <a:p>
-            <a:r>
-              <a:rPr lang="pt-BR" dirty="0" smtClean="0"/>
-              <a:t>Tarefas</a:t>
-            </a:r>
+              <a:t>Turma</a:t>
+            </a:r>
+            <a:endParaRPr lang="pt-BR" dirty="0" smtClean="0"/>
           </a:p>
           <a:p>
             <a:pPr marL="0" indent="0">
@@ -5468,9 +5495,10 @@
           <a:lstStyle/>
           <a:p>
             <a:r>
-              <a:rPr lang="pt-BR" dirty="0"/>
-              <a:t>17/05/2014</a:t>
-            </a:r>
+              <a:rPr lang="pt-BR" dirty="0" smtClean="0"/>
+              <a:t>10/06/2014</a:t>
+            </a:r>
+            <a:endParaRPr lang="pt-BR" dirty="0"/>
           </a:p>
         </p:txBody>
       </p:sp>
@@ -5532,14 +5560,14 @@
       </p:sp>
       <p:pic>
         <p:nvPicPr>
-          <p:cNvPr id="4" name="Imagem 3"/>
+          <p:cNvPr id="3" name="Imagem 2"/>
           <p:cNvPicPr>
             <a:picLocks noChangeAspect="1"/>
           </p:cNvPicPr>
           <p:nvPr/>
         </p:nvPicPr>
         <p:blipFill>
-          <a:blip r:embed="rId2" cstate="print">
+          <a:blip r:embed="rId2">
             <a:extLst>
               <a:ext uri="{28A0092B-C50C-407E-A947-70E740481C1C}">
                 <a14:useLocalDpi xmlns:a14="http://schemas.microsoft.com/office/drawing/2010/main" val="0"/>
@@ -5552,8 +5580,8 @@
         </p:blipFill>
         <p:spPr>
           <a:xfrm>
-            <a:off x="4427984" y="1593087"/>
-            <a:ext cx="4032448" cy="4788241"/>
+            <a:off x="4757192" y="1470342"/>
+            <a:ext cx="2570835" cy="4851575"/>
           </a:xfrm>
           <a:prstGeom prst="rect">
             <a:avLst/>
@@ -5605,7 +5633,12 @@
             <p:ph type="title"/>
           </p:nvPr>
         </p:nvSpPr>
-        <p:spPr/>
+        <p:spPr>
+          <a:xfrm>
+            <a:off x="457200" y="872953"/>
+            <a:ext cx="8229600" cy="1139825"/>
+          </a:xfrm>
+        </p:spPr>
         <p:txBody>
           <a:bodyPr/>
           <a:lstStyle/>
@@ -5621,9 +5654,88 @@
           </a:p>
         </p:txBody>
       </p:sp>
+      <p:sp>
+        <p:nvSpPr>
+          <p:cNvPr id="4" name="Espaço Reservado para Data 3"/>
+          <p:cNvSpPr>
+            <a:spLocks noGrp="1"/>
+          </p:cNvSpPr>
+          <p:nvPr>
+            <p:ph type="dt" sz="half" idx="10"/>
+          </p:nvPr>
+        </p:nvSpPr>
+        <p:spPr/>
+        <p:txBody>
+          <a:bodyPr/>
+          <a:lstStyle/>
+          <a:p>
+            <a:r>
+              <a:rPr lang="pt-BR" dirty="0" smtClean="0"/>
+              <a:t>10/06/2014</a:t>
+            </a:r>
+            <a:endParaRPr lang="pt-BR" dirty="0"/>
+          </a:p>
+        </p:txBody>
+      </p:sp>
+      <p:sp>
+        <p:nvSpPr>
+          <p:cNvPr id="5" name="Espaço Reservado para Rodapé 4"/>
+          <p:cNvSpPr>
+            <a:spLocks noGrp="1"/>
+          </p:cNvSpPr>
+          <p:nvPr>
+            <p:ph type="ftr" sz="quarter" idx="11"/>
+          </p:nvPr>
+        </p:nvSpPr>
+        <p:spPr>
+          <a:xfrm>
+            <a:off x="3200400" y="6248400"/>
+            <a:ext cx="2895600" cy="457200"/>
+          </a:xfrm>
+        </p:spPr>
+        <p:txBody>
+          <a:bodyPr/>
+          <a:lstStyle/>
+          <a:p>
+            <a:r>
+              <a:rPr lang="pt-BR" dirty="0" err="1" smtClean="0"/>
+              <a:t>Metrocamp</a:t>
+            </a:r>
+            <a:r>
+              <a:rPr lang="pt-BR" dirty="0" smtClean="0"/>
+              <a:t> Faculdades TCM/3ADS</a:t>
+            </a:r>
+            <a:endParaRPr lang="pt-BR" dirty="0"/>
+          </a:p>
+        </p:txBody>
+      </p:sp>
+      <p:sp>
+        <p:nvSpPr>
+          <p:cNvPr id="6" name="Espaço Reservado para Número de Slide 5"/>
+          <p:cNvSpPr>
+            <a:spLocks noGrp="1"/>
+          </p:cNvSpPr>
+          <p:nvPr>
+            <p:ph type="sldNum" sz="quarter" idx="12"/>
+          </p:nvPr>
+        </p:nvSpPr>
+        <p:spPr/>
+        <p:txBody>
+          <a:bodyPr/>
+          <a:lstStyle/>
+          <a:p>
+            <a:fld id="{516476CB-12D4-456A-BCEE-8469A8C40045}" type="slidenum">
+              <a:rPr lang="pt-BR" smtClean="0"/>
+              <a:pPr/>
+              <a:t>4</a:t>
+            </a:fld>
+            <a:endParaRPr lang="pt-BR"/>
+          </a:p>
+        </p:txBody>
+      </p:sp>
       <p:pic>
         <p:nvPicPr>
-          <p:cNvPr id="7" name="Espaço Reservado para Conteúdo 6" descr="Aluno e Pai.png"/>
+          <p:cNvPr id="8" name="Espaço Reservado para Conteúdo 7"/>
           <p:cNvPicPr>
             <a:picLocks noGrp="1" noChangeAspect="1"/>
           </p:cNvPicPr>
@@ -5632,88 +5744,51 @@
           </p:nvPr>
         </p:nvPicPr>
         <p:blipFill>
-          <a:blip r:embed="rId2"/>
+          <a:blip r:embed="rId2">
+            <a:extLst>
+              <a:ext uri="{28A0092B-C50C-407E-A947-70E740481C1C}">
+                <a14:useLocalDpi xmlns:a14="http://schemas.microsoft.com/office/drawing/2010/main" val="0"/>
+              </a:ext>
+            </a:extLst>
+          </a:blip>
           <a:stretch>
             <a:fillRect/>
           </a:stretch>
         </p:blipFill>
         <p:spPr>
           <a:xfrm>
-            <a:off x="1740940" y="1600200"/>
-            <a:ext cx="5662120" cy="4530725"/>
+            <a:off x="2915816" y="1510262"/>
+            <a:ext cx="5832648" cy="4603345"/>
           </a:xfrm>
         </p:spPr>
       </p:pic>
       <p:sp>
         <p:nvSpPr>
-          <p:cNvPr id="4" name="Espaço Reservado para Data 3"/>
-          <p:cNvSpPr>
-            <a:spLocks noGrp="1"/>
-          </p:cNvSpPr>
-          <p:nvPr>
-            <p:ph type="dt" sz="half" idx="10"/>
-          </p:nvPr>
-        </p:nvSpPr>
-        <p:spPr/>
-        <p:txBody>
-          <a:bodyPr/>
+          <p:cNvPr id="9" name="CaixaDeTexto 8"/>
+          <p:cNvSpPr txBox="1"/>
+          <p:nvPr/>
+        </p:nvSpPr>
+        <p:spPr>
+          <a:xfrm>
+            <a:off x="482657" y="1700808"/>
+            <a:ext cx="2082686" cy="369332"/>
+          </a:xfrm>
+          <a:prstGeom prst="rect">
+            <a:avLst/>
+          </a:prstGeom>
+          <a:noFill/>
+        </p:spPr>
+        <p:txBody>
+          <a:bodyPr wrap="none" rtlCol="0">
+            <a:spAutoFit/>
+          </a:bodyPr>
           <a:lstStyle/>
           <a:p>
             <a:r>
-              <a:rPr lang="pt-BR" dirty="0"/>
-              <a:t>17/05/2014</a:t>
-            </a:r>
-          </a:p>
-        </p:txBody>
-      </p:sp>
-      <p:sp>
-        <p:nvSpPr>
-          <p:cNvPr id="5" name="Espaço Reservado para Rodapé 4"/>
-          <p:cNvSpPr>
-            <a:spLocks noGrp="1"/>
-          </p:cNvSpPr>
-          <p:nvPr>
-            <p:ph type="ftr" sz="quarter" idx="11"/>
-          </p:nvPr>
-        </p:nvSpPr>
-        <p:spPr/>
-        <p:txBody>
-          <a:bodyPr/>
-          <a:lstStyle/>
-          <a:p>
-            <a:r>
-              <a:rPr lang="pt-BR" dirty="0" err="1" smtClean="0"/>
-              <a:t>Metrocamp</a:t>
-            </a:r>
-            <a:r>
               <a:rPr lang="pt-BR" dirty="0" smtClean="0"/>
-              <a:t> Faculdades TCM/3ADS</a:t>
+              <a:t>Atores Aluno e Pai</a:t>
             </a:r>
             <a:endParaRPr lang="pt-BR" dirty="0"/>
-          </a:p>
-        </p:txBody>
-      </p:sp>
-      <p:sp>
-        <p:nvSpPr>
-          <p:cNvPr id="6" name="Espaço Reservado para Número de Slide 5"/>
-          <p:cNvSpPr>
-            <a:spLocks noGrp="1"/>
-          </p:cNvSpPr>
-          <p:nvPr>
-            <p:ph type="sldNum" sz="quarter" idx="12"/>
-          </p:nvPr>
-        </p:nvSpPr>
-        <p:spPr/>
-        <p:txBody>
-          <a:bodyPr/>
-          <a:lstStyle/>
-          <a:p>
-            <a:fld id="{516476CB-12D4-456A-BCEE-8469A8C40045}" type="slidenum">
-              <a:rPr lang="pt-BR" smtClean="0"/>
-              <a:pPr/>
-              <a:t>4</a:t>
-            </a:fld>
-            <a:endParaRPr lang="pt-BR"/>
           </a:p>
         </p:txBody>
       </p:sp>
@@ -5762,7 +5837,12 @@
             <p:ph type="title"/>
           </p:nvPr>
         </p:nvSpPr>
-        <p:spPr/>
+        <p:spPr>
+          <a:xfrm>
+            <a:off x="457200" y="993793"/>
+            <a:ext cx="8229600" cy="975882"/>
+          </a:xfrm>
+        </p:spPr>
         <p:txBody>
           <a:bodyPr/>
           <a:lstStyle/>
@@ -5778,9 +5858,85 @@
           </a:p>
         </p:txBody>
       </p:sp>
+      <p:sp>
+        <p:nvSpPr>
+          <p:cNvPr id="4" name="Espaço Reservado para Data 3"/>
+          <p:cNvSpPr>
+            <a:spLocks noGrp="1"/>
+          </p:cNvSpPr>
+          <p:nvPr>
+            <p:ph type="dt" sz="half" idx="10"/>
+          </p:nvPr>
+        </p:nvSpPr>
+        <p:spPr/>
+        <p:txBody>
+          <a:bodyPr/>
+          <a:lstStyle/>
+          <a:p>
+            <a:r>
+              <a:rPr lang="pt-BR" dirty="0" smtClean="0"/>
+              <a:t>10/06/2014</a:t>
+            </a:r>
+            <a:endParaRPr lang="pt-BR" dirty="0"/>
+          </a:p>
+        </p:txBody>
+      </p:sp>
+      <p:sp>
+        <p:nvSpPr>
+          <p:cNvPr id="5" name="Espaço Reservado para Rodapé 4"/>
+          <p:cNvSpPr>
+            <a:spLocks noGrp="1"/>
+          </p:cNvSpPr>
+          <p:nvPr>
+            <p:ph type="ftr" sz="quarter" idx="11"/>
+          </p:nvPr>
+        </p:nvSpPr>
+        <p:spPr/>
+        <p:txBody>
+          <a:bodyPr/>
+          <a:lstStyle/>
+          <a:p>
+            <a:r>
+              <a:rPr lang="pt-BR" dirty="0" err="1" smtClean="0"/>
+              <a:t>Metrocamp</a:t>
+            </a:r>
+            <a:r>
+              <a:rPr lang="pt-BR" dirty="0" smtClean="0"/>
+              <a:t> Faculdades TCM/3ADS</a:t>
+            </a:r>
+          </a:p>
+          <a:p>
+            <a:endParaRPr lang="pt-BR" dirty="0"/>
+          </a:p>
+        </p:txBody>
+      </p:sp>
+      <p:sp>
+        <p:nvSpPr>
+          <p:cNvPr id="6" name="Espaço Reservado para Número de Slide 5"/>
+          <p:cNvSpPr>
+            <a:spLocks noGrp="1"/>
+          </p:cNvSpPr>
+          <p:nvPr>
+            <p:ph type="sldNum" sz="quarter" idx="12"/>
+          </p:nvPr>
+        </p:nvSpPr>
+        <p:spPr/>
+        <p:txBody>
+          <a:bodyPr/>
+          <a:lstStyle/>
+          <a:p>
+            <a:fld id="{516476CB-12D4-456A-BCEE-8469A8C40045}" type="slidenum">
+              <a:rPr lang="pt-BR" smtClean="0"/>
+              <a:pPr/>
+              <a:t>5</a:t>
+            </a:fld>
+            <a:endParaRPr lang="pt-BR"/>
+          </a:p>
+        </p:txBody>
+      </p:sp>
       <p:pic>
         <p:nvPicPr>
-          <p:cNvPr id="7" name="Espaço Reservado para Conteúdo 6" descr="Professor e Secretaria.png"/>
+          <p:cNvPr id="8" name="Espaço Reservado para Conteúdo 7"/>
           <p:cNvPicPr>
             <a:picLocks noGrp="1" noChangeAspect="1"/>
           </p:cNvPicPr>
@@ -5789,90 +5945,57 @@
           </p:nvPr>
         </p:nvPicPr>
         <p:blipFill>
-          <a:blip r:embed="rId2"/>
+          <a:blip r:embed="rId2">
+            <a:extLst>
+              <a:ext uri="{28A0092B-C50C-407E-A947-70E740481C1C}">
+                <a14:useLocalDpi xmlns:a14="http://schemas.microsoft.com/office/drawing/2010/main" val="0"/>
+              </a:ext>
+            </a:extLst>
+          </a:blip>
           <a:stretch>
             <a:fillRect/>
           </a:stretch>
         </p:blipFill>
         <p:spPr>
           <a:xfrm>
-            <a:off x="2013850" y="1600200"/>
-            <a:ext cx="5116300" cy="4530725"/>
+            <a:off x="3124200" y="1613594"/>
+            <a:ext cx="5400600" cy="4438849"/>
           </a:xfrm>
         </p:spPr>
       </p:pic>
       <p:sp>
         <p:nvSpPr>
-          <p:cNvPr id="4" name="Espaço Reservado para Data 3"/>
-          <p:cNvSpPr>
-            <a:spLocks noGrp="1"/>
-          </p:cNvSpPr>
-          <p:nvPr>
-            <p:ph type="dt" sz="half" idx="10"/>
-          </p:nvPr>
-        </p:nvSpPr>
-        <p:spPr/>
-        <p:txBody>
-          <a:bodyPr/>
+          <p:cNvPr id="9" name="CaixaDeTexto 8"/>
+          <p:cNvSpPr txBox="1"/>
+          <p:nvPr/>
+        </p:nvSpPr>
+        <p:spPr>
+          <a:xfrm>
+            <a:off x="457200" y="1613594"/>
+            <a:ext cx="2095445" cy="646331"/>
+          </a:xfrm>
+          <a:prstGeom prst="rect">
+            <a:avLst/>
+          </a:prstGeom>
+          <a:noFill/>
+        </p:spPr>
+        <p:txBody>
+          <a:bodyPr wrap="none" rtlCol="0">
+            <a:spAutoFit/>
+          </a:bodyPr>
           <a:lstStyle/>
           <a:p>
             <a:r>
-              <a:rPr lang="pt-BR" dirty="0"/>
-              <a:t>17/05/2014</a:t>
-            </a:r>
-          </a:p>
-        </p:txBody>
-      </p:sp>
-      <p:sp>
-        <p:nvSpPr>
-          <p:cNvPr id="5" name="Espaço Reservado para Rodapé 4"/>
-          <p:cNvSpPr>
-            <a:spLocks noGrp="1"/>
-          </p:cNvSpPr>
-          <p:nvPr>
-            <p:ph type="ftr" sz="quarter" idx="11"/>
-          </p:nvPr>
-        </p:nvSpPr>
-        <p:spPr/>
-        <p:txBody>
-          <a:bodyPr/>
-          <a:lstStyle/>
-          <a:p>
-            <a:r>
-              <a:rPr lang="pt-BR" dirty="0" err="1" smtClean="0"/>
-              <a:t>Metrocamp</a:t>
-            </a:r>
-            <a:r>
               <a:rPr lang="pt-BR" dirty="0" smtClean="0"/>
-              <a:t> Faculdades TCM/3ADS</a:t>
-            </a:r>
-          </a:p>
-          <a:p>
+              <a:t>Atores Professor e</a:t>
+            </a:r>
+          </a:p>
+          <a:p>
+            <a:r>
+              <a:rPr lang="pt-BR" dirty="0" smtClean="0"/>
+              <a:t>Secretária</a:t>
+            </a:r>
             <a:endParaRPr lang="pt-BR" dirty="0"/>
-          </a:p>
-        </p:txBody>
-      </p:sp>
-      <p:sp>
-        <p:nvSpPr>
-          <p:cNvPr id="6" name="Espaço Reservado para Número de Slide 5"/>
-          <p:cNvSpPr>
-            <a:spLocks noGrp="1"/>
-          </p:cNvSpPr>
-          <p:nvPr>
-            <p:ph type="sldNum" sz="quarter" idx="12"/>
-          </p:nvPr>
-        </p:nvSpPr>
-        <p:spPr/>
-        <p:txBody>
-          <a:bodyPr/>
-          <a:lstStyle/>
-          <a:p>
-            <a:fld id="{516476CB-12D4-456A-BCEE-8469A8C40045}" type="slidenum">
-              <a:rPr lang="pt-BR" smtClean="0"/>
-              <a:pPr/>
-              <a:t>5</a:t>
-            </a:fld>
-            <a:endParaRPr lang="pt-BR"/>
           </a:p>
         </p:txBody>
       </p:sp>
@@ -5921,7 +6044,12 @@
             <p:ph type="title"/>
           </p:nvPr>
         </p:nvSpPr>
-        <p:spPr/>
+        <p:spPr>
+          <a:xfrm>
+            <a:off x="392832" y="726513"/>
+            <a:ext cx="8229600" cy="1139825"/>
+          </a:xfrm>
+        </p:spPr>
         <p:txBody>
           <a:bodyPr/>
           <a:lstStyle/>
@@ -5937,9 +6065,90 @@
           </a:p>
         </p:txBody>
       </p:sp>
+      <p:sp>
+        <p:nvSpPr>
+          <p:cNvPr id="4" name="Espaço Reservado para Data 3"/>
+          <p:cNvSpPr>
+            <a:spLocks noGrp="1"/>
+          </p:cNvSpPr>
+          <p:nvPr>
+            <p:ph type="dt" sz="half" idx="10"/>
+          </p:nvPr>
+        </p:nvSpPr>
+        <p:spPr/>
+        <p:txBody>
+          <a:bodyPr/>
+          <a:lstStyle/>
+          <a:p>
+            <a:r>
+              <a:rPr lang="pt-BR" dirty="0" smtClean="0"/>
+              <a:t>10/06/2014</a:t>
+            </a:r>
+            <a:endParaRPr lang="pt-BR" dirty="0"/>
+          </a:p>
+        </p:txBody>
+      </p:sp>
+      <p:sp>
+        <p:nvSpPr>
+          <p:cNvPr id="5" name="Espaço Reservado para Rodapé 4"/>
+          <p:cNvSpPr>
+            <a:spLocks noGrp="1"/>
+          </p:cNvSpPr>
+          <p:nvPr>
+            <p:ph type="ftr" sz="quarter" idx="11"/>
+          </p:nvPr>
+        </p:nvSpPr>
+        <p:spPr>
+          <a:xfrm>
+            <a:off x="3059832" y="6237312"/>
+            <a:ext cx="2895600" cy="457200"/>
+          </a:xfrm>
+        </p:spPr>
+        <p:txBody>
+          <a:bodyPr/>
+          <a:lstStyle/>
+          <a:p>
+            <a:r>
+              <a:rPr lang="pt-BR" dirty="0" err="1" smtClean="0"/>
+              <a:t>Metrocamp</a:t>
+            </a:r>
+            <a:r>
+              <a:rPr lang="pt-BR" dirty="0" smtClean="0"/>
+              <a:t> Faculdades TCM/3ADS</a:t>
+            </a:r>
+          </a:p>
+          <a:p>
+            <a:endParaRPr lang="pt-BR" dirty="0"/>
+          </a:p>
+        </p:txBody>
+      </p:sp>
+      <p:sp>
+        <p:nvSpPr>
+          <p:cNvPr id="6" name="Espaço Reservado para Número de Slide 5"/>
+          <p:cNvSpPr>
+            <a:spLocks noGrp="1"/>
+          </p:cNvSpPr>
+          <p:nvPr>
+            <p:ph type="sldNum" sz="quarter" idx="12"/>
+          </p:nvPr>
+        </p:nvSpPr>
+        <p:spPr/>
+        <p:txBody>
+          <a:bodyPr/>
+          <a:lstStyle/>
+          <a:p>
+            <a:fld id="{516476CB-12D4-456A-BCEE-8469A8C40045}" type="slidenum">
+              <a:rPr lang="pt-BR" smtClean="0"/>
+              <a:pPr/>
+              <a:t>6</a:t>
+            </a:fld>
+            <a:endParaRPr lang="pt-BR"/>
+          </a:p>
+        </p:txBody>
+      </p:sp>
       <p:pic>
         <p:nvPicPr>
-          <p:cNvPr id="7" name="Espaço Reservado para Conteúdo 6" descr="Gestor.png"/>
+          <p:cNvPr id="8" name="Espaço Reservado para Conteúdo 7"/>
           <p:cNvPicPr>
             <a:picLocks noGrp="1" noChangeAspect="1"/>
           </p:cNvPicPr>
@@ -5948,95 +6157,51 @@
           </p:nvPr>
         </p:nvPicPr>
         <p:blipFill>
-          <a:blip r:embed="rId2"/>
+          <a:blip r:embed="rId2">
+            <a:extLst>
+              <a:ext uri="{28A0092B-C50C-407E-A947-70E740481C1C}">
+                <a14:useLocalDpi xmlns:a14="http://schemas.microsoft.com/office/drawing/2010/main" val="0"/>
+              </a:ext>
+            </a:extLst>
+          </a:blip>
           <a:stretch>
             <a:fillRect/>
           </a:stretch>
         </p:blipFill>
         <p:spPr>
           <a:xfrm>
-            <a:off x="2013850" y="1600200"/>
-            <a:ext cx="5116300" cy="4530725"/>
+            <a:off x="2843808" y="1640467"/>
+            <a:ext cx="5520442" cy="4362929"/>
           </a:xfrm>
         </p:spPr>
       </p:pic>
       <p:sp>
         <p:nvSpPr>
-          <p:cNvPr id="4" name="Espaço Reservado para Data 3"/>
-          <p:cNvSpPr>
-            <a:spLocks noGrp="1"/>
-          </p:cNvSpPr>
-          <p:nvPr>
-            <p:ph type="dt" sz="half" idx="10"/>
-          </p:nvPr>
-        </p:nvSpPr>
-        <p:spPr/>
-        <p:txBody>
-          <a:bodyPr/>
-          <a:lstStyle/>
-          <a:p>
-            <a:r>
-              <a:rPr lang="pt-BR" dirty="0"/>
-              <a:t>17/05/2014</a:t>
-            </a:r>
-          </a:p>
-        </p:txBody>
-      </p:sp>
-      <p:sp>
-        <p:nvSpPr>
-          <p:cNvPr id="5" name="Espaço Reservado para Rodapé 4"/>
-          <p:cNvSpPr>
-            <a:spLocks noGrp="1"/>
-          </p:cNvSpPr>
-          <p:nvPr>
-            <p:ph type="ftr" sz="quarter" idx="11"/>
-          </p:nvPr>
+          <p:cNvPr id="10" name="CaixaDeTexto 9"/>
+          <p:cNvSpPr txBox="1"/>
+          <p:nvPr/>
         </p:nvSpPr>
         <p:spPr>
           <a:xfrm>
-            <a:off x="3059832" y="6237312"/>
-            <a:ext cx="2895600" cy="457200"/>
+            <a:off x="683568" y="1988840"/>
+            <a:ext cx="1364476" cy="369332"/>
           </a:xfrm>
+          <a:prstGeom prst="rect">
+            <a:avLst/>
+          </a:prstGeom>
+          <a:noFill/>
         </p:spPr>
         <p:txBody>
-          <a:bodyPr/>
+          <a:bodyPr wrap="none" rtlCol="0">
+            <a:spAutoFit/>
+          </a:bodyPr>
           <a:lstStyle/>
           <a:p>
             <a:r>
-              <a:rPr lang="pt-BR" dirty="0" err="1" smtClean="0"/>
-              <a:t>Metrocamp</a:t>
-            </a:r>
-            <a:r>
               <a:rPr lang="pt-BR" dirty="0" smtClean="0"/>
-              <a:t> Faculdades TCM/3ADS</a:t>
-            </a:r>
-          </a:p>
-          <a:p>
+              <a:t>Ator Gestor</a:t>
+            </a:r>
             <a:endParaRPr lang="pt-BR" dirty="0"/>
-          </a:p>
-        </p:txBody>
-      </p:sp>
-      <p:sp>
-        <p:nvSpPr>
-          <p:cNvPr id="6" name="Espaço Reservado para Número de Slide 5"/>
-          <p:cNvSpPr>
-            <a:spLocks noGrp="1"/>
-          </p:cNvSpPr>
-          <p:nvPr>
-            <p:ph type="sldNum" sz="quarter" idx="12"/>
-          </p:nvPr>
-        </p:nvSpPr>
-        <p:spPr/>
-        <p:txBody>
-          <a:bodyPr/>
-          <a:lstStyle/>
-          <a:p>
-            <a:fld id="{516476CB-12D4-456A-BCEE-8469A8C40045}" type="slidenum">
-              <a:rPr lang="pt-BR" smtClean="0"/>
-              <a:pPr/>
-              <a:t>6</a:t>
-            </a:fld>
-            <a:endParaRPr lang="pt-BR"/>
           </a:p>
         </p:txBody>
       </p:sp>
@@ -6101,12 +6266,12 @@
       </p:sp>
       <p:sp>
         <p:nvSpPr>
-          <p:cNvPr id="3" name="Espaço Reservado para Conteúdo 2"/>
-          <p:cNvSpPr>
-            <a:spLocks noGrp="1"/>
-          </p:cNvSpPr>
-          <p:nvPr>
-            <p:ph idx="1"/>
+          <p:cNvPr id="4" name="Espaço Reservado para Data 3"/>
+          <p:cNvSpPr>
+            <a:spLocks noGrp="1"/>
+          </p:cNvSpPr>
+          <p:nvPr>
+            <p:ph type="dt" sz="half" idx="10"/>
           </p:nvPr>
         </p:nvSpPr>
         <p:spPr/>
@@ -6114,63 +6279,11 @@
           <a:bodyPr/>
           <a:lstStyle/>
           <a:p>
-            <a:pPr>
-              <a:buNone/>
-            </a:pPr>
-            <a:r>
-              <a:rPr lang="pt-BR" sz="2400" dirty="0" smtClean="0"/>
-              <a:t>    O objetivo principal do sistema que é permitir acompanhamento melhor dos pais/responsáveis na vida escolar de seus filhos do ensino fundamental.</a:t>
-            </a:r>
-          </a:p>
-          <a:p>
-            <a:pPr>
-              <a:buNone/>
-            </a:pPr>
-            <a:r>
-              <a:rPr lang="pt-BR" sz="2400" dirty="0" smtClean="0"/>
-              <a:t>    O sistema programará os casos de uso de ocorrências e tarefas, com informações registradas por dia, para consultas e inserção diária de informações. </a:t>
-            </a:r>
-          </a:p>
-          <a:p>
-            <a:pPr>
-              <a:buNone/>
-            </a:pPr>
-            <a:r>
-              <a:rPr lang="pt-BR" sz="2400" dirty="0" smtClean="0"/>
-              <a:t>	No entanto, há necessidade da estruturação das turmas de uma escola, com o cadastro de professores e alunos e suas turmas, e ainda outro banco de dados com os boletins bimestrais para notas e faltas. </a:t>
-            </a:r>
-          </a:p>
-          <a:p>
-            <a:pPr>
-              <a:buNone/>
-            </a:pPr>
-            <a:r>
-              <a:rPr lang="pt-BR" sz="2400" dirty="0" smtClean="0"/>
-              <a:t>    </a:t>
+            <a:r>
+              <a:rPr lang="pt-BR" dirty="0" smtClean="0"/>
+              <a:t>10/06/2014</a:t>
             </a:r>
             <a:endParaRPr lang="pt-BR" dirty="0"/>
-          </a:p>
-        </p:txBody>
-      </p:sp>
-      <p:sp>
-        <p:nvSpPr>
-          <p:cNvPr id="4" name="Espaço Reservado para Data 3"/>
-          <p:cNvSpPr>
-            <a:spLocks noGrp="1"/>
-          </p:cNvSpPr>
-          <p:nvPr>
-            <p:ph type="dt" sz="half" idx="10"/>
-          </p:nvPr>
-        </p:nvSpPr>
-        <p:spPr/>
-        <p:txBody>
-          <a:bodyPr/>
-          <a:lstStyle/>
-          <a:p>
-            <a:r>
-              <a:rPr lang="pt-BR" dirty="0"/>
-              <a:t>17/05/2014</a:t>
-            </a:r>
           </a:p>
         </p:txBody>
       </p:sp>
@@ -6224,6 +6337,1468 @@
           </a:p>
         </p:txBody>
       </p:sp>
+      <p:graphicFrame>
+        <p:nvGraphicFramePr>
+          <p:cNvPr id="13" name="Espaço Reservado para Conteúdo 12"/>
+          <p:cNvGraphicFramePr>
+            <a:graphicFrameLocks noGrp="1"/>
+          </p:cNvGraphicFramePr>
+          <p:nvPr>
+            <p:ph idx="1"/>
+            <p:extLst>
+              <p:ext uri="{D42A27DB-BD31-4B8C-83A1-F6EECF244321}">
+                <p14:modId xmlns:p14="http://schemas.microsoft.com/office/powerpoint/2010/main" val="173213281"/>
+              </p:ext>
+            </p:extLst>
+          </p:nvPr>
+        </p:nvGraphicFramePr>
+        <p:xfrm>
+          <a:off x="827584" y="1628800"/>
+          <a:ext cx="7416824" cy="4464495"/>
+        </p:xfrm>
+        <a:graphic>
+          <a:graphicData uri="http://schemas.openxmlformats.org/drawingml/2006/table">
+            <a:tbl>
+              <a:tblPr firstRow="1" firstCol="1" bandRow="1"/>
+              <a:tblGrid>
+                <a:gridCol w="2108705"/>
+                <a:gridCol w="5308119"/>
+              </a:tblGrid>
+              <a:tr h="445882">
+                <a:tc>
+                  <a:txBody>
+                    <a:bodyPr/>
+                    <a:lstStyle/>
+                    <a:p>
+                      <a:pPr algn="just">
+                        <a:lnSpc>
+                          <a:spcPct val="150000"/>
+                        </a:lnSpc>
+                        <a:spcAft>
+                          <a:spcPts val="0"/>
+                        </a:spcAft>
+                      </a:pPr>
+                      <a:r>
+                        <a:rPr lang="pt-BR" sz="1800" dirty="0">
+                          <a:solidFill>
+                            <a:schemeClr val="bg1"/>
+                          </a:solidFill>
+                          <a:effectLst/>
+                          <a:latin typeface="Times New Roman" panose="02020603050405020304" pitchFamily="18" charset="0"/>
+                          <a:ea typeface="Times New Roman" panose="02020603050405020304" pitchFamily="18" charset="0"/>
+                        </a:rPr>
+                        <a:t>Caso de Uso</a:t>
+                      </a:r>
+                    </a:p>
+                  </a:txBody>
+                  <a:tcPr marL="68580" marR="68580" marT="0" marB="0">
+                    <a:lnL w="12700" cap="flat" cmpd="sng" algn="ctr">
+                      <a:solidFill>
+                        <a:srgbClr val="000000"/>
+                      </a:solidFill>
+                      <a:prstDash val="solid"/>
+                      <a:round/>
+                      <a:headEnd type="none" w="med" len="med"/>
+                      <a:tailEnd type="none" w="med" len="med"/>
+                    </a:lnL>
+                    <a:lnR w="12700" cap="flat" cmpd="sng" algn="ctr">
+                      <a:solidFill>
+                        <a:srgbClr val="000000"/>
+                      </a:solidFill>
+                      <a:prstDash val="solid"/>
+                      <a:round/>
+                      <a:headEnd type="none" w="med" len="med"/>
+                      <a:tailEnd type="none" w="med" len="med"/>
+                    </a:lnR>
+                    <a:lnT w="12700" cap="flat" cmpd="sng" algn="ctr">
+                      <a:solidFill>
+                        <a:srgbClr val="000000"/>
+                      </a:solidFill>
+                      <a:prstDash val="solid"/>
+                      <a:round/>
+                      <a:headEnd type="none" w="med" len="med"/>
+                      <a:tailEnd type="none" w="med" len="med"/>
+                    </a:lnT>
+                    <a:lnB w="12700" cap="flat" cmpd="sng" algn="ctr">
+                      <a:solidFill>
+                        <a:srgbClr val="000000"/>
+                      </a:solidFill>
+                      <a:prstDash val="solid"/>
+                      <a:round/>
+                      <a:headEnd type="none" w="med" len="med"/>
+                      <a:tailEnd type="none" w="med" len="med"/>
+                    </a:lnB>
+                    <a:solidFill>
+                      <a:srgbClr val="000000"/>
+                    </a:solidFill>
+                  </a:tcPr>
+                </a:tc>
+                <a:tc>
+                  <a:txBody>
+                    <a:bodyPr/>
+                    <a:lstStyle/>
+                    <a:p>
+                      <a:pPr algn="just">
+                        <a:lnSpc>
+                          <a:spcPct val="150000"/>
+                        </a:lnSpc>
+                        <a:spcAft>
+                          <a:spcPts val="0"/>
+                        </a:spcAft>
+                      </a:pPr>
+                      <a:r>
+                        <a:rPr lang="pt-BR" sz="1800" dirty="0">
+                          <a:solidFill>
+                            <a:schemeClr val="bg1"/>
+                          </a:solidFill>
+                          <a:effectLst/>
+                          <a:latin typeface="Times New Roman" panose="02020603050405020304" pitchFamily="18" charset="0"/>
+                          <a:ea typeface="Times New Roman" panose="02020603050405020304" pitchFamily="18" charset="0"/>
+                        </a:rPr>
+                        <a:t>Razão da Escolha </a:t>
+                      </a:r>
+                    </a:p>
+                  </a:txBody>
+                  <a:tcPr marL="68580" marR="68580" marT="0" marB="0">
+                    <a:lnL w="12700" cap="flat" cmpd="sng" algn="ctr">
+                      <a:solidFill>
+                        <a:srgbClr val="000000"/>
+                      </a:solidFill>
+                      <a:prstDash val="solid"/>
+                      <a:round/>
+                      <a:headEnd type="none" w="med" len="med"/>
+                      <a:tailEnd type="none" w="med" len="med"/>
+                    </a:lnL>
+                    <a:lnR w="12700" cap="flat" cmpd="sng" algn="ctr">
+                      <a:solidFill>
+                        <a:srgbClr val="000000"/>
+                      </a:solidFill>
+                      <a:prstDash val="solid"/>
+                      <a:round/>
+                      <a:headEnd type="none" w="med" len="med"/>
+                      <a:tailEnd type="none" w="med" len="med"/>
+                    </a:lnR>
+                    <a:lnT w="12700" cap="flat" cmpd="sng" algn="ctr">
+                      <a:solidFill>
+                        <a:srgbClr val="000000"/>
+                      </a:solidFill>
+                      <a:prstDash val="solid"/>
+                      <a:round/>
+                      <a:headEnd type="none" w="med" len="med"/>
+                      <a:tailEnd type="none" w="med" len="med"/>
+                    </a:lnT>
+                    <a:lnB w="12700" cap="flat" cmpd="sng" algn="ctr">
+                      <a:solidFill>
+                        <a:srgbClr val="000000"/>
+                      </a:solidFill>
+                      <a:prstDash val="solid"/>
+                      <a:round/>
+                      <a:headEnd type="none" w="med" len="med"/>
+                      <a:tailEnd type="none" w="med" len="med"/>
+                    </a:lnB>
+                    <a:solidFill>
+                      <a:srgbClr val="000000"/>
+                    </a:solidFill>
+                  </a:tcPr>
+                </a:tc>
+              </a:tr>
+              <a:tr h="445882">
+                <a:tc>
+                  <a:txBody>
+                    <a:bodyPr/>
+                    <a:lstStyle/>
+                    <a:p>
+                      <a:pPr algn="just">
+                        <a:lnSpc>
+                          <a:spcPct val="150000"/>
+                        </a:lnSpc>
+                        <a:spcAft>
+                          <a:spcPts val="0"/>
+                        </a:spcAft>
+                      </a:pPr>
+                      <a:r>
+                        <a:rPr lang="pt-BR" sz="1600" dirty="0" smtClean="0">
+                          <a:effectLst/>
+                          <a:latin typeface="Times New Roman" panose="02020603050405020304" pitchFamily="18" charset="0"/>
+                          <a:ea typeface="Times New Roman" panose="02020603050405020304" pitchFamily="18" charset="0"/>
+                        </a:rPr>
+                        <a:t>Cadastrar Ocorrência</a:t>
+                      </a:r>
+                      <a:endParaRPr lang="pt-BR" sz="1600" dirty="0">
+                        <a:effectLst/>
+                        <a:latin typeface="Times New Roman" panose="02020603050405020304" pitchFamily="18" charset="0"/>
+                        <a:ea typeface="Times New Roman" panose="02020603050405020304" pitchFamily="18" charset="0"/>
+                      </a:endParaRPr>
+                    </a:p>
+                  </a:txBody>
+                  <a:tcPr marL="68580" marR="68580" marT="0" marB="0">
+                    <a:lnL w="12700" cap="flat" cmpd="sng" algn="ctr">
+                      <a:solidFill>
+                        <a:srgbClr val="000000"/>
+                      </a:solidFill>
+                      <a:prstDash val="solid"/>
+                      <a:round/>
+                      <a:headEnd type="none" w="med" len="med"/>
+                      <a:tailEnd type="none" w="med" len="med"/>
+                    </a:lnL>
+                    <a:lnR w="12700" cap="flat" cmpd="sng" algn="ctr">
+                      <a:solidFill>
+                        <a:srgbClr val="000000"/>
+                      </a:solidFill>
+                      <a:prstDash val="solid"/>
+                      <a:round/>
+                      <a:headEnd type="none" w="med" len="med"/>
+                      <a:tailEnd type="none" w="med" len="med"/>
+                    </a:lnR>
+                    <a:lnT w="12700" cap="flat" cmpd="sng" algn="ctr">
+                      <a:solidFill>
+                        <a:srgbClr val="000000"/>
+                      </a:solidFill>
+                      <a:prstDash val="solid"/>
+                      <a:round/>
+                      <a:headEnd type="none" w="med" len="med"/>
+                      <a:tailEnd type="none" w="med" len="med"/>
+                    </a:lnT>
+                    <a:lnB w="12700" cap="flat" cmpd="sng" algn="ctr">
+                      <a:solidFill>
+                        <a:srgbClr val="000000"/>
+                      </a:solidFill>
+                      <a:prstDash val="solid"/>
+                      <a:round/>
+                      <a:headEnd type="none" w="med" len="med"/>
+                      <a:tailEnd type="none" w="med" len="med"/>
+                    </a:lnB>
+                  </a:tcPr>
+                </a:tc>
+                <a:tc>
+                  <a:txBody>
+                    <a:bodyPr/>
+                    <a:lstStyle/>
+                    <a:p>
+                      <a:pPr algn="just">
+                        <a:lnSpc>
+                          <a:spcPct val="150000"/>
+                        </a:lnSpc>
+                        <a:spcAft>
+                          <a:spcPts val="0"/>
+                        </a:spcAft>
+                      </a:pPr>
+                      <a:r>
+                        <a:rPr lang="pt-BR" sz="1600" dirty="0">
+                          <a:effectLst/>
+                          <a:latin typeface="Times New Roman" panose="02020603050405020304" pitchFamily="18" charset="0"/>
+                          <a:ea typeface="Times New Roman" panose="02020603050405020304" pitchFamily="18" charset="0"/>
+                        </a:rPr>
+                        <a:t>Atende necessidade de inserir informações </a:t>
+                      </a:r>
+                      <a:r>
+                        <a:rPr lang="pt-BR" sz="1600" dirty="0" smtClean="0">
+                          <a:effectLst/>
+                          <a:latin typeface="Times New Roman" panose="02020603050405020304" pitchFamily="18" charset="0"/>
+                          <a:ea typeface="Times New Roman" panose="02020603050405020304" pitchFamily="18" charset="0"/>
+                        </a:rPr>
+                        <a:t>das ocorrências.</a:t>
+                      </a:r>
+                      <a:endParaRPr lang="pt-BR" sz="1600" dirty="0">
+                        <a:effectLst/>
+                        <a:latin typeface="Times New Roman" panose="02020603050405020304" pitchFamily="18" charset="0"/>
+                        <a:ea typeface="Times New Roman" panose="02020603050405020304" pitchFamily="18" charset="0"/>
+                      </a:endParaRPr>
+                    </a:p>
+                  </a:txBody>
+                  <a:tcPr marL="68580" marR="68580" marT="0" marB="0">
+                    <a:lnL w="12700" cap="flat" cmpd="sng" algn="ctr">
+                      <a:solidFill>
+                        <a:srgbClr val="000000"/>
+                      </a:solidFill>
+                      <a:prstDash val="solid"/>
+                      <a:round/>
+                      <a:headEnd type="none" w="med" len="med"/>
+                      <a:tailEnd type="none" w="med" len="med"/>
+                    </a:lnL>
+                    <a:lnR w="12700" cap="flat" cmpd="sng" algn="ctr">
+                      <a:solidFill>
+                        <a:srgbClr val="000000"/>
+                      </a:solidFill>
+                      <a:prstDash val="solid"/>
+                      <a:round/>
+                      <a:headEnd type="none" w="med" len="med"/>
+                      <a:tailEnd type="none" w="med" len="med"/>
+                    </a:lnR>
+                    <a:lnT w="12700" cap="flat" cmpd="sng" algn="ctr">
+                      <a:solidFill>
+                        <a:srgbClr val="000000"/>
+                      </a:solidFill>
+                      <a:prstDash val="solid"/>
+                      <a:round/>
+                      <a:headEnd type="none" w="med" len="med"/>
+                      <a:tailEnd type="none" w="med" len="med"/>
+                    </a:lnT>
+                    <a:lnB w="12700" cap="flat" cmpd="sng" algn="ctr">
+                      <a:solidFill>
+                        <a:srgbClr val="000000"/>
+                      </a:solidFill>
+                      <a:prstDash val="solid"/>
+                      <a:round/>
+                      <a:headEnd type="none" w="med" len="med"/>
+                      <a:tailEnd type="none" w="med" len="med"/>
+                    </a:lnB>
+                  </a:tcPr>
+                </a:tc>
+              </a:tr>
+              <a:tr h="462838">
+                <a:tc>
+                  <a:txBody>
+                    <a:bodyPr/>
+                    <a:lstStyle/>
+                    <a:p>
+                      <a:pPr algn="just">
+                        <a:lnSpc>
+                          <a:spcPct val="150000"/>
+                        </a:lnSpc>
+                        <a:spcAft>
+                          <a:spcPts val="0"/>
+                        </a:spcAft>
+                      </a:pPr>
+                      <a:r>
+                        <a:rPr lang="pt-BR" sz="1600" dirty="0">
+                          <a:effectLst/>
+                          <a:latin typeface="Times New Roman" panose="02020603050405020304" pitchFamily="18" charset="0"/>
+                          <a:ea typeface="Times New Roman" panose="02020603050405020304" pitchFamily="18" charset="0"/>
+                        </a:rPr>
+                        <a:t>Editar Ocorrência</a:t>
+                      </a:r>
+                    </a:p>
+                  </a:txBody>
+                  <a:tcPr marL="68580" marR="68580" marT="0" marB="0">
+                    <a:lnL w="12700" cap="flat" cmpd="sng" algn="ctr">
+                      <a:solidFill>
+                        <a:srgbClr val="000000"/>
+                      </a:solidFill>
+                      <a:prstDash val="solid"/>
+                      <a:round/>
+                      <a:headEnd type="none" w="med" len="med"/>
+                      <a:tailEnd type="none" w="med" len="med"/>
+                    </a:lnL>
+                    <a:lnR w="12700" cap="flat" cmpd="sng" algn="ctr">
+                      <a:solidFill>
+                        <a:srgbClr val="000000"/>
+                      </a:solidFill>
+                      <a:prstDash val="solid"/>
+                      <a:round/>
+                      <a:headEnd type="none" w="med" len="med"/>
+                      <a:tailEnd type="none" w="med" len="med"/>
+                    </a:lnR>
+                    <a:lnT w="12700" cap="flat" cmpd="sng" algn="ctr">
+                      <a:solidFill>
+                        <a:srgbClr val="000000"/>
+                      </a:solidFill>
+                      <a:prstDash val="solid"/>
+                      <a:round/>
+                      <a:headEnd type="none" w="med" len="med"/>
+                      <a:tailEnd type="none" w="med" len="med"/>
+                    </a:lnT>
+                    <a:lnB w="12700" cap="flat" cmpd="sng" algn="ctr">
+                      <a:solidFill>
+                        <a:srgbClr val="000000"/>
+                      </a:solidFill>
+                      <a:prstDash val="solid"/>
+                      <a:round/>
+                      <a:headEnd type="none" w="med" len="med"/>
+                      <a:tailEnd type="none" w="med" len="med"/>
+                    </a:lnB>
+                  </a:tcPr>
+                </a:tc>
+                <a:tc>
+                  <a:txBody>
+                    <a:bodyPr/>
+                    <a:lstStyle/>
+                    <a:p>
+                      <a:pPr algn="just">
+                        <a:lnSpc>
+                          <a:spcPct val="150000"/>
+                        </a:lnSpc>
+                        <a:spcAft>
+                          <a:spcPts val="0"/>
+                        </a:spcAft>
+                      </a:pPr>
+                      <a:r>
+                        <a:rPr lang="pt-BR" sz="1600" dirty="0">
+                          <a:effectLst/>
+                          <a:latin typeface="Times New Roman" panose="02020603050405020304" pitchFamily="18" charset="0"/>
+                          <a:ea typeface="Times New Roman" panose="02020603050405020304" pitchFamily="18" charset="0"/>
+                        </a:rPr>
+                        <a:t>Atende necessidade de editar informações </a:t>
+                      </a:r>
+                      <a:r>
+                        <a:rPr lang="pt-BR" sz="1600" dirty="0" smtClean="0">
+                          <a:effectLst/>
+                          <a:latin typeface="Times New Roman" panose="02020603050405020304" pitchFamily="18" charset="0"/>
+                          <a:ea typeface="Times New Roman" panose="02020603050405020304" pitchFamily="18" charset="0"/>
+                        </a:rPr>
+                        <a:t>das ocorrências.</a:t>
+                      </a:r>
+                      <a:endParaRPr lang="pt-BR" sz="1600" dirty="0">
+                        <a:effectLst/>
+                        <a:latin typeface="Times New Roman" panose="02020603050405020304" pitchFamily="18" charset="0"/>
+                        <a:ea typeface="Times New Roman" panose="02020603050405020304" pitchFamily="18" charset="0"/>
+                      </a:endParaRPr>
+                    </a:p>
+                  </a:txBody>
+                  <a:tcPr marL="68580" marR="68580" marT="0" marB="0">
+                    <a:lnL w="12700" cap="flat" cmpd="sng" algn="ctr">
+                      <a:solidFill>
+                        <a:srgbClr val="000000"/>
+                      </a:solidFill>
+                      <a:prstDash val="solid"/>
+                      <a:round/>
+                      <a:headEnd type="none" w="med" len="med"/>
+                      <a:tailEnd type="none" w="med" len="med"/>
+                    </a:lnL>
+                    <a:lnR w="12700" cap="flat" cmpd="sng" algn="ctr">
+                      <a:solidFill>
+                        <a:srgbClr val="000000"/>
+                      </a:solidFill>
+                      <a:prstDash val="solid"/>
+                      <a:round/>
+                      <a:headEnd type="none" w="med" len="med"/>
+                      <a:tailEnd type="none" w="med" len="med"/>
+                    </a:lnR>
+                    <a:lnT w="12700" cap="flat" cmpd="sng" algn="ctr">
+                      <a:solidFill>
+                        <a:srgbClr val="000000"/>
+                      </a:solidFill>
+                      <a:prstDash val="solid"/>
+                      <a:round/>
+                      <a:headEnd type="none" w="med" len="med"/>
+                      <a:tailEnd type="none" w="med" len="med"/>
+                    </a:lnT>
+                    <a:lnB w="12700" cap="flat" cmpd="sng" algn="ctr">
+                      <a:solidFill>
+                        <a:srgbClr val="000000"/>
+                      </a:solidFill>
+                      <a:prstDash val="solid"/>
+                      <a:round/>
+                      <a:headEnd type="none" w="med" len="med"/>
+                      <a:tailEnd type="none" w="med" len="med"/>
+                    </a:lnB>
+                  </a:tcPr>
+                </a:tc>
+              </a:tr>
+              <a:tr h="445882">
+                <a:tc>
+                  <a:txBody>
+                    <a:bodyPr/>
+                    <a:lstStyle/>
+                    <a:p>
+                      <a:pPr algn="just">
+                        <a:lnSpc>
+                          <a:spcPct val="150000"/>
+                        </a:lnSpc>
+                        <a:spcAft>
+                          <a:spcPts val="0"/>
+                        </a:spcAft>
+                      </a:pPr>
+                      <a:r>
+                        <a:rPr lang="pt-BR" sz="1600" dirty="0" smtClean="0">
+                          <a:effectLst/>
+                          <a:latin typeface="Times New Roman" panose="02020603050405020304" pitchFamily="18" charset="0"/>
+                          <a:ea typeface="Times New Roman" panose="02020603050405020304" pitchFamily="18" charset="0"/>
+                        </a:rPr>
+                        <a:t>Consultar</a:t>
+                      </a:r>
+                      <a:r>
+                        <a:rPr lang="pt-BR" sz="1600" baseline="0" dirty="0" smtClean="0">
+                          <a:effectLst/>
+                          <a:latin typeface="Times New Roman" panose="02020603050405020304" pitchFamily="18" charset="0"/>
+                          <a:ea typeface="Times New Roman" panose="02020603050405020304" pitchFamily="18" charset="0"/>
+                        </a:rPr>
+                        <a:t> </a:t>
+                      </a:r>
+                      <a:r>
+                        <a:rPr lang="pt-BR" sz="1600" dirty="0" smtClean="0">
+                          <a:effectLst/>
+                          <a:latin typeface="Times New Roman" panose="02020603050405020304" pitchFamily="18" charset="0"/>
+                          <a:ea typeface="Times New Roman" panose="02020603050405020304" pitchFamily="18" charset="0"/>
+                        </a:rPr>
+                        <a:t>Ocorrência</a:t>
+                      </a:r>
+                      <a:endParaRPr lang="pt-BR" sz="1600" dirty="0">
+                        <a:effectLst/>
+                        <a:latin typeface="Times New Roman" panose="02020603050405020304" pitchFamily="18" charset="0"/>
+                        <a:ea typeface="Times New Roman" panose="02020603050405020304" pitchFamily="18" charset="0"/>
+                      </a:endParaRPr>
+                    </a:p>
+                  </a:txBody>
+                  <a:tcPr marL="68580" marR="68580" marT="0" marB="0">
+                    <a:lnL w="12700" cap="flat" cmpd="sng" algn="ctr">
+                      <a:solidFill>
+                        <a:srgbClr val="000000"/>
+                      </a:solidFill>
+                      <a:prstDash val="solid"/>
+                      <a:round/>
+                      <a:headEnd type="none" w="med" len="med"/>
+                      <a:tailEnd type="none" w="med" len="med"/>
+                    </a:lnL>
+                    <a:lnR w="12700" cap="flat" cmpd="sng" algn="ctr">
+                      <a:solidFill>
+                        <a:srgbClr val="000000"/>
+                      </a:solidFill>
+                      <a:prstDash val="solid"/>
+                      <a:round/>
+                      <a:headEnd type="none" w="med" len="med"/>
+                      <a:tailEnd type="none" w="med" len="med"/>
+                    </a:lnR>
+                    <a:lnT w="12700" cap="flat" cmpd="sng" algn="ctr">
+                      <a:solidFill>
+                        <a:srgbClr val="000000"/>
+                      </a:solidFill>
+                      <a:prstDash val="solid"/>
+                      <a:round/>
+                      <a:headEnd type="none" w="med" len="med"/>
+                      <a:tailEnd type="none" w="med" len="med"/>
+                    </a:lnT>
+                    <a:lnB w="12700" cap="flat" cmpd="sng" algn="ctr">
+                      <a:solidFill>
+                        <a:srgbClr val="000000"/>
+                      </a:solidFill>
+                      <a:prstDash val="solid"/>
+                      <a:round/>
+                      <a:headEnd type="none" w="med" len="med"/>
+                      <a:tailEnd type="none" w="med" len="med"/>
+                    </a:lnB>
+                  </a:tcPr>
+                </a:tc>
+                <a:tc>
+                  <a:txBody>
+                    <a:bodyPr/>
+                    <a:lstStyle/>
+                    <a:p>
+                      <a:pPr algn="just">
+                        <a:lnSpc>
+                          <a:spcPct val="150000"/>
+                        </a:lnSpc>
+                        <a:spcAft>
+                          <a:spcPts val="0"/>
+                        </a:spcAft>
+                      </a:pPr>
+                      <a:r>
+                        <a:rPr lang="pt-BR" sz="1600" dirty="0">
+                          <a:effectLst/>
+                          <a:latin typeface="Times New Roman" panose="02020603050405020304" pitchFamily="18" charset="0"/>
+                          <a:ea typeface="Times New Roman" panose="02020603050405020304" pitchFamily="18" charset="0"/>
+                        </a:rPr>
+                        <a:t>Atende necessidade de consultar as </a:t>
+                      </a:r>
+                      <a:r>
+                        <a:rPr lang="pt-BR" sz="1600" dirty="0" smtClean="0">
+                          <a:effectLst/>
+                          <a:latin typeface="Times New Roman" panose="02020603050405020304" pitchFamily="18" charset="0"/>
+                          <a:ea typeface="Times New Roman" panose="02020603050405020304" pitchFamily="18" charset="0"/>
+                        </a:rPr>
+                        <a:t>ocorrências.</a:t>
+                      </a:r>
+                      <a:endParaRPr lang="pt-BR" sz="1600" dirty="0">
+                        <a:effectLst/>
+                        <a:latin typeface="Times New Roman" panose="02020603050405020304" pitchFamily="18" charset="0"/>
+                        <a:ea typeface="Times New Roman" panose="02020603050405020304" pitchFamily="18" charset="0"/>
+                      </a:endParaRPr>
+                    </a:p>
+                  </a:txBody>
+                  <a:tcPr marL="68580" marR="68580" marT="0" marB="0">
+                    <a:lnL w="12700" cap="flat" cmpd="sng" algn="ctr">
+                      <a:solidFill>
+                        <a:srgbClr val="000000"/>
+                      </a:solidFill>
+                      <a:prstDash val="solid"/>
+                      <a:round/>
+                      <a:headEnd type="none" w="med" len="med"/>
+                      <a:tailEnd type="none" w="med" len="med"/>
+                    </a:lnL>
+                    <a:lnR w="12700" cap="flat" cmpd="sng" algn="ctr">
+                      <a:solidFill>
+                        <a:srgbClr val="000000"/>
+                      </a:solidFill>
+                      <a:prstDash val="solid"/>
+                      <a:round/>
+                      <a:headEnd type="none" w="med" len="med"/>
+                      <a:tailEnd type="none" w="med" len="med"/>
+                    </a:lnR>
+                    <a:lnT w="12700" cap="flat" cmpd="sng" algn="ctr">
+                      <a:solidFill>
+                        <a:srgbClr val="000000"/>
+                      </a:solidFill>
+                      <a:prstDash val="solid"/>
+                      <a:round/>
+                      <a:headEnd type="none" w="med" len="med"/>
+                      <a:tailEnd type="none" w="med" len="med"/>
+                    </a:lnT>
+                    <a:lnB w="12700" cap="flat" cmpd="sng" algn="ctr">
+                      <a:solidFill>
+                        <a:srgbClr val="000000"/>
+                      </a:solidFill>
+                      <a:prstDash val="solid"/>
+                      <a:round/>
+                      <a:headEnd type="none" w="med" len="med"/>
+                      <a:tailEnd type="none" w="med" len="med"/>
+                    </a:lnB>
+                  </a:tcPr>
+                </a:tc>
+              </a:tr>
+              <a:tr h="445882">
+                <a:tc>
+                  <a:txBody>
+                    <a:bodyPr/>
+                    <a:lstStyle/>
+                    <a:p>
+                      <a:pPr algn="just">
+                        <a:lnSpc>
+                          <a:spcPct val="150000"/>
+                        </a:lnSpc>
+                        <a:spcAft>
+                          <a:spcPts val="0"/>
+                        </a:spcAft>
+                      </a:pPr>
+                      <a:r>
+                        <a:rPr lang="pt-BR" sz="1600" dirty="0">
+                          <a:effectLst/>
+                          <a:latin typeface="Times New Roman" panose="02020603050405020304" pitchFamily="18" charset="0"/>
+                          <a:ea typeface="Times New Roman" panose="02020603050405020304" pitchFamily="18" charset="0"/>
+                        </a:rPr>
+                        <a:t>Cadastrar Aluno</a:t>
+                      </a:r>
+                    </a:p>
+                  </a:txBody>
+                  <a:tcPr marL="68580" marR="68580" marT="0" marB="0">
+                    <a:lnL w="12700" cap="flat" cmpd="sng" algn="ctr">
+                      <a:solidFill>
+                        <a:srgbClr val="000000"/>
+                      </a:solidFill>
+                      <a:prstDash val="solid"/>
+                      <a:round/>
+                      <a:headEnd type="none" w="med" len="med"/>
+                      <a:tailEnd type="none" w="med" len="med"/>
+                    </a:lnL>
+                    <a:lnR w="12700" cap="flat" cmpd="sng" algn="ctr">
+                      <a:solidFill>
+                        <a:srgbClr val="000000"/>
+                      </a:solidFill>
+                      <a:prstDash val="solid"/>
+                      <a:round/>
+                      <a:headEnd type="none" w="med" len="med"/>
+                      <a:tailEnd type="none" w="med" len="med"/>
+                    </a:lnR>
+                    <a:lnT w="12700" cap="flat" cmpd="sng" algn="ctr">
+                      <a:solidFill>
+                        <a:srgbClr val="000000"/>
+                      </a:solidFill>
+                      <a:prstDash val="solid"/>
+                      <a:round/>
+                      <a:headEnd type="none" w="med" len="med"/>
+                      <a:tailEnd type="none" w="med" len="med"/>
+                    </a:lnT>
+                    <a:lnB w="12700" cap="flat" cmpd="sng" algn="ctr">
+                      <a:solidFill>
+                        <a:srgbClr val="000000"/>
+                      </a:solidFill>
+                      <a:prstDash val="solid"/>
+                      <a:round/>
+                      <a:headEnd type="none" w="med" len="med"/>
+                      <a:tailEnd type="none" w="med" len="med"/>
+                    </a:lnB>
+                  </a:tcPr>
+                </a:tc>
+                <a:tc>
+                  <a:txBody>
+                    <a:bodyPr/>
+                    <a:lstStyle/>
+                    <a:p>
+                      <a:pPr algn="just">
+                        <a:lnSpc>
+                          <a:spcPct val="150000"/>
+                        </a:lnSpc>
+                        <a:spcAft>
+                          <a:spcPts val="0"/>
+                        </a:spcAft>
+                      </a:pPr>
+                      <a:r>
+                        <a:rPr lang="pt-BR" sz="1600" dirty="0">
+                          <a:effectLst/>
+                          <a:latin typeface="Times New Roman" panose="02020603050405020304" pitchFamily="18" charset="0"/>
+                          <a:ea typeface="Times New Roman" panose="02020603050405020304" pitchFamily="18" charset="0"/>
+                        </a:rPr>
+                        <a:t>Atende a necessidade de criar ator </a:t>
+                      </a:r>
+                      <a:r>
+                        <a:rPr lang="pt-BR" sz="1600" dirty="0" smtClean="0">
+                          <a:effectLst/>
+                          <a:latin typeface="Times New Roman" panose="02020603050405020304" pitchFamily="18" charset="0"/>
+                          <a:ea typeface="Times New Roman" panose="02020603050405020304" pitchFamily="18" charset="0"/>
+                        </a:rPr>
+                        <a:t>aluno.</a:t>
+                      </a:r>
+                      <a:endParaRPr lang="pt-BR" sz="1600" dirty="0">
+                        <a:effectLst/>
+                        <a:latin typeface="Times New Roman" panose="02020603050405020304" pitchFamily="18" charset="0"/>
+                        <a:ea typeface="Times New Roman" panose="02020603050405020304" pitchFamily="18" charset="0"/>
+                      </a:endParaRPr>
+                    </a:p>
+                  </a:txBody>
+                  <a:tcPr marL="68580" marR="68580" marT="0" marB="0">
+                    <a:lnL w="12700" cap="flat" cmpd="sng" algn="ctr">
+                      <a:solidFill>
+                        <a:srgbClr val="000000"/>
+                      </a:solidFill>
+                      <a:prstDash val="solid"/>
+                      <a:round/>
+                      <a:headEnd type="none" w="med" len="med"/>
+                      <a:tailEnd type="none" w="med" len="med"/>
+                    </a:lnL>
+                    <a:lnR w="12700" cap="flat" cmpd="sng" algn="ctr">
+                      <a:solidFill>
+                        <a:srgbClr val="000000"/>
+                      </a:solidFill>
+                      <a:prstDash val="solid"/>
+                      <a:round/>
+                      <a:headEnd type="none" w="med" len="med"/>
+                      <a:tailEnd type="none" w="med" len="med"/>
+                    </a:lnR>
+                    <a:lnT w="12700" cap="flat" cmpd="sng" algn="ctr">
+                      <a:solidFill>
+                        <a:srgbClr val="000000"/>
+                      </a:solidFill>
+                      <a:prstDash val="solid"/>
+                      <a:round/>
+                      <a:headEnd type="none" w="med" len="med"/>
+                      <a:tailEnd type="none" w="med" len="med"/>
+                    </a:lnT>
+                    <a:lnB w="12700" cap="flat" cmpd="sng" algn="ctr">
+                      <a:solidFill>
+                        <a:srgbClr val="000000"/>
+                      </a:solidFill>
+                      <a:prstDash val="solid"/>
+                      <a:round/>
+                      <a:headEnd type="none" w="med" len="med"/>
+                      <a:tailEnd type="none" w="med" len="med"/>
+                    </a:lnB>
+                  </a:tcPr>
+                </a:tc>
+              </a:tr>
+              <a:tr h="445882">
+                <a:tc>
+                  <a:txBody>
+                    <a:bodyPr/>
+                    <a:lstStyle/>
+                    <a:p>
+                      <a:pPr algn="just">
+                        <a:lnSpc>
+                          <a:spcPct val="150000"/>
+                        </a:lnSpc>
+                        <a:spcAft>
+                          <a:spcPts val="0"/>
+                        </a:spcAft>
+                      </a:pPr>
+                      <a:r>
+                        <a:rPr lang="pt-BR" sz="1600" dirty="0">
+                          <a:effectLst/>
+                          <a:latin typeface="Times New Roman" panose="02020603050405020304" pitchFamily="18" charset="0"/>
+                          <a:ea typeface="Times New Roman" panose="02020603050405020304" pitchFamily="18" charset="0"/>
+                        </a:rPr>
+                        <a:t>Editar Aluno</a:t>
+                      </a:r>
+                    </a:p>
+                  </a:txBody>
+                  <a:tcPr marL="68580" marR="68580" marT="0" marB="0">
+                    <a:lnL w="12700" cap="flat" cmpd="sng" algn="ctr">
+                      <a:solidFill>
+                        <a:srgbClr val="000000"/>
+                      </a:solidFill>
+                      <a:prstDash val="solid"/>
+                      <a:round/>
+                      <a:headEnd type="none" w="med" len="med"/>
+                      <a:tailEnd type="none" w="med" len="med"/>
+                    </a:lnL>
+                    <a:lnR w="12700" cap="flat" cmpd="sng" algn="ctr">
+                      <a:solidFill>
+                        <a:srgbClr val="000000"/>
+                      </a:solidFill>
+                      <a:prstDash val="solid"/>
+                      <a:round/>
+                      <a:headEnd type="none" w="med" len="med"/>
+                      <a:tailEnd type="none" w="med" len="med"/>
+                    </a:lnR>
+                    <a:lnT w="12700" cap="flat" cmpd="sng" algn="ctr">
+                      <a:solidFill>
+                        <a:srgbClr val="000000"/>
+                      </a:solidFill>
+                      <a:prstDash val="solid"/>
+                      <a:round/>
+                      <a:headEnd type="none" w="med" len="med"/>
+                      <a:tailEnd type="none" w="med" len="med"/>
+                    </a:lnT>
+                    <a:lnB w="12700" cap="flat" cmpd="sng" algn="ctr">
+                      <a:solidFill>
+                        <a:srgbClr val="000000"/>
+                      </a:solidFill>
+                      <a:prstDash val="solid"/>
+                      <a:round/>
+                      <a:headEnd type="none" w="med" len="med"/>
+                      <a:tailEnd type="none" w="med" len="med"/>
+                    </a:lnB>
+                  </a:tcPr>
+                </a:tc>
+                <a:tc>
+                  <a:txBody>
+                    <a:bodyPr/>
+                    <a:lstStyle/>
+                    <a:p>
+                      <a:pPr algn="just">
+                        <a:lnSpc>
+                          <a:spcPct val="150000"/>
+                        </a:lnSpc>
+                        <a:spcAft>
+                          <a:spcPts val="0"/>
+                        </a:spcAft>
+                      </a:pPr>
+                      <a:r>
+                        <a:rPr lang="pt-BR" sz="1600" dirty="0">
+                          <a:effectLst/>
+                          <a:latin typeface="Times New Roman" panose="02020603050405020304" pitchFamily="18" charset="0"/>
+                          <a:ea typeface="Times New Roman" panose="02020603050405020304" pitchFamily="18" charset="0"/>
+                        </a:rPr>
+                        <a:t>Atende a necessidade de editar ator </a:t>
+                      </a:r>
+                      <a:r>
+                        <a:rPr lang="pt-BR" sz="1600" dirty="0" smtClean="0">
+                          <a:effectLst/>
+                          <a:latin typeface="Times New Roman" panose="02020603050405020304" pitchFamily="18" charset="0"/>
+                          <a:ea typeface="Times New Roman" panose="02020603050405020304" pitchFamily="18" charset="0"/>
+                        </a:rPr>
+                        <a:t>aluno.</a:t>
+                      </a:r>
+                      <a:endParaRPr lang="pt-BR" sz="1600" dirty="0">
+                        <a:effectLst/>
+                        <a:latin typeface="Times New Roman" panose="02020603050405020304" pitchFamily="18" charset="0"/>
+                        <a:ea typeface="Times New Roman" panose="02020603050405020304" pitchFamily="18" charset="0"/>
+                      </a:endParaRPr>
+                    </a:p>
+                  </a:txBody>
+                  <a:tcPr marL="68580" marR="68580" marT="0" marB="0">
+                    <a:lnL w="12700" cap="flat" cmpd="sng" algn="ctr">
+                      <a:solidFill>
+                        <a:srgbClr val="000000"/>
+                      </a:solidFill>
+                      <a:prstDash val="solid"/>
+                      <a:round/>
+                      <a:headEnd type="none" w="med" len="med"/>
+                      <a:tailEnd type="none" w="med" len="med"/>
+                    </a:lnL>
+                    <a:lnR w="12700" cap="flat" cmpd="sng" algn="ctr">
+                      <a:solidFill>
+                        <a:srgbClr val="000000"/>
+                      </a:solidFill>
+                      <a:prstDash val="solid"/>
+                      <a:round/>
+                      <a:headEnd type="none" w="med" len="med"/>
+                      <a:tailEnd type="none" w="med" len="med"/>
+                    </a:lnR>
+                    <a:lnT w="12700" cap="flat" cmpd="sng" algn="ctr">
+                      <a:solidFill>
+                        <a:srgbClr val="000000"/>
+                      </a:solidFill>
+                      <a:prstDash val="solid"/>
+                      <a:round/>
+                      <a:headEnd type="none" w="med" len="med"/>
+                      <a:tailEnd type="none" w="med" len="med"/>
+                    </a:lnT>
+                    <a:lnB w="12700" cap="flat" cmpd="sng" algn="ctr">
+                      <a:solidFill>
+                        <a:srgbClr val="000000"/>
+                      </a:solidFill>
+                      <a:prstDash val="solid"/>
+                      <a:round/>
+                      <a:headEnd type="none" w="med" len="med"/>
+                      <a:tailEnd type="none" w="med" len="med"/>
+                    </a:lnB>
+                  </a:tcPr>
+                </a:tc>
+              </a:tr>
+              <a:tr h="445882">
+                <a:tc>
+                  <a:txBody>
+                    <a:bodyPr/>
+                    <a:lstStyle/>
+                    <a:p>
+                      <a:pPr algn="just">
+                        <a:lnSpc>
+                          <a:spcPct val="150000"/>
+                        </a:lnSpc>
+                        <a:spcAft>
+                          <a:spcPts val="0"/>
+                        </a:spcAft>
+                      </a:pPr>
+                      <a:r>
+                        <a:rPr lang="pt-BR" sz="1600" dirty="0">
+                          <a:effectLst/>
+                          <a:latin typeface="Times New Roman" panose="02020603050405020304" pitchFamily="18" charset="0"/>
+                          <a:ea typeface="Times New Roman" panose="02020603050405020304" pitchFamily="18" charset="0"/>
+                        </a:rPr>
+                        <a:t>Consultar Aluno</a:t>
+                      </a:r>
+                    </a:p>
+                  </a:txBody>
+                  <a:tcPr marL="68580" marR="68580" marT="0" marB="0">
+                    <a:lnL w="12700" cap="flat" cmpd="sng" algn="ctr">
+                      <a:solidFill>
+                        <a:srgbClr val="000000"/>
+                      </a:solidFill>
+                      <a:prstDash val="solid"/>
+                      <a:round/>
+                      <a:headEnd type="none" w="med" len="med"/>
+                      <a:tailEnd type="none" w="med" len="med"/>
+                    </a:lnL>
+                    <a:lnR w="12700" cap="flat" cmpd="sng" algn="ctr">
+                      <a:solidFill>
+                        <a:srgbClr val="000000"/>
+                      </a:solidFill>
+                      <a:prstDash val="solid"/>
+                      <a:round/>
+                      <a:headEnd type="none" w="med" len="med"/>
+                      <a:tailEnd type="none" w="med" len="med"/>
+                    </a:lnR>
+                    <a:lnT w="12700" cap="flat" cmpd="sng" algn="ctr">
+                      <a:solidFill>
+                        <a:srgbClr val="000000"/>
+                      </a:solidFill>
+                      <a:prstDash val="solid"/>
+                      <a:round/>
+                      <a:headEnd type="none" w="med" len="med"/>
+                      <a:tailEnd type="none" w="med" len="med"/>
+                    </a:lnT>
+                    <a:lnB w="12700" cap="flat" cmpd="sng" algn="ctr">
+                      <a:solidFill>
+                        <a:srgbClr val="000000"/>
+                      </a:solidFill>
+                      <a:prstDash val="solid"/>
+                      <a:round/>
+                      <a:headEnd type="none" w="med" len="med"/>
+                      <a:tailEnd type="none" w="med" len="med"/>
+                    </a:lnB>
+                  </a:tcPr>
+                </a:tc>
+                <a:tc>
+                  <a:txBody>
+                    <a:bodyPr/>
+                    <a:lstStyle/>
+                    <a:p>
+                      <a:pPr algn="just">
+                        <a:lnSpc>
+                          <a:spcPct val="150000"/>
+                        </a:lnSpc>
+                        <a:spcAft>
+                          <a:spcPts val="0"/>
+                        </a:spcAft>
+                      </a:pPr>
+                      <a:r>
+                        <a:rPr lang="pt-BR" sz="1600" dirty="0">
+                          <a:effectLst/>
+                          <a:latin typeface="Times New Roman" panose="02020603050405020304" pitchFamily="18" charset="0"/>
+                          <a:ea typeface="Times New Roman" panose="02020603050405020304" pitchFamily="18" charset="0"/>
+                        </a:rPr>
+                        <a:t>Atende a necessidade de excluir ator </a:t>
+                      </a:r>
+                      <a:r>
+                        <a:rPr lang="pt-BR" sz="1600" dirty="0" smtClean="0">
+                          <a:effectLst/>
+                          <a:latin typeface="Times New Roman" panose="02020603050405020304" pitchFamily="18" charset="0"/>
+                          <a:ea typeface="Times New Roman" panose="02020603050405020304" pitchFamily="18" charset="0"/>
+                        </a:rPr>
+                        <a:t>aluno.</a:t>
+                      </a:r>
+                      <a:endParaRPr lang="pt-BR" sz="1600" dirty="0">
+                        <a:effectLst/>
+                        <a:latin typeface="Times New Roman" panose="02020603050405020304" pitchFamily="18" charset="0"/>
+                        <a:ea typeface="Times New Roman" panose="02020603050405020304" pitchFamily="18" charset="0"/>
+                      </a:endParaRPr>
+                    </a:p>
+                  </a:txBody>
+                  <a:tcPr marL="68580" marR="68580" marT="0" marB="0">
+                    <a:lnL w="12700" cap="flat" cmpd="sng" algn="ctr">
+                      <a:solidFill>
+                        <a:srgbClr val="000000"/>
+                      </a:solidFill>
+                      <a:prstDash val="solid"/>
+                      <a:round/>
+                      <a:headEnd type="none" w="med" len="med"/>
+                      <a:tailEnd type="none" w="med" len="med"/>
+                    </a:lnL>
+                    <a:lnR w="12700" cap="flat" cmpd="sng" algn="ctr">
+                      <a:solidFill>
+                        <a:srgbClr val="000000"/>
+                      </a:solidFill>
+                      <a:prstDash val="solid"/>
+                      <a:round/>
+                      <a:headEnd type="none" w="med" len="med"/>
+                      <a:tailEnd type="none" w="med" len="med"/>
+                    </a:lnR>
+                    <a:lnT w="12700" cap="flat" cmpd="sng" algn="ctr">
+                      <a:solidFill>
+                        <a:srgbClr val="000000"/>
+                      </a:solidFill>
+                      <a:prstDash val="solid"/>
+                      <a:round/>
+                      <a:headEnd type="none" w="med" len="med"/>
+                      <a:tailEnd type="none" w="med" len="med"/>
+                    </a:lnT>
+                    <a:lnB w="12700" cap="flat" cmpd="sng" algn="ctr">
+                      <a:solidFill>
+                        <a:srgbClr val="000000"/>
+                      </a:solidFill>
+                      <a:prstDash val="solid"/>
+                      <a:round/>
+                      <a:headEnd type="none" w="med" len="med"/>
+                      <a:tailEnd type="none" w="med" len="med"/>
+                    </a:lnB>
+                  </a:tcPr>
+                </a:tc>
+              </a:tr>
+              <a:tr h="434601">
+                <a:tc>
+                  <a:txBody>
+                    <a:bodyPr/>
+                    <a:lstStyle/>
+                    <a:p>
+                      <a:pPr algn="just">
+                        <a:lnSpc>
+                          <a:spcPct val="150000"/>
+                        </a:lnSpc>
+                        <a:spcAft>
+                          <a:spcPts val="0"/>
+                        </a:spcAft>
+                      </a:pPr>
+                      <a:r>
+                        <a:rPr lang="pt-BR" sz="1600" dirty="0">
+                          <a:effectLst/>
+                          <a:latin typeface="Times New Roman" panose="02020603050405020304" pitchFamily="18" charset="0"/>
+                          <a:ea typeface="Times New Roman" panose="02020603050405020304" pitchFamily="18" charset="0"/>
+                        </a:rPr>
+                        <a:t>Cadastrar Turma</a:t>
+                      </a:r>
+                    </a:p>
+                  </a:txBody>
+                  <a:tcPr marL="68580" marR="68580" marT="0" marB="0">
+                    <a:lnL w="12700" cap="flat" cmpd="sng" algn="ctr">
+                      <a:solidFill>
+                        <a:srgbClr val="000000"/>
+                      </a:solidFill>
+                      <a:prstDash val="solid"/>
+                      <a:round/>
+                      <a:headEnd type="none" w="med" len="med"/>
+                      <a:tailEnd type="none" w="med" len="med"/>
+                    </a:lnL>
+                    <a:lnR w="12700" cap="flat" cmpd="sng" algn="ctr">
+                      <a:solidFill>
+                        <a:srgbClr val="000000"/>
+                      </a:solidFill>
+                      <a:prstDash val="solid"/>
+                      <a:round/>
+                      <a:headEnd type="none" w="med" len="med"/>
+                      <a:tailEnd type="none" w="med" len="med"/>
+                    </a:lnR>
+                    <a:lnT w="12700" cap="flat" cmpd="sng" algn="ctr">
+                      <a:solidFill>
+                        <a:srgbClr val="000000"/>
+                      </a:solidFill>
+                      <a:prstDash val="solid"/>
+                      <a:round/>
+                      <a:headEnd type="none" w="med" len="med"/>
+                      <a:tailEnd type="none" w="med" len="med"/>
+                    </a:lnT>
+                    <a:lnB w="12700" cap="flat" cmpd="sng" algn="ctr">
+                      <a:solidFill>
+                        <a:srgbClr val="000000"/>
+                      </a:solidFill>
+                      <a:prstDash val="solid"/>
+                      <a:round/>
+                      <a:headEnd type="none" w="med" len="med"/>
+                      <a:tailEnd type="none" w="med" len="med"/>
+                    </a:lnB>
+                  </a:tcPr>
+                </a:tc>
+                <a:tc>
+                  <a:txBody>
+                    <a:bodyPr/>
+                    <a:lstStyle/>
+                    <a:p>
+                      <a:pPr algn="just">
+                        <a:lnSpc>
+                          <a:spcPct val="150000"/>
+                        </a:lnSpc>
+                        <a:spcAft>
+                          <a:spcPts val="0"/>
+                        </a:spcAft>
+                      </a:pPr>
+                      <a:r>
+                        <a:rPr lang="pt-BR" sz="1600" dirty="0">
+                          <a:effectLst/>
+                          <a:latin typeface="Times New Roman" panose="02020603050405020304" pitchFamily="18" charset="0"/>
+                          <a:ea typeface="Times New Roman" panose="02020603050405020304" pitchFamily="18" charset="0"/>
+                        </a:rPr>
+                        <a:t>Atende a necessidade de cadastrar </a:t>
+                      </a:r>
+                      <a:r>
+                        <a:rPr lang="pt-BR" sz="1600" dirty="0" smtClean="0">
+                          <a:effectLst/>
+                          <a:latin typeface="Times New Roman" panose="02020603050405020304" pitchFamily="18" charset="0"/>
+                          <a:ea typeface="Times New Roman" panose="02020603050405020304" pitchFamily="18" charset="0"/>
+                        </a:rPr>
+                        <a:t>turmas.</a:t>
+                      </a:r>
+                      <a:endParaRPr lang="pt-BR" sz="1600" dirty="0">
+                        <a:effectLst/>
+                        <a:latin typeface="Times New Roman" panose="02020603050405020304" pitchFamily="18" charset="0"/>
+                        <a:ea typeface="Times New Roman" panose="02020603050405020304" pitchFamily="18" charset="0"/>
+                      </a:endParaRPr>
+                    </a:p>
+                  </a:txBody>
+                  <a:tcPr marL="68580" marR="68580" marT="0" marB="0">
+                    <a:lnL w="12700" cap="flat" cmpd="sng" algn="ctr">
+                      <a:solidFill>
+                        <a:srgbClr val="000000"/>
+                      </a:solidFill>
+                      <a:prstDash val="solid"/>
+                      <a:round/>
+                      <a:headEnd type="none" w="med" len="med"/>
+                      <a:tailEnd type="none" w="med" len="med"/>
+                    </a:lnL>
+                    <a:lnR w="12700" cap="flat" cmpd="sng" algn="ctr">
+                      <a:solidFill>
+                        <a:srgbClr val="000000"/>
+                      </a:solidFill>
+                      <a:prstDash val="solid"/>
+                      <a:round/>
+                      <a:headEnd type="none" w="med" len="med"/>
+                      <a:tailEnd type="none" w="med" len="med"/>
+                    </a:lnR>
+                    <a:lnT w="12700" cap="flat" cmpd="sng" algn="ctr">
+                      <a:solidFill>
+                        <a:srgbClr val="000000"/>
+                      </a:solidFill>
+                      <a:prstDash val="solid"/>
+                      <a:round/>
+                      <a:headEnd type="none" w="med" len="med"/>
+                      <a:tailEnd type="none" w="med" len="med"/>
+                    </a:lnT>
+                    <a:lnB w="12700" cap="flat" cmpd="sng" algn="ctr">
+                      <a:solidFill>
+                        <a:srgbClr val="000000"/>
+                      </a:solidFill>
+                      <a:prstDash val="solid"/>
+                      <a:round/>
+                      <a:headEnd type="none" w="med" len="med"/>
+                      <a:tailEnd type="none" w="med" len="med"/>
+                    </a:lnB>
+                  </a:tcPr>
+                </a:tc>
+              </a:tr>
+              <a:tr h="445882">
+                <a:tc>
+                  <a:txBody>
+                    <a:bodyPr/>
+                    <a:lstStyle/>
+                    <a:p>
+                      <a:pPr algn="just">
+                        <a:lnSpc>
+                          <a:spcPct val="150000"/>
+                        </a:lnSpc>
+                        <a:spcAft>
+                          <a:spcPts val="0"/>
+                        </a:spcAft>
+                      </a:pPr>
+                      <a:r>
+                        <a:rPr lang="pt-BR" sz="1600" dirty="0">
+                          <a:effectLst/>
+                          <a:latin typeface="Times New Roman" panose="02020603050405020304" pitchFamily="18" charset="0"/>
+                          <a:ea typeface="Times New Roman" panose="02020603050405020304" pitchFamily="18" charset="0"/>
+                        </a:rPr>
+                        <a:t>Editar Turma</a:t>
+                      </a:r>
+                    </a:p>
+                  </a:txBody>
+                  <a:tcPr marL="68580" marR="68580" marT="0" marB="0">
+                    <a:lnL w="12700" cap="flat" cmpd="sng" algn="ctr">
+                      <a:solidFill>
+                        <a:srgbClr val="000000"/>
+                      </a:solidFill>
+                      <a:prstDash val="solid"/>
+                      <a:round/>
+                      <a:headEnd type="none" w="med" len="med"/>
+                      <a:tailEnd type="none" w="med" len="med"/>
+                    </a:lnL>
+                    <a:lnR w="12700" cap="flat" cmpd="sng" algn="ctr">
+                      <a:solidFill>
+                        <a:srgbClr val="000000"/>
+                      </a:solidFill>
+                      <a:prstDash val="solid"/>
+                      <a:round/>
+                      <a:headEnd type="none" w="med" len="med"/>
+                      <a:tailEnd type="none" w="med" len="med"/>
+                    </a:lnR>
+                    <a:lnT w="12700" cap="flat" cmpd="sng" algn="ctr">
+                      <a:solidFill>
+                        <a:srgbClr val="000000"/>
+                      </a:solidFill>
+                      <a:prstDash val="solid"/>
+                      <a:round/>
+                      <a:headEnd type="none" w="med" len="med"/>
+                      <a:tailEnd type="none" w="med" len="med"/>
+                    </a:lnT>
+                    <a:lnB w="12700" cap="flat" cmpd="sng" algn="ctr">
+                      <a:solidFill>
+                        <a:srgbClr val="000000"/>
+                      </a:solidFill>
+                      <a:prstDash val="solid"/>
+                      <a:round/>
+                      <a:headEnd type="none" w="med" len="med"/>
+                      <a:tailEnd type="none" w="med" len="med"/>
+                    </a:lnB>
+                  </a:tcPr>
+                </a:tc>
+                <a:tc>
+                  <a:txBody>
+                    <a:bodyPr/>
+                    <a:lstStyle/>
+                    <a:p>
+                      <a:pPr algn="just">
+                        <a:lnSpc>
+                          <a:spcPct val="150000"/>
+                        </a:lnSpc>
+                        <a:spcAft>
+                          <a:spcPts val="0"/>
+                        </a:spcAft>
+                      </a:pPr>
+                      <a:r>
+                        <a:rPr lang="pt-BR" sz="1600" dirty="0">
+                          <a:effectLst/>
+                          <a:latin typeface="Times New Roman" panose="02020603050405020304" pitchFamily="18" charset="0"/>
+                          <a:ea typeface="Times New Roman" panose="02020603050405020304" pitchFamily="18" charset="0"/>
+                        </a:rPr>
+                        <a:t>Atende a necessidade de editar informações </a:t>
+                      </a:r>
+                      <a:r>
+                        <a:rPr lang="pt-BR" sz="1600" dirty="0" smtClean="0">
+                          <a:effectLst/>
+                          <a:latin typeface="Times New Roman" panose="02020603050405020304" pitchFamily="18" charset="0"/>
+                          <a:ea typeface="Times New Roman" panose="02020603050405020304" pitchFamily="18" charset="0"/>
+                        </a:rPr>
+                        <a:t>das turmas.</a:t>
+                      </a:r>
+                      <a:endParaRPr lang="pt-BR" sz="1600" dirty="0">
+                        <a:effectLst/>
+                        <a:latin typeface="Times New Roman" panose="02020603050405020304" pitchFamily="18" charset="0"/>
+                        <a:ea typeface="Times New Roman" panose="02020603050405020304" pitchFamily="18" charset="0"/>
+                      </a:endParaRPr>
+                    </a:p>
+                  </a:txBody>
+                  <a:tcPr marL="68580" marR="68580" marT="0" marB="0">
+                    <a:lnL w="12700" cap="flat" cmpd="sng" algn="ctr">
+                      <a:solidFill>
+                        <a:srgbClr val="000000"/>
+                      </a:solidFill>
+                      <a:prstDash val="solid"/>
+                      <a:round/>
+                      <a:headEnd type="none" w="med" len="med"/>
+                      <a:tailEnd type="none" w="med" len="med"/>
+                    </a:lnL>
+                    <a:lnR w="12700" cap="flat" cmpd="sng" algn="ctr">
+                      <a:solidFill>
+                        <a:srgbClr val="000000"/>
+                      </a:solidFill>
+                      <a:prstDash val="solid"/>
+                      <a:round/>
+                      <a:headEnd type="none" w="med" len="med"/>
+                      <a:tailEnd type="none" w="med" len="med"/>
+                    </a:lnR>
+                    <a:lnT w="12700" cap="flat" cmpd="sng" algn="ctr">
+                      <a:solidFill>
+                        <a:srgbClr val="000000"/>
+                      </a:solidFill>
+                      <a:prstDash val="solid"/>
+                      <a:round/>
+                      <a:headEnd type="none" w="med" len="med"/>
+                      <a:tailEnd type="none" w="med" len="med"/>
+                    </a:lnT>
+                    <a:lnB w="12700" cap="flat" cmpd="sng" algn="ctr">
+                      <a:solidFill>
+                        <a:srgbClr val="000000"/>
+                      </a:solidFill>
+                      <a:prstDash val="solid"/>
+                      <a:round/>
+                      <a:headEnd type="none" w="med" len="med"/>
+                      <a:tailEnd type="none" w="med" len="med"/>
+                    </a:lnB>
+                  </a:tcPr>
+                </a:tc>
+              </a:tr>
+              <a:tr h="445882">
+                <a:tc>
+                  <a:txBody>
+                    <a:bodyPr/>
+                    <a:lstStyle/>
+                    <a:p>
+                      <a:pPr algn="just">
+                        <a:lnSpc>
+                          <a:spcPct val="150000"/>
+                        </a:lnSpc>
+                        <a:spcAft>
+                          <a:spcPts val="0"/>
+                        </a:spcAft>
+                      </a:pPr>
+                      <a:r>
+                        <a:rPr lang="pt-BR" sz="1600" dirty="0">
+                          <a:effectLst/>
+                          <a:latin typeface="Times New Roman" panose="02020603050405020304" pitchFamily="18" charset="0"/>
+                          <a:ea typeface="Times New Roman" panose="02020603050405020304" pitchFamily="18" charset="0"/>
+                        </a:rPr>
+                        <a:t>Consultar Turma</a:t>
+                      </a:r>
+                    </a:p>
+                  </a:txBody>
+                  <a:tcPr marL="68580" marR="68580" marT="0" marB="0">
+                    <a:lnL w="12700" cap="flat" cmpd="sng" algn="ctr">
+                      <a:solidFill>
+                        <a:srgbClr val="000000"/>
+                      </a:solidFill>
+                      <a:prstDash val="solid"/>
+                      <a:round/>
+                      <a:headEnd type="none" w="med" len="med"/>
+                      <a:tailEnd type="none" w="med" len="med"/>
+                    </a:lnL>
+                    <a:lnR w="12700" cap="flat" cmpd="sng" algn="ctr">
+                      <a:solidFill>
+                        <a:srgbClr val="000000"/>
+                      </a:solidFill>
+                      <a:prstDash val="solid"/>
+                      <a:round/>
+                      <a:headEnd type="none" w="med" len="med"/>
+                      <a:tailEnd type="none" w="med" len="med"/>
+                    </a:lnR>
+                    <a:lnT w="12700" cap="flat" cmpd="sng" algn="ctr">
+                      <a:solidFill>
+                        <a:srgbClr val="000000"/>
+                      </a:solidFill>
+                      <a:prstDash val="solid"/>
+                      <a:round/>
+                      <a:headEnd type="none" w="med" len="med"/>
+                      <a:tailEnd type="none" w="med" len="med"/>
+                    </a:lnT>
+                    <a:lnB w="12700" cap="flat" cmpd="sng" algn="ctr">
+                      <a:solidFill>
+                        <a:srgbClr val="000000"/>
+                      </a:solidFill>
+                      <a:prstDash val="solid"/>
+                      <a:round/>
+                      <a:headEnd type="none" w="med" len="med"/>
+                      <a:tailEnd type="none" w="med" len="med"/>
+                    </a:lnB>
+                  </a:tcPr>
+                </a:tc>
+                <a:tc>
+                  <a:txBody>
+                    <a:bodyPr/>
+                    <a:lstStyle/>
+                    <a:p>
+                      <a:pPr algn="just">
+                        <a:lnSpc>
+                          <a:spcPct val="150000"/>
+                        </a:lnSpc>
+                        <a:spcAft>
+                          <a:spcPts val="0"/>
+                        </a:spcAft>
+                      </a:pPr>
+                      <a:r>
+                        <a:rPr lang="pt-BR" sz="1600" dirty="0">
+                          <a:effectLst/>
+                          <a:latin typeface="Times New Roman" panose="02020603050405020304" pitchFamily="18" charset="0"/>
+                          <a:ea typeface="Times New Roman" panose="02020603050405020304" pitchFamily="18" charset="0"/>
+                        </a:rPr>
+                        <a:t>Atende a necessidade de </a:t>
+                      </a:r>
+                      <a:r>
+                        <a:rPr lang="pt-BR" sz="1600" dirty="0" smtClean="0">
+                          <a:effectLst/>
+                          <a:latin typeface="Times New Roman" panose="02020603050405020304" pitchFamily="18" charset="0"/>
+                          <a:ea typeface="Times New Roman" panose="02020603050405020304" pitchFamily="18" charset="0"/>
+                        </a:rPr>
+                        <a:t>consultar</a:t>
+                      </a:r>
+                      <a:r>
+                        <a:rPr lang="pt-BR" sz="1600" baseline="0" dirty="0" smtClean="0">
+                          <a:effectLst/>
+                          <a:latin typeface="Times New Roman" panose="02020603050405020304" pitchFamily="18" charset="0"/>
+                          <a:ea typeface="Times New Roman" panose="02020603050405020304" pitchFamily="18" charset="0"/>
+                        </a:rPr>
+                        <a:t> </a:t>
+                      </a:r>
+                      <a:r>
+                        <a:rPr lang="pt-BR" sz="1600" dirty="0" smtClean="0">
+                          <a:effectLst/>
+                          <a:latin typeface="Times New Roman" panose="02020603050405020304" pitchFamily="18" charset="0"/>
+                          <a:ea typeface="Times New Roman" panose="02020603050405020304" pitchFamily="18" charset="0"/>
+                        </a:rPr>
+                        <a:t>turmas.</a:t>
+                      </a:r>
+                      <a:endParaRPr lang="pt-BR" sz="1600" dirty="0">
+                        <a:effectLst/>
+                        <a:latin typeface="Times New Roman" panose="02020603050405020304" pitchFamily="18" charset="0"/>
+                        <a:ea typeface="Times New Roman" panose="02020603050405020304" pitchFamily="18" charset="0"/>
+                      </a:endParaRPr>
+                    </a:p>
+                  </a:txBody>
+                  <a:tcPr marL="68580" marR="68580" marT="0" marB="0">
+                    <a:lnL w="12700" cap="flat" cmpd="sng" algn="ctr">
+                      <a:solidFill>
+                        <a:srgbClr val="000000"/>
+                      </a:solidFill>
+                      <a:prstDash val="solid"/>
+                      <a:round/>
+                      <a:headEnd type="none" w="med" len="med"/>
+                      <a:tailEnd type="none" w="med" len="med"/>
+                    </a:lnL>
+                    <a:lnR w="12700" cap="flat" cmpd="sng" algn="ctr">
+                      <a:solidFill>
+                        <a:srgbClr val="000000"/>
+                      </a:solidFill>
+                      <a:prstDash val="solid"/>
+                      <a:round/>
+                      <a:headEnd type="none" w="med" len="med"/>
+                      <a:tailEnd type="none" w="med" len="med"/>
+                    </a:lnR>
+                    <a:lnT w="12700" cap="flat" cmpd="sng" algn="ctr">
+                      <a:solidFill>
+                        <a:srgbClr val="000000"/>
+                      </a:solidFill>
+                      <a:prstDash val="solid"/>
+                      <a:round/>
+                      <a:headEnd type="none" w="med" len="med"/>
+                      <a:tailEnd type="none" w="med" len="med"/>
+                    </a:lnT>
+                    <a:lnB w="12700" cap="flat" cmpd="sng" algn="ctr">
+                      <a:solidFill>
+                        <a:srgbClr val="000000"/>
+                      </a:solidFill>
+                      <a:prstDash val="solid"/>
+                      <a:round/>
+                      <a:headEnd type="none" w="med" len="med"/>
+                      <a:tailEnd type="none" w="med" len="med"/>
+                    </a:lnB>
+                  </a:tcPr>
+                </a:tc>
+              </a:tr>
+            </a:tbl>
+          </a:graphicData>
+        </a:graphic>
+      </p:graphicFrame>
     </p:spTree>
   </p:cSld>
   <p:clrMapOvr>
@@ -6235,468 +7810,7 @@
   <p:timing>
     <p:tnLst>
       <p:par>
-        <p:cTn id="1" dur="indefinite" restart="never" nodeType="tmRoot">
-          <p:childTnLst>
-            <p:seq concurrent="1" nextAc="seek">
-              <p:cTn id="2" dur="indefinite" nodeType="mainSeq">
-                <p:childTnLst>
-                  <p:par>
-                    <p:cTn id="3" fill="hold">
-                      <p:stCondLst>
-                        <p:cond delay="indefinite"/>
-                        <p:cond evt="onBegin" delay="0">
-                          <p:tn val="2"/>
-                        </p:cond>
-                      </p:stCondLst>
-                      <p:childTnLst>
-                        <p:par>
-                          <p:cTn id="4" fill="hold">
-                            <p:stCondLst>
-                              <p:cond delay="0"/>
-                            </p:stCondLst>
-                            <p:childTnLst>
-                              <p:par>
-                                <p:cTn id="5" presetID="27" presetClass="entr" presetSubtype="0" fill="hold" nodeType="withEffect">
-                                  <p:stCondLst>
-                                    <p:cond delay="0"/>
-                                  </p:stCondLst>
-                                  <p:iterate type="lt">
-                                    <p:tmPct val="50000"/>
-                                  </p:iterate>
-                                  <p:childTnLst>
-                                    <p:set>
-                                      <p:cBhvr>
-                                        <p:cTn id="6" dur="1" fill="hold">
-                                          <p:stCondLst>
-                                            <p:cond delay="0"/>
-                                          </p:stCondLst>
-                                        </p:cTn>
-                                        <p:tgtEl>
-                                          <p:spTgt spid="3">
-                                            <p:txEl>
-                                              <p:pRg st="3" end="3"/>
-                                            </p:txEl>
-                                          </p:spTgt>
-                                        </p:tgtEl>
-                                        <p:attrNameLst>
-                                          <p:attrName>style.visibility</p:attrName>
-                                        </p:attrNameLst>
-                                      </p:cBhvr>
-                                      <p:to>
-                                        <p:strVal val="visible"/>
-                                      </p:to>
-                                    </p:set>
-                                    <p:anim calcmode="discrete" valueType="clr">
-                                      <p:cBhvr override="childStyle">
-                                        <p:cTn id="7" dur="80"/>
-                                        <p:tgtEl>
-                                          <p:spTgt spid="3">
-                                            <p:txEl>
-                                              <p:pRg st="3" end="3"/>
-                                            </p:txEl>
-                                          </p:spTgt>
-                                        </p:tgtEl>
-                                        <p:attrNameLst>
-                                          <p:attrName>style.color</p:attrName>
-                                        </p:attrNameLst>
-                                      </p:cBhvr>
-                                      <p:tavLst>
-                                        <p:tav tm="0">
-                                          <p:val>
-                                            <p:clrVal>
-                                              <a:schemeClr val="accent2"/>
-                                            </p:clrVal>
-                                          </p:val>
-                                        </p:tav>
-                                        <p:tav tm="50000">
-                                          <p:val>
-                                            <p:clrVal>
-                                              <a:schemeClr val="hlink"/>
-                                            </p:clrVal>
-                                          </p:val>
-                                        </p:tav>
-                                      </p:tavLst>
-                                    </p:anim>
-                                    <p:anim calcmode="discrete" valueType="clr">
-                                      <p:cBhvr>
-                                        <p:cTn id="8" dur="80"/>
-                                        <p:tgtEl>
-                                          <p:spTgt spid="3">
-                                            <p:txEl>
-                                              <p:pRg st="3" end="3"/>
-                                            </p:txEl>
-                                          </p:spTgt>
-                                        </p:tgtEl>
-                                        <p:attrNameLst>
-                                          <p:attrName>fillcolor</p:attrName>
-                                        </p:attrNameLst>
-                                      </p:cBhvr>
-                                      <p:tavLst>
-                                        <p:tav tm="0">
-                                          <p:val>
-                                            <p:clrVal>
-                                              <a:schemeClr val="accent2"/>
-                                            </p:clrVal>
-                                          </p:val>
-                                        </p:tav>
-                                        <p:tav tm="50000">
-                                          <p:val>
-                                            <p:clrVal>
-                                              <a:schemeClr val="hlink"/>
-                                            </p:clrVal>
-                                          </p:val>
-                                        </p:tav>
-                                      </p:tavLst>
-                                    </p:anim>
-                                    <p:set>
-                                      <p:cBhvr>
-                                        <p:cTn id="9" dur="80"/>
-                                        <p:tgtEl>
-                                          <p:spTgt spid="3">
-                                            <p:txEl>
-                                              <p:pRg st="3" end="3"/>
-                                            </p:txEl>
-                                          </p:spTgt>
-                                        </p:tgtEl>
-                                        <p:attrNameLst>
-                                          <p:attrName>fill.type</p:attrName>
-                                        </p:attrNameLst>
-                                      </p:cBhvr>
-                                      <p:to>
-                                        <p:strVal val="solid"/>
-                                      </p:to>
-                                    </p:set>
-                                  </p:childTnLst>
-                                </p:cTn>
-                              </p:par>
-                            </p:childTnLst>
-                          </p:cTn>
-                        </p:par>
-                      </p:childTnLst>
-                    </p:cTn>
-                  </p:par>
-                  <p:par>
-                    <p:cTn id="10" fill="hold">
-                      <p:stCondLst>
-                        <p:cond delay="indefinite"/>
-                      </p:stCondLst>
-                      <p:childTnLst>
-                        <p:par>
-                          <p:cTn id="11" fill="hold">
-                            <p:stCondLst>
-                              <p:cond delay="0"/>
-                            </p:stCondLst>
-                            <p:childTnLst>
-                              <p:par>
-                                <p:cTn id="12" presetID="19" presetClass="emph" presetSubtype="0" fill="hold" nodeType="clickEffect">
-                                  <p:stCondLst>
-                                    <p:cond delay="0"/>
-                                  </p:stCondLst>
-                                  <p:childTnLst>
-                                    <p:animClr clrSpc="rgb" dir="cw">
-                                      <p:cBhvr override="childStyle">
-                                        <p:cTn id="13" dur="500" fill="hold"/>
-                                        <p:tgtEl>
-                                          <p:spTgt spid="3">
-                                            <p:txEl>
-                                              <p:pRg st="0" end="0"/>
-                                            </p:txEl>
-                                          </p:spTgt>
-                                        </p:tgtEl>
-                                        <p:attrNameLst>
-                                          <p:attrName>style.color</p:attrName>
-                                        </p:attrNameLst>
-                                      </p:cBhvr>
-                                      <p:to>
-                                        <a:schemeClr val="accent2"/>
-                                      </p:to>
-                                    </p:animClr>
-                                    <p:animClr clrSpc="rgb" dir="cw">
-                                      <p:cBhvr>
-                                        <p:cTn id="14" dur="500" fill="hold"/>
-                                        <p:tgtEl>
-                                          <p:spTgt spid="3">
-                                            <p:txEl>
-                                              <p:pRg st="0" end="0"/>
-                                            </p:txEl>
-                                          </p:spTgt>
-                                        </p:tgtEl>
-                                        <p:attrNameLst>
-                                          <p:attrName>fillcolor</p:attrName>
-                                        </p:attrNameLst>
-                                      </p:cBhvr>
-                                      <p:to>
-                                        <a:schemeClr val="accent2"/>
-                                      </p:to>
-                                    </p:animClr>
-                                    <p:set>
-                                      <p:cBhvr>
-                                        <p:cTn id="15" dur="500" fill="hold"/>
-                                        <p:tgtEl>
-                                          <p:spTgt spid="3">
-                                            <p:txEl>
-                                              <p:pRg st="0" end="0"/>
-                                            </p:txEl>
-                                          </p:spTgt>
-                                        </p:tgtEl>
-                                        <p:attrNameLst>
-                                          <p:attrName>fill.type</p:attrName>
-                                        </p:attrNameLst>
-                                      </p:cBhvr>
-                                      <p:to>
-                                        <p:strVal val="solid"/>
-                                      </p:to>
-                                    </p:set>
-                                    <p:set>
-                                      <p:cBhvr>
-                                        <p:cTn id="16" dur="500" fill="hold"/>
-                                        <p:tgtEl>
-                                          <p:spTgt spid="3">
-                                            <p:txEl>
-                                              <p:pRg st="0" end="0"/>
-                                            </p:txEl>
-                                          </p:spTgt>
-                                        </p:tgtEl>
-                                        <p:attrNameLst>
-                                          <p:attrName>fill.on</p:attrName>
-                                        </p:attrNameLst>
-                                      </p:cBhvr>
-                                      <p:to>
-                                        <p:strVal val="true"/>
-                                      </p:to>
-                                    </p:set>
-                                  </p:childTnLst>
-                                </p:cTn>
-                              </p:par>
-                            </p:childTnLst>
-                          </p:cTn>
-                        </p:par>
-                      </p:childTnLst>
-                    </p:cTn>
-                  </p:par>
-                  <p:par>
-                    <p:cTn id="17" fill="hold">
-                      <p:stCondLst>
-                        <p:cond delay="indefinite"/>
-                      </p:stCondLst>
-                      <p:childTnLst>
-                        <p:par>
-                          <p:cTn id="18" fill="hold">
-                            <p:stCondLst>
-                              <p:cond delay="0"/>
-                            </p:stCondLst>
-                            <p:childTnLst>
-                              <p:par>
-                                <p:cTn id="19" presetID="19" presetClass="emph" presetSubtype="0" fill="hold" nodeType="clickEffect">
-                                  <p:stCondLst>
-                                    <p:cond delay="0"/>
-                                  </p:stCondLst>
-                                  <p:iterate type="lt">
-                                    <p:tmPct val="0"/>
-                                  </p:iterate>
-                                  <p:childTnLst>
-                                    <p:animClr clrSpc="rgb" dir="cw">
-                                      <p:cBhvr override="childStyle">
-                                        <p:cTn id="20" dur="500" fill="hold"/>
-                                        <p:tgtEl>
-                                          <p:spTgt spid="3">
-                                            <p:txEl>
-                                              <p:pRg st="1" end="1"/>
-                                            </p:txEl>
-                                          </p:spTgt>
-                                        </p:tgtEl>
-                                        <p:attrNameLst>
-                                          <p:attrName>style.color</p:attrName>
-                                        </p:attrNameLst>
-                                      </p:cBhvr>
-                                      <p:to>
-                                        <a:schemeClr val="accent2"/>
-                                      </p:to>
-                                    </p:animClr>
-                                    <p:animClr clrSpc="rgb" dir="cw">
-                                      <p:cBhvr>
-                                        <p:cTn id="21" dur="500" fill="hold"/>
-                                        <p:tgtEl>
-                                          <p:spTgt spid="3">
-                                            <p:txEl>
-                                              <p:pRg st="1" end="1"/>
-                                            </p:txEl>
-                                          </p:spTgt>
-                                        </p:tgtEl>
-                                        <p:attrNameLst>
-                                          <p:attrName>fillcolor</p:attrName>
-                                        </p:attrNameLst>
-                                      </p:cBhvr>
-                                      <p:to>
-                                        <a:schemeClr val="accent2"/>
-                                      </p:to>
-                                    </p:animClr>
-                                    <p:set>
-                                      <p:cBhvr>
-                                        <p:cTn id="22" dur="500" fill="hold"/>
-                                        <p:tgtEl>
-                                          <p:spTgt spid="3">
-                                            <p:txEl>
-                                              <p:pRg st="1" end="1"/>
-                                            </p:txEl>
-                                          </p:spTgt>
-                                        </p:tgtEl>
-                                        <p:attrNameLst>
-                                          <p:attrName>fill.type</p:attrName>
-                                        </p:attrNameLst>
-                                      </p:cBhvr>
-                                      <p:to>
-                                        <p:strVal val="solid"/>
-                                      </p:to>
-                                    </p:set>
-                                    <p:set>
-                                      <p:cBhvr>
-                                        <p:cTn id="23" dur="500" fill="hold"/>
-                                        <p:tgtEl>
-                                          <p:spTgt spid="3">
-                                            <p:txEl>
-                                              <p:pRg st="1" end="1"/>
-                                            </p:txEl>
-                                          </p:spTgt>
-                                        </p:tgtEl>
-                                        <p:attrNameLst>
-                                          <p:attrName>fill.on</p:attrName>
-                                        </p:attrNameLst>
-                                      </p:cBhvr>
-                                      <p:to>
-                                        <p:strVal val="true"/>
-                                      </p:to>
-                                    </p:set>
-                                  </p:childTnLst>
-                                </p:cTn>
-                              </p:par>
-                            </p:childTnLst>
-                          </p:cTn>
-                        </p:par>
-                      </p:childTnLst>
-                    </p:cTn>
-                  </p:par>
-                  <p:par>
-                    <p:cTn id="24" fill="hold">
-                      <p:stCondLst>
-                        <p:cond delay="indefinite"/>
-                      </p:stCondLst>
-                      <p:childTnLst>
-                        <p:par>
-                          <p:cTn id="25" fill="hold">
-                            <p:stCondLst>
-                              <p:cond delay="0"/>
-                            </p:stCondLst>
-                            <p:childTnLst>
-                              <p:par>
-                                <p:cTn id="26" presetID="19" presetClass="emph" presetSubtype="0" fill="hold" nodeType="clickEffect">
-                                  <p:stCondLst>
-                                    <p:cond delay="0"/>
-                                  </p:stCondLst>
-                                  <p:iterate type="lt">
-                                    <p:tmPct val="0"/>
-                                  </p:iterate>
-                                  <p:childTnLst>
-                                    <p:animClr clrSpc="rgb" dir="cw">
-                                      <p:cBhvr override="childStyle">
-                                        <p:cTn id="27" dur="500" fill="hold"/>
-                                        <p:tgtEl>
-                                          <p:spTgt spid="3">
-                                            <p:txEl>
-                                              <p:pRg st="2" end="2"/>
-                                            </p:txEl>
-                                          </p:spTgt>
-                                        </p:tgtEl>
-                                        <p:attrNameLst>
-                                          <p:attrName>style.color</p:attrName>
-                                        </p:attrNameLst>
-                                      </p:cBhvr>
-                                      <p:to>
-                                        <a:schemeClr val="accent2"/>
-                                      </p:to>
-                                    </p:animClr>
-                                    <p:animClr clrSpc="rgb" dir="cw">
-                                      <p:cBhvr>
-                                        <p:cTn id="28" dur="500" fill="hold"/>
-                                        <p:tgtEl>
-                                          <p:spTgt spid="3">
-                                            <p:txEl>
-                                              <p:pRg st="2" end="2"/>
-                                            </p:txEl>
-                                          </p:spTgt>
-                                        </p:tgtEl>
-                                        <p:attrNameLst>
-                                          <p:attrName>fillcolor</p:attrName>
-                                        </p:attrNameLst>
-                                      </p:cBhvr>
-                                      <p:to>
-                                        <a:schemeClr val="accent2"/>
-                                      </p:to>
-                                    </p:animClr>
-                                    <p:set>
-                                      <p:cBhvr>
-                                        <p:cTn id="29" dur="500" fill="hold"/>
-                                        <p:tgtEl>
-                                          <p:spTgt spid="3">
-                                            <p:txEl>
-                                              <p:pRg st="2" end="2"/>
-                                            </p:txEl>
-                                          </p:spTgt>
-                                        </p:tgtEl>
-                                        <p:attrNameLst>
-                                          <p:attrName>fill.type</p:attrName>
-                                        </p:attrNameLst>
-                                      </p:cBhvr>
-                                      <p:to>
-                                        <p:strVal val="solid"/>
-                                      </p:to>
-                                    </p:set>
-                                    <p:set>
-                                      <p:cBhvr>
-                                        <p:cTn id="30" dur="500" fill="hold"/>
-                                        <p:tgtEl>
-                                          <p:spTgt spid="3">
-                                            <p:txEl>
-                                              <p:pRg st="2" end="2"/>
-                                            </p:txEl>
-                                          </p:spTgt>
-                                        </p:tgtEl>
-                                        <p:attrNameLst>
-                                          <p:attrName>fill.on</p:attrName>
-                                        </p:attrNameLst>
-                                      </p:cBhvr>
-                                      <p:to>
-                                        <p:strVal val="true"/>
-                                      </p:to>
-                                    </p:set>
-                                  </p:childTnLst>
-                                </p:cTn>
-                              </p:par>
-                            </p:childTnLst>
-                          </p:cTn>
-                        </p:par>
-                      </p:childTnLst>
-                    </p:cTn>
-                  </p:par>
-                </p:childTnLst>
-              </p:cTn>
-              <p:prevCondLst>
-                <p:cond evt="onPrev" delay="0">
-                  <p:tgtEl>
-                    <p:sldTgt/>
-                  </p:tgtEl>
-                </p:cond>
-              </p:prevCondLst>
-              <p:nextCondLst>
-                <p:cond evt="onNext" delay="0">
-                  <p:tgtEl>
-                    <p:sldTgt/>
-                  </p:tgtEl>
-                </p:cond>
-              </p:nextCondLst>
-            </p:seq>
-          </p:childTnLst>
-        </p:cTn>
+        <p:cTn id="1" dur="indefinite" restart="never" nodeType="tmRoot"/>
       </p:par>
     </p:tnLst>
   </p:timing>
@@ -6759,342 +7873,26 @@
           <a:lstStyle/>
           <a:p>
             <a:r>
-              <a:rPr lang="en-US" dirty="0" err="1" smtClean="0"/>
-              <a:t>Esse</a:t>
-            </a:r>
-            <a:r>
-              <a:rPr lang="en-US" dirty="0" smtClean="0"/>
+              <a:rPr lang="pt-BR" sz="2700" dirty="0"/>
+              <a:t>Podemos concluir que o sistema é uma grande ferramenta, que contribuirá para melhor acompanhamento dos pais/responsáveis na vida escolar de seus filhos, e para melhor desempenho dos profissionais que utilizarão essa ferramenta</a:t>
+            </a:r>
+            <a:r>
+              <a:rPr lang="pt-BR" sz="2700" dirty="0" smtClean="0"/>
+              <a:t>.</a:t>
+            </a:r>
+          </a:p>
+          <a:p>
+            <a:r>
+              <a:rPr lang="pt-BR" sz="2700" dirty="0" smtClean="0"/>
               <a:t> </a:t>
             </a:r>
             <a:r>
-              <a:rPr lang="en-US" dirty="0" err="1" smtClean="0"/>
-              <a:t>sistema</a:t>
-            </a:r>
-            <a:r>
-              <a:rPr lang="en-US" dirty="0" smtClean="0"/>
-              <a:t>, no </a:t>
-            </a:r>
-            <a:r>
-              <a:rPr lang="en-US" dirty="0" err="1" smtClean="0"/>
-              <a:t>futuro</a:t>
-            </a:r>
-            <a:r>
-              <a:rPr lang="en-US" dirty="0" smtClean="0"/>
-              <a:t>, </a:t>
-            </a:r>
-            <a:r>
-              <a:rPr lang="en-US" dirty="0" err="1" smtClean="0"/>
-              <a:t>poderá</a:t>
-            </a:r>
-            <a:r>
-              <a:rPr lang="en-US" dirty="0" smtClean="0"/>
-              <a:t> </a:t>
-            </a:r>
-            <a:r>
-              <a:rPr lang="en-US" dirty="0" err="1" smtClean="0"/>
-              <a:t>permitir</a:t>
-            </a:r>
-            <a:r>
-              <a:rPr lang="en-US" dirty="0" smtClean="0"/>
-              <a:t> </a:t>
-            </a:r>
-            <a:r>
-              <a:rPr lang="en-US" dirty="0" err="1" smtClean="0"/>
-              <a:t>que</a:t>
-            </a:r>
-            <a:r>
-              <a:rPr lang="en-US" dirty="0" smtClean="0"/>
-              <a:t> </a:t>
-            </a:r>
-            <a:r>
-              <a:rPr lang="en-US" dirty="0" err="1" smtClean="0"/>
-              <a:t>diversas</a:t>
-            </a:r>
-            <a:r>
-              <a:rPr lang="en-US" dirty="0" smtClean="0"/>
-              <a:t> </a:t>
-            </a:r>
-            <a:r>
-              <a:rPr lang="en-US" dirty="0" err="1" smtClean="0"/>
-              <a:t>escolas</a:t>
-            </a:r>
-            <a:r>
-              <a:rPr lang="en-US" dirty="0" smtClean="0"/>
-              <a:t> </a:t>
-            </a:r>
-            <a:r>
-              <a:rPr lang="en-US" dirty="0" err="1" smtClean="0"/>
-              <a:t>consigam</a:t>
-            </a:r>
-            <a:r>
-              <a:rPr lang="en-US" dirty="0" smtClean="0"/>
-              <a:t> </a:t>
-            </a:r>
-            <a:r>
-              <a:rPr lang="en-US" dirty="0" err="1" smtClean="0"/>
-              <a:t>interagir</a:t>
-            </a:r>
-            <a:r>
-              <a:rPr lang="en-US" dirty="0" smtClean="0"/>
-              <a:t> on-line com </a:t>
-            </a:r>
-            <a:r>
-              <a:rPr lang="en-US" dirty="0" err="1" smtClean="0"/>
-              <a:t>os</a:t>
-            </a:r>
-            <a:r>
-              <a:rPr lang="en-US" dirty="0" smtClean="0"/>
-              <a:t> </a:t>
-            </a:r>
-            <a:r>
-              <a:rPr lang="en-US" dirty="0" err="1" smtClean="0"/>
-              <a:t>pais</a:t>
-            </a:r>
-            <a:r>
-              <a:rPr lang="en-US" dirty="0" smtClean="0"/>
-              <a:t>/</a:t>
-            </a:r>
-            <a:r>
-              <a:rPr lang="en-US" dirty="0" err="1" smtClean="0"/>
-              <a:t>responsáveis</a:t>
-            </a:r>
-            <a:r>
-              <a:rPr lang="en-US" dirty="0" smtClean="0"/>
-              <a:t> dos </a:t>
-            </a:r>
-            <a:r>
-              <a:rPr lang="en-US" dirty="0" err="1" smtClean="0"/>
-              <a:t>alunos</a:t>
-            </a:r>
-            <a:r>
-              <a:rPr lang="en-US" dirty="0" smtClean="0"/>
-              <a:t>, </a:t>
-            </a:r>
-            <a:r>
-              <a:rPr lang="en-US" dirty="0" err="1" smtClean="0"/>
-              <a:t>através</a:t>
-            </a:r>
-            <a:r>
-              <a:rPr lang="en-US" dirty="0" smtClean="0"/>
-              <a:t> de </a:t>
-            </a:r>
-            <a:r>
-              <a:rPr lang="en-US" dirty="0" err="1" smtClean="0"/>
-              <a:t>mensagens</a:t>
-            </a:r>
-            <a:r>
-              <a:rPr lang="en-US" dirty="0" smtClean="0"/>
-              <a:t> </a:t>
-            </a:r>
-            <a:r>
-              <a:rPr lang="en-US" dirty="0" err="1" smtClean="0"/>
-              <a:t>por</a:t>
-            </a:r>
-            <a:r>
-              <a:rPr lang="en-US" dirty="0" smtClean="0"/>
-              <a:t> </a:t>
-            </a:r>
-            <a:r>
-              <a:rPr lang="en-US" dirty="0" err="1" smtClean="0"/>
-              <a:t>celulares</a:t>
-            </a:r>
-            <a:r>
-              <a:rPr lang="en-US" dirty="0" smtClean="0"/>
-              <a:t>, e-mail.</a:t>
-            </a:r>
-          </a:p>
-          <a:p>
-            <a:r>
-              <a:rPr lang="en-US" dirty="0" smtClean="0"/>
-              <a:t>Um dado </a:t>
-            </a:r>
-            <a:r>
-              <a:rPr lang="en-US" dirty="0" err="1" smtClean="0"/>
-              <a:t>diário</a:t>
-            </a:r>
-            <a:r>
-              <a:rPr lang="en-US" dirty="0" smtClean="0"/>
-              <a:t> </a:t>
-            </a:r>
-            <a:r>
-              <a:rPr lang="en-US" dirty="0" err="1" smtClean="0"/>
-              <a:t>que</a:t>
-            </a:r>
-            <a:r>
-              <a:rPr lang="en-US" dirty="0" smtClean="0"/>
-              <a:t> </a:t>
-            </a:r>
-            <a:r>
-              <a:rPr lang="en-US" dirty="0" err="1" smtClean="0"/>
-              <a:t>seria</a:t>
-            </a:r>
-            <a:r>
-              <a:rPr lang="en-US" dirty="0" smtClean="0"/>
-              <a:t> </a:t>
-            </a:r>
-            <a:r>
-              <a:rPr lang="en-US" dirty="0" err="1" smtClean="0"/>
-              <a:t>interessante</a:t>
-            </a:r>
-            <a:r>
-              <a:rPr lang="en-US" dirty="0" smtClean="0"/>
-              <a:t> </a:t>
-            </a:r>
-            <a:r>
-              <a:rPr lang="en-US" dirty="0" err="1" smtClean="0"/>
-              <a:t>os</a:t>
-            </a:r>
-            <a:r>
-              <a:rPr lang="en-US" dirty="0" smtClean="0"/>
-              <a:t> </a:t>
-            </a:r>
-            <a:r>
-              <a:rPr lang="en-US" dirty="0" err="1" smtClean="0"/>
-              <a:t>responsáveis</a:t>
-            </a:r>
-            <a:r>
-              <a:rPr lang="en-US" dirty="0" smtClean="0"/>
-              <a:t> </a:t>
-            </a:r>
-            <a:r>
-              <a:rPr lang="en-US" dirty="0" err="1" smtClean="0"/>
-              <a:t>receberem</a:t>
-            </a:r>
-            <a:r>
-              <a:rPr lang="en-US" dirty="0" smtClean="0"/>
-              <a:t>, é a </a:t>
-            </a:r>
-            <a:r>
-              <a:rPr lang="en-US" dirty="0" err="1" smtClean="0"/>
-              <a:t>falta</a:t>
-            </a:r>
-            <a:r>
-              <a:rPr lang="en-US" dirty="0" smtClean="0"/>
-              <a:t> do </a:t>
-            </a:r>
-            <a:r>
-              <a:rPr lang="en-US" dirty="0" err="1" smtClean="0"/>
-              <a:t>aluno</a:t>
-            </a:r>
-            <a:r>
-              <a:rPr lang="en-US" dirty="0" smtClean="0"/>
-              <a:t> </a:t>
-            </a:r>
-            <a:r>
-              <a:rPr lang="en-US" dirty="0" err="1" smtClean="0"/>
-              <a:t>na</a:t>
-            </a:r>
-            <a:r>
-              <a:rPr lang="en-US" dirty="0" smtClean="0"/>
-              <a:t> </a:t>
-            </a:r>
-            <a:r>
-              <a:rPr lang="en-US" dirty="0" err="1" smtClean="0"/>
-              <a:t>escola</a:t>
-            </a:r>
-            <a:r>
-              <a:rPr lang="en-US" dirty="0" smtClean="0"/>
-              <a:t> </a:t>
-            </a:r>
-            <a:r>
-              <a:rPr lang="en-US" dirty="0" err="1" smtClean="0"/>
-              <a:t>naquele</a:t>
-            </a:r>
-            <a:r>
-              <a:rPr lang="en-US" dirty="0" smtClean="0"/>
-              <a:t> dia. </a:t>
-            </a:r>
-            <a:r>
-              <a:rPr lang="en-US" dirty="0" err="1" smtClean="0"/>
-              <a:t>Importante</a:t>
-            </a:r>
-            <a:r>
-              <a:rPr lang="en-US" dirty="0" smtClean="0"/>
-              <a:t> para o </a:t>
-            </a:r>
-            <a:r>
-              <a:rPr lang="en-US" dirty="0" err="1" smtClean="0"/>
-              <a:t>controle</a:t>
-            </a:r>
-            <a:r>
-              <a:rPr lang="en-US" dirty="0" smtClean="0"/>
-              <a:t> a </a:t>
-            </a:r>
-            <a:r>
-              <a:rPr lang="en-US" dirty="0" err="1" smtClean="0"/>
-              <a:t>todos</a:t>
-            </a:r>
-            <a:r>
-              <a:rPr lang="en-US" dirty="0" smtClean="0"/>
-              <a:t> </a:t>
-            </a:r>
-            <a:r>
-              <a:rPr lang="en-US" dirty="0" err="1" smtClean="0"/>
-              <a:t>os</a:t>
-            </a:r>
-            <a:r>
-              <a:rPr lang="en-US" dirty="0" smtClean="0"/>
-              <a:t> </a:t>
-            </a:r>
-            <a:r>
-              <a:rPr lang="en-US" dirty="0" err="1" smtClean="0"/>
-              <a:t>responsáveis</a:t>
-            </a:r>
-            <a:r>
-              <a:rPr lang="en-US" dirty="0" smtClean="0"/>
-              <a:t>.</a:t>
-            </a:r>
-          </a:p>
-          <a:p>
-            <a:r>
-              <a:rPr lang="en-US" dirty="0" err="1" smtClean="0"/>
-              <a:t>Nas</a:t>
-            </a:r>
-            <a:r>
-              <a:rPr lang="en-US" dirty="0" smtClean="0"/>
-              <a:t> </a:t>
-            </a:r>
-            <a:r>
-              <a:rPr lang="en-US" dirty="0" err="1" smtClean="0"/>
-              <a:t>escolas</a:t>
-            </a:r>
-            <a:r>
-              <a:rPr lang="en-US" dirty="0" smtClean="0"/>
-              <a:t> </a:t>
-            </a:r>
-            <a:r>
-              <a:rPr lang="en-US" dirty="0" err="1" smtClean="0"/>
-              <a:t>particulares</a:t>
-            </a:r>
-            <a:r>
-              <a:rPr lang="en-US" dirty="0" smtClean="0"/>
-              <a:t>, a </a:t>
-            </a:r>
-            <a:r>
-              <a:rPr lang="en-US" dirty="0" err="1" smtClean="0"/>
-              <a:t>geração</a:t>
-            </a:r>
-            <a:r>
-              <a:rPr lang="en-US" dirty="0" smtClean="0"/>
-              <a:t> de </a:t>
-            </a:r>
-            <a:r>
-              <a:rPr lang="en-US" dirty="0" err="1" smtClean="0"/>
-              <a:t>boletos</a:t>
-            </a:r>
-            <a:r>
-              <a:rPr lang="en-US" dirty="0" smtClean="0"/>
-              <a:t> </a:t>
-            </a:r>
-            <a:r>
-              <a:rPr lang="en-US" dirty="0" err="1" smtClean="0"/>
-              <a:t>bancários</a:t>
-            </a:r>
-            <a:r>
-              <a:rPr lang="en-US" dirty="0"/>
-              <a:t>.</a:t>
-            </a:r>
-            <a:endParaRPr lang="en-US" dirty="0" smtClean="0"/>
+              <a:rPr lang="pt-BR" sz="2700" dirty="0"/>
+              <a:t>Para evolução do sistema será muito importante a inserção dos dados, para que o sistema fique sempre atualizado, pois se trata de informações importantes aos responsáveis e também para a escola.</a:t>
+            </a:r>
+          </a:p>
+          <a:p>
+            <a:endParaRPr lang="pt-BR" dirty="0" smtClean="0"/>
           </a:p>
         </p:txBody>
       </p:sp>
@@ -7114,8 +7912,8 @@
           <a:lstStyle/>
           <a:p>
             <a:r>
-              <a:rPr lang="pt-BR" dirty="0"/>
-              <a:t>17/05/2014</a:t>
+              <a:rPr lang="pt-BR" dirty="0" smtClean="0"/>
+              <a:t>10/06/2014</a:t>
             </a:r>
             <a:endParaRPr lang="pt-BR" dirty="0" smtClean="0"/>
           </a:p>

</xml_diff>

<commit_message>
Inseri os diagramas de classes e comunicação de Alunos e refinei algumas coisas da apresentação
</commit_message>
<xml_diff>
--- a/documentacao/G5_Apresentacao1sem2014.pptx
+++ b/documentacao/G5_Apresentacao1sem2014.pptx
@@ -5,10 +5,10 @@
     <p:sldMasterId id="2147483657" r:id="rId1"/>
   </p:sldMasterIdLst>
   <p:notesMasterIdLst>
-    <p:notesMasterId r:id="rId10"/>
+    <p:notesMasterId r:id="rId16"/>
   </p:notesMasterIdLst>
   <p:handoutMasterIdLst>
-    <p:handoutMasterId r:id="rId11"/>
+    <p:handoutMasterId r:id="rId17"/>
   </p:handoutMasterIdLst>
   <p:sldIdLst>
     <p:sldId id="256" r:id="rId2"/>
@@ -18,7 +18,13 @@
     <p:sldId id="266" r:id="rId6"/>
     <p:sldId id="267" r:id="rId7"/>
     <p:sldId id="264" r:id="rId8"/>
-    <p:sldId id="263" r:id="rId9"/>
+    <p:sldId id="268" r:id="rId9"/>
+    <p:sldId id="269" r:id="rId10"/>
+    <p:sldId id="270" r:id="rId11"/>
+    <p:sldId id="271" r:id="rId12"/>
+    <p:sldId id="272" r:id="rId13"/>
+    <p:sldId id="273" r:id="rId14"/>
+    <p:sldId id="263" r:id="rId15"/>
   </p:sldIdLst>
   <p:sldSz cx="9144000" cy="6858000" type="screen4x3"/>
   <p:notesSz cx="7010400" cy="9296400"/>
@@ -263,7 +269,7 @@
             <a:fld id="{387DC7E4-63C1-42C9-AC56-2D8DD4349572}" type="datetimeFigureOut">
               <a:rPr lang="pt-BR" smtClean="0"/>
               <a:pPr/>
-              <a:t>19/05/2014</a:t>
+              <a:t>22/05/2014</a:t>
             </a:fld>
             <a:endParaRPr lang="pt-BR"/>
           </a:p>
@@ -4982,7 +4988,6 @@
               <a:rPr lang="pt-BR" sz="4800" dirty="0"/>
               <a:t>ESCOLARES</a:t>
             </a:r>
-            <a:endParaRPr lang="pt-BR" sz="4800" dirty="0"/>
           </a:p>
         </p:txBody>
       </p:sp>
@@ -5133,15 +5138,1033 @@
   <p:clrMapOvr>
     <a:masterClrMapping/>
   </p:clrMapOvr>
-  <p:transition spd="slow">
-    <p:dissolve/>
-  </p:transition>
+  <mc:AlternateContent xmlns:mc="http://schemas.openxmlformats.org/markup-compatibility/2006">
+    <mc:Choice xmlns:p14="http://schemas.microsoft.com/office/powerpoint/2010/main" Requires="p14">
+      <p:transition p14:dur="0"/>
+    </mc:Choice>
+    <mc:Fallback>
+      <p:transition/>
+    </mc:Fallback>
+  </mc:AlternateContent>
   <p:timing>
     <p:tnLst>
       <p:par>
         <p:cTn id="1" dur="indefinite" restart="never" nodeType="tmRoot"/>
       </p:par>
     </p:tnLst>
+  </p:timing>
+</p:sld>
+</file>
+
+<file path=ppt/slides/slide10.xml><?xml version="1.0" encoding="utf-8"?>
+<p:sld xmlns:a="http://schemas.openxmlformats.org/drawingml/2006/main" xmlns:r="http://schemas.openxmlformats.org/officeDocument/2006/relationships" xmlns:p="http://schemas.openxmlformats.org/presentationml/2006/main">
+  <p:cSld>
+    <p:spTree>
+      <p:nvGrpSpPr>
+        <p:cNvPr id="1" name=""/>
+        <p:cNvGrpSpPr/>
+        <p:nvPr/>
+      </p:nvGrpSpPr>
+      <p:grpSpPr>
+        <a:xfrm>
+          <a:off x="0" y="0"/>
+          <a:ext cx="0" cy="0"/>
+          <a:chOff x="0" y="0"/>
+          <a:chExt cx="0" cy="0"/>
+        </a:xfrm>
+      </p:grpSpPr>
+      <p:sp>
+        <p:nvSpPr>
+          <p:cNvPr id="2" name="Título 1"/>
+          <p:cNvSpPr>
+            <a:spLocks noGrp="1"/>
+          </p:cNvSpPr>
+          <p:nvPr>
+            <p:ph type="title"/>
+          </p:nvPr>
+        </p:nvSpPr>
+        <p:spPr/>
+        <p:txBody>
+          <a:bodyPr/>
+          <a:lstStyle/>
+          <a:p>
+            <a:r>
+              <a:rPr lang="pt-BR" dirty="0" smtClean="0"/>
+              <a:t>Diagrama de </a:t>
+            </a:r>
+            <a:r>
+              <a:rPr lang="pt-BR" dirty="0"/>
+              <a:t>Comunicação</a:t>
+            </a:r>
+            <a:br>
+              <a:rPr lang="pt-BR" dirty="0"/>
+            </a:br>
+            <a:r>
+              <a:rPr lang="pt-BR" sz="2800" dirty="0"/>
+              <a:t>Caso de Uso </a:t>
+            </a:r>
+            <a:r>
+              <a:rPr lang="pt-BR" sz="2800" dirty="0" smtClean="0"/>
+              <a:t>&lt;Consultar </a:t>
+            </a:r>
+            <a:r>
+              <a:rPr lang="pt-BR" sz="2800" dirty="0"/>
+              <a:t>Aluno&gt;</a:t>
+            </a:r>
+            <a:endParaRPr lang="pt-BR" dirty="0"/>
+          </a:p>
+        </p:txBody>
+      </p:sp>
+      <p:pic>
+        <p:nvPicPr>
+          <p:cNvPr id="7" name="Espaço Reservado para Conteúdo 6"/>
+          <p:cNvPicPr>
+            <a:picLocks noGrp="1" noChangeAspect="1"/>
+          </p:cNvPicPr>
+          <p:nvPr>
+            <p:ph idx="1"/>
+          </p:nvPr>
+        </p:nvPicPr>
+        <p:blipFill>
+          <a:blip r:embed="rId2">
+            <a:extLst>
+              <a:ext uri="{28A0092B-C50C-407E-A947-70E740481C1C}">
+                <a14:useLocalDpi xmlns:a14="http://schemas.microsoft.com/office/drawing/2010/main" val="0"/>
+              </a:ext>
+            </a:extLst>
+          </a:blip>
+          <a:stretch>
+            <a:fillRect/>
+          </a:stretch>
+        </p:blipFill>
+        <p:spPr>
+          <a:xfrm>
+            <a:off x="747178" y="1628800"/>
+            <a:ext cx="7649643" cy="4536504"/>
+          </a:xfrm>
+        </p:spPr>
+      </p:pic>
+      <p:sp>
+        <p:nvSpPr>
+          <p:cNvPr id="4" name="Espaço Reservado para Data 3"/>
+          <p:cNvSpPr>
+            <a:spLocks noGrp="1"/>
+          </p:cNvSpPr>
+          <p:nvPr>
+            <p:ph type="dt" sz="half" idx="10"/>
+          </p:nvPr>
+        </p:nvSpPr>
+        <p:spPr/>
+        <p:txBody>
+          <a:bodyPr/>
+          <a:lstStyle/>
+          <a:p>
+            <a:r>
+              <a:rPr lang="pt-BR" dirty="0"/>
+              <a:t>10/06/2014</a:t>
+            </a:r>
+            <a:endParaRPr lang="pt-BR" dirty="0"/>
+          </a:p>
+        </p:txBody>
+      </p:sp>
+      <p:sp>
+        <p:nvSpPr>
+          <p:cNvPr id="5" name="Espaço Reservado para Rodapé 4"/>
+          <p:cNvSpPr>
+            <a:spLocks noGrp="1"/>
+          </p:cNvSpPr>
+          <p:nvPr>
+            <p:ph type="ftr" sz="quarter" idx="11"/>
+          </p:nvPr>
+        </p:nvSpPr>
+        <p:spPr/>
+        <p:txBody>
+          <a:bodyPr/>
+          <a:lstStyle/>
+          <a:p>
+            <a:r>
+              <a:rPr lang="pt-BR" smtClean="0"/>
+              <a:t>Veris Faculdades TCM/3ADS</a:t>
+            </a:r>
+            <a:endParaRPr lang="pt-BR" dirty="0"/>
+          </a:p>
+        </p:txBody>
+      </p:sp>
+      <p:sp>
+        <p:nvSpPr>
+          <p:cNvPr id="6" name="Espaço Reservado para Número de Slide 5"/>
+          <p:cNvSpPr>
+            <a:spLocks noGrp="1"/>
+          </p:cNvSpPr>
+          <p:nvPr>
+            <p:ph type="sldNum" sz="quarter" idx="12"/>
+          </p:nvPr>
+        </p:nvSpPr>
+        <p:spPr/>
+        <p:txBody>
+          <a:bodyPr/>
+          <a:lstStyle/>
+          <a:p>
+            <a:fld id="{516476CB-12D4-456A-BCEE-8469A8C40045}" type="slidenum">
+              <a:rPr lang="pt-BR" smtClean="0"/>
+              <a:pPr/>
+              <a:t>10</a:t>
+            </a:fld>
+            <a:endParaRPr lang="pt-BR"/>
+          </a:p>
+        </p:txBody>
+      </p:sp>
+    </p:spTree>
+    <p:extLst>
+      <p:ext uri="{BB962C8B-B14F-4D97-AF65-F5344CB8AC3E}">
+        <p14:creationId xmlns:p14="http://schemas.microsoft.com/office/powerpoint/2010/main" val="3208232615"/>
+      </p:ext>
+    </p:extLst>
+  </p:cSld>
+  <p:clrMapOvr>
+    <a:masterClrMapping/>
+  </p:clrMapOvr>
+  <mc:AlternateContent xmlns:mc="http://schemas.openxmlformats.org/markup-compatibility/2006">
+    <mc:Choice xmlns:p14="http://schemas.microsoft.com/office/powerpoint/2010/main" Requires="p14">
+      <p:transition p14:dur="0"/>
+    </mc:Choice>
+    <mc:Fallback>
+      <p:transition/>
+    </mc:Fallback>
+  </mc:AlternateContent>
+  <p:timing>
+    <p:tnLst>
+      <p:par>
+        <p:cTn id="1" dur="indefinite" restart="never" nodeType="tmRoot"/>
+      </p:par>
+    </p:tnLst>
+  </p:timing>
+</p:sld>
+</file>
+
+<file path=ppt/slides/slide11.xml><?xml version="1.0" encoding="utf-8"?>
+<p:sld xmlns:a="http://schemas.openxmlformats.org/drawingml/2006/main" xmlns:r="http://schemas.openxmlformats.org/officeDocument/2006/relationships" xmlns:p="http://schemas.openxmlformats.org/presentationml/2006/main">
+  <p:cSld>
+    <p:spTree>
+      <p:nvGrpSpPr>
+        <p:cNvPr id="1" name=""/>
+        <p:cNvGrpSpPr/>
+        <p:nvPr/>
+      </p:nvGrpSpPr>
+      <p:grpSpPr>
+        <a:xfrm>
+          <a:off x="0" y="0"/>
+          <a:ext cx="0" cy="0"/>
+          <a:chOff x="0" y="0"/>
+          <a:chExt cx="0" cy="0"/>
+        </a:xfrm>
+      </p:grpSpPr>
+      <p:sp>
+        <p:nvSpPr>
+          <p:cNvPr id="2" name="Título 1"/>
+          <p:cNvSpPr>
+            <a:spLocks noGrp="1"/>
+          </p:cNvSpPr>
+          <p:nvPr>
+            <p:ph type="title"/>
+          </p:nvPr>
+        </p:nvSpPr>
+        <p:spPr/>
+        <p:txBody>
+          <a:bodyPr/>
+          <a:lstStyle/>
+          <a:p>
+            <a:r>
+              <a:rPr lang="pt-BR" dirty="0"/>
+              <a:t>Diagrama </a:t>
+            </a:r>
+            <a:r>
+              <a:rPr lang="pt-BR" dirty="0" smtClean="0"/>
+              <a:t>de Classe</a:t>
+            </a:r>
+            <a:r>
+              <a:rPr lang="pt-BR" dirty="0"/>
+              <a:t/>
+            </a:r>
+            <a:br>
+              <a:rPr lang="pt-BR" dirty="0"/>
+            </a:br>
+            <a:r>
+              <a:rPr lang="pt-BR" sz="2800" dirty="0"/>
+              <a:t>Caso de Uso &lt;</a:t>
+            </a:r>
+            <a:r>
+              <a:rPr lang="pt-BR" sz="2800" dirty="0" smtClean="0"/>
+              <a:t>Cadastrar </a:t>
+            </a:r>
+            <a:r>
+              <a:rPr lang="pt-BR" sz="2800" dirty="0"/>
+              <a:t>Aluno&gt;</a:t>
+            </a:r>
+            <a:endParaRPr lang="pt-BR" dirty="0"/>
+          </a:p>
+        </p:txBody>
+      </p:sp>
+      <p:pic>
+        <p:nvPicPr>
+          <p:cNvPr id="8" name="Espaço Reservado para Conteúdo 7"/>
+          <p:cNvPicPr>
+            <a:picLocks noGrp="1" noChangeAspect="1"/>
+          </p:cNvPicPr>
+          <p:nvPr>
+            <p:ph idx="1"/>
+          </p:nvPr>
+        </p:nvPicPr>
+        <p:blipFill>
+          <a:blip r:embed="rId2">
+            <a:extLst>
+              <a:ext uri="{28A0092B-C50C-407E-A947-70E740481C1C}">
+                <a14:useLocalDpi xmlns:a14="http://schemas.microsoft.com/office/drawing/2010/main" val="0"/>
+              </a:ext>
+            </a:extLst>
+          </a:blip>
+          <a:stretch>
+            <a:fillRect/>
+          </a:stretch>
+        </p:blipFill>
+        <p:spPr>
+          <a:xfrm>
+            <a:off x="1187624" y="1600200"/>
+            <a:ext cx="6768752" cy="4530725"/>
+          </a:xfrm>
+        </p:spPr>
+      </p:pic>
+      <p:sp>
+        <p:nvSpPr>
+          <p:cNvPr id="4" name="Espaço Reservado para Data 3"/>
+          <p:cNvSpPr>
+            <a:spLocks noGrp="1"/>
+          </p:cNvSpPr>
+          <p:nvPr>
+            <p:ph type="dt" sz="half" idx="10"/>
+          </p:nvPr>
+        </p:nvSpPr>
+        <p:spPr/>
+        <p:txBody>
+          <a:bodyPr/>
+          <a:lstStyle/>
+          <a:p>
+            <a:r>
+              <a:rPr lang="pt-BR" dirty="0"/>
+              <a:t>10/06/2014</a:t>
+            </a:r>
+            <a:endParaRPr lang="pt-BR" dirty="0"/>
+          </a:p>
+        </p:txBody>
+      </p:sp>
+      <p:sp>
+        <p:nvSpPr>
+          <p:cNvPr id="5" name="Espaço Reservado para Rodapé 4"/>
+          <p:cNvSpPr>
+            <a:spLocks noGrp="1"/>
+          </p:cNvSpPr>
+          <p:nvPr>
+            <p:ph type="ftr" sz="quarter" idx="11"/>
+          </p:nvPr>
+        </p:nvSpPr>
+        <p:spPr/>
+        <p:txBody>
+          <a:bodyPr/>
+          <a:lstStyle/>
+          <a:p>
+            <a:r>
+              <a:rPr lang="pt-BR" smtClean="0"/>
+              <a:t>Veris Faculdades TCM/3ADS</a:t>
+            </a:r>
+            <a:endParaRPr lang="pt-BR" dirty="0"/>
+          </a:p>
+        </p:txBody>
+      </p:sp>
+      <p:sp>
+        <p:nvSpPr>
+          <p:cNvPr id="6" name="Espaço Reservado para Número de Slide 5"/>
+          <p:cNvSpPr>
+            <a:spLocks noGrp="1"/>
+          </p:cNvSpPr>
+          <p:nvPr>
+            <p:ph type="sldNum" sz="quarter" idx="12"/>
+          </p:nvPr>
+        </p:nvSpPr>
+        <p:spPr/>
+        <p:txBody>
+          <a:bodyPr/>
+          <a:lstStyle/>
+          <a:p>
+            <a:fld id="{516476CB-12D4-456A-BCEE-8469A8C40045}" type="slidenum">
+              <a:rPr lang="pt-BR" smtClean="0"/>
+              <a:pPr/>
+              <a:t>11</a:t>
+            </a:fld>
+            <a:endParaRPr lang="pt-BR"/>
+          </a:p>
+        </p:txBody>
+      </p:sp>
+    </p:spTree>
+    <p:extLst>
+      <p:ext uri="{BB962C8B-B14F-4D97-AF65-F5344CB8AC3E}">
+        <p14:creationId xmlns:p14="http://schemas.microsoft.com/office/powerpoint/2010/main" val="3652049513"/>
+      </p:ext>
+    </p:extLst>
+  </p:cSld>
+  <p:clrMapOvr>
+    <a:masterClrMapping/>
+  </p:clrMapOvr>
+  <mc:AlternateContent xmlns:mc="http://schemas.openxmlformats.org/markup-compatibility/2006">
+    <mc:Choice xmlns:p14="http://schemas.microsoft.com/office/powerpoint/2010/main" Requires="p14">
+      <p:transition p14:dur="0"/>
+    </mc:Choice>
+    <mc:Fallback>
+      <p:transition/>
+    </mc:Fallback>
+  </mc:AlternateContent>
+  <p:timing>
+    <p:tnLst>
+      <p:par>
+        <p:cTn id="1" dur="indefinite" restart="never" nodeType="tmRoot"/>
+      </p:par>
+    </p:tnLst>
+  </p:timing>
+</p:sld>
+</file>
+
+<file path=ppt/slides/slide12.xml><?xml version="1.0" encoding="utf-8"?>
+<p:sld xmlns:a="http://schemas.openxmlformats.org/drawingml/2006/main" xmlns:r="http://schemas.openxmlformats.org/officeDocument/2006/relationships" xmlns:p="http://schemas.openxmlformats.org/presentationml/2006/main">
+  <p:cSld>
+    <p:spTree>
+      <p:nvGrpSpPr>
+        <p:cNvPr id="1" name=""/>
+        <p:cNvGrpSpPr/>
+        <p:nvPr/>
+      </p:nvGrpSpPr>
+      <p:grpSpPr>
+        <a:xfrm>
+          <a:off x="0" y="0"/>
+          <a:ext cx="0" cy="0"/>
+          <a:chOff x="0" y="0"/>
+          <a:chExt cx="0" cy="0"/>
+        </a:xfrm>
+      </p:grpSpPr>
+      <p:sp>
+        <p:nvSpPr>
+          <p:cNvPr id="2" name="Título 1"/>
+          <p:cNvSpPr>
+            <a:spLocks noGrp="1"/>
+          </p:cNvSpPr>
+          <p:nvPr>
+            <p:ph type="title"/>
+          </p:nvPr>
+        </p:nvSpPr>
+        <p:spPr/>
+        <p:txBody>
+          <a:bodyPr/>
+          <a:lstStyle/>
+          <a:p>
+            <a:r>
+              <a:rPr lang="pt-BR" dirty="0" smtClean="0"/>
+              <a:t>Diagrama de </a:t>
+            </a:r>
+            <a:r>
+              <a:rPr lang="pt-BR" dirty="0"/>
+              <a:t>Classe</a:t>
+            </a:r>
+            <a:br>
+              <a:rPr lang="pt-BR" dirty="0"/>
+            </a:br>
+            <a:r>
+              <a:rPr lang="pt-BR" sz="2800" dirty="0"/>
+              <a:t>Caso de Uso </a:t>
+            </a:r>
+            <a:r>
+              <a:rPr lang="pt-BR" sz="2800" dirty="0" smtClean="0"/>
+              <a:t>&lt;Editar </a:t>
+            </a:r>
+            <a:r>
+              <a:rPr lang="pt-BR" sz="2800" dirty="0"/>
+              <a:t>Aluno&gt;</a:t>
+            </a:r>
+          </a:p>
+        </p:txBody>
+      </p:sp>
+      <p:pic>
+        <p:nvPicPr>
+          <p:cNvPr id="8" name="Espaço Reservado para Conteúdo 7"/>
+          <p:cNvPicPr>
+            <a:picLocks noGrp="1" noChangeAspect="1"/>
+          </p:cNvPicPr>
+          <p:nvPr>
+            <p:ph idx="1"/>
+          </p:nvPr>
+        </p:nvPicPr>
+        <p:blipFill>
+          <a:blip r:embed="rId2">
+            <a:extLst>
+              <a:ext uri="{28A0092B-C50C-407E-A947-70E740481C1C}">
+                <a14:useLocalDpi xmlns:a14="http://schemas.microsoft.com/office/drawing/2010/main" val="0"/>
+              </a:ext>
+            </a:extLst>
+          </a:blip>
+          <a:stretch>
+            <a:fillRect/>
+          </a:stretch>
+        </p:blipFill>
+        <p:spPr/>
+      </p:pic>
+      <p:sp>
+        <p:nvSpPr>
+          <p:cNvPr id="4" name="Espaço Reservado para Data 3"/>
+          <p:cNvSpPr>
+            <a:spLocks noGrp="1"/>
+          </p:cNvSpPr>
+          <p:nvPr>
+            <p:ph type="dt" sz="half" idx="10"/>
+          </p:nvPr>
+        </p:nvSpPr>
+        <p:spPr/>
+        <p:txBody>
+          <a:bodyPr/>
+          <a:lstStyle/>
+          <a:p>
+            <a:r>
+              <a:rPr lang="pt-BR" dirty="0"/>
+              <a:t>10/06/2014</a:t>
+            </a:r>
+            <a:endParaRPr lang="pt-BR" dirty="0"/>
+          </a:p>
+        </p:txBody>
+      </p:sp>
+      <p:sp>
+        <p:nvSpPr>
+          <p:cNvPr id="5" name="Espaço Reservado para Rodapé 4"/>
+          <p:cNvSpPr>
+            <a:spLocks noGrp="1"/>
+          </p:cNvSpPr>
+          <p:nvPr>
+            <p:ph type="ftr" sz="quarter" idx="11"/>
+          </p:nvPr>
+        </p:nvSpPr>
+        <p:spPr/>
+        <p:txBody>
+          <a:bodyPr/>
+          <a:lstStyle/>
+          <a:p>
+            <a:r>
+              <a:rPr lang="pt-BR" smtClean="0"/>
+              <a:t>Veris Faculdades TCM/3ADS</a:t>
+            </a:r>
+            <a:endParaRPr lang="pt-BR" dirty="0"/>
+          </a:p>
+        </p:txBody>
+      </p:sp>
+      <p:sp>
+        <p:nvSpPr>
+          <p:cNvPr id="6" name="Espaço Reservado para Número de Slide 5"/>
+          <p:cNvSpPr>
+            <a:spLocks noGrp="1"/>
+          </p:cNvSpPr>
+          <p:nvPr>
+            <p:ph type="sldNum" sz="quarter" idx="12"/>
+          </p:nvPr>
+        </p:nvSpPr>
+        <p:spPr/>
+        <p:txBody>
+          <a:bodyPr/>
+          <a:lstStyle/>
+          <a:p>
+            <a:fld id="{516476CB-12D4-456A-BCEE-8469A8C40045}" type="slidenum">
+              <a:rPr lang="pt-BR" smtClean="0"/>
+              <a:pPr/>
+              <a:t>12</a:t>
+            </a:fld>
+            <a:endParaRPr lang="pt-BR"/>
+          </a:p>
+        </p:txBody>
+      </p:sp>
+    </p:spTree>
+    <p:extLst>
+      <p:ext uri="{BB962C8B-B14F-4D97-AF65-F5344CB8AC3E}">
+        <p14:creationId xmlns:p14="http://schemas.microsoft.com/office/powerpoint/2010/main" val="3789702249"/>
+      </p:ext>
+    </p:extLst>
+  </p:cSld>
+  <p:clrMapOvr>
+    <a:masterClrMapping/>
+  </p:clrMapOvr>
+  <mc:AlternateContent xmlns:mc="http://schemas.openxmlformats.org/markup-compatibility/2006">
+    <mc:Choice xmlns:p14="http://schemas.microsoft.com/office/powerpoint/2010/main" Requires="p14">
+      <p:transition p14:dur="0"/>
+    </mc:Choice>
+    <mc:Fallback>
+      <p:transition/>
+    </mc:Fallback>
+  </mc:AlternateContent>
+  <p:timing>
+    <p:tnLst>
+      <p:par>
+        <p:cTn id="1" dur="indefinite" restart="never" nodeType="tmRoot"/>
+      </p:par>
+    </p:tnLst>
+  </p:timing>
+</p:sld>
+</file>
+
+<file path=ppt/slides/slide13.xml><?xml version="1.0" encoding="utf-8"?>
+<p:sld xmlns:a="http://schemas.openxmlformats.org/drawingml/2006/main" xmlns:r="http://schemas.openxmlformats.org/officeDocument/2006/relationships" xmlns:p="http://schemas.openxmlformats.org/presentationml/2006/main">
+  <p:cSld>
+    <p:spTree>
+      <p:nvGrpSpPr>
+        <p:cNvPr id="1" name=""/>
+        <p:cNvGrpSpPr/>
+        <p:nvPr/>
+      </p:nvGrpSpPr>
+      <p:grpSpPr>
+        <a:xfrm>
+          <a:off x="0" y="0"/>
+          <a:ext cx="0" cy="0"/>
+          <a:chOff x="0" y="0"/>
+          <a:chExt cx="0" cy="0"/>
+        </a:xfrm>
+      </p:grpSpPr>
+      <p:sp>
+        <p:nvSpPr>
+          <p:cNvPr id="2" name="Título 1"/>
+          <p:cNvSpPr>
+            <a:spLocks noGrp="1"/>
+          </p:cNvSpPr>
+          <p:nvPr>
+            <p:ph type="title"/>
+          </p:nvPr>
+        </p:nvSpPr>
+        <p:spPr/>
+        <p:txBody>
+          <a:bodyPr/>
+          <a:lstStyle/>
+          <a:p>
+            <a:r>
+              <a:rPr lang="pt-BR" dirty="0"/>
+              <a:t>Diagrama </a:t>
+            </a:r>
+            <a:r>
+              <a:rPr lang="pt-BR" dirty="0" smtClean="0"/>
+              <a:t>de Classe</a:t>
+            </a:r>
+            <a:r>
+              <a:rPr lang="pt-BR" dirty="0"/>
+              <a:t/>
+            </a:r>
+            <a:br>
+              <a:rPr lang="pt-BR" dirty="0"/>
+            </a:br>
+            <a:r>
+              <a:rPr lang="pt-BR" sz="2800" dirty="0"/>
+              <a:t>Caso de Uso &lt;</a:t>
+            </a:r>
+            <a:r>
+              <a:rPr lang="pt-BR" sz="2800" dirty="0" smtClean="0"/>
+              <a:t>Consultar </a:t>
+            </a:r>
+            <a:r>
+              <a:rPr lang="pt-BR" sz="2800" dirty="0"/>
+              <a:t>Aluno&gt;</a:t>
+            </a:r>
+            <a:endParaRPr lang="pt-BR" dirty="0"/>
+          </a:p>
+        </p:txBody>
+      </p:sp>
+      <p:pic>
+        <p:nvPicPr>
+          <p:cNvPr id="8" name="Espaço Reservado para Conteúdo 7"/>
+          <p:cNvPicPr>
+            <a:picLocks noGrp="1" noChangeAspect="1"/>
+          </p:cNvPicPr>
+          <p:nvPr>
+            <p:ph idx="1"/>
+          </p:nvPr>
+        </p:nvPicPr>
+        <p:blipFill>
+          <a:blip r:embed="rId2">
+            <a:extLst>
+              <a:ext uri="{28A0092B-C50C-407E-A947-70E740481C1C}">
+                <a14:useLocalDpi xmlns:a14="http://schemas.microsoft.com/office/drawing/2010/main" val="0"/>
+              </a:ext>
+            </a:extLst>
+          </a:blip>
+          <a:stretch>
+            <a:fillRect/>
+          </a:stretch>
+        </p:blipFill>
+        <p:spPr>
+          <a:xfrm>
+            <a:off x="1093953" y="1600200"/>
+            <a:ext cx="6956094" cy="4530725"/>
+          </a:xfrm>
+        </p:spPr>
+      </p:pic>
+      <p:sp>
+        <p:nvSpPr>
+          <p:cNvPr id="4" name="Espaço Reservado para Data 3"/>
+          <p:cNvSpPr>
+            <a:spLocks noGrp="1"/>
+          </p:cNvSpPr>
+          <p:nvPr>
+            <p:ph type="dt" sz="half" idx="10"/>
+          </p:nvPr>
+        </p:nvSpPr>
+        <p:spPr/>
+        <p:txBody>
+          <a:bodyPr/>
+          <a:lstStyle/>
+          <a:p>
+            <a:r>
+              <a:rPr lang="pt-BR" dirty="0"/>
+              <a:t>10/06/2014</a:t>
+            </a:r>
+            <a:endParaRPr lang="pt-BR" dirty="0"/>
+          </a:p>
+        </p:txBody>
+      </p:sp>
+      <p:sp>
+        <p:nvSpPr>
+          <p:cNvPr id="5" name="Espaço Reservado para Rodapé 4"/>
+          <p:cNvSpPr>
+            <a:spLocks noGrp="1"/>
+          </p:cNvSpPr>
+          <p:nvPr>
+            <p:ph type="ftr" sz="quarter" idx="11"/>
+          </p:nvPr>
+        </p:nvSpPr>
+        <p:spPr/>
+        <p:txBody>
+          <a:bodyPr/>
+          <a:lstStyle/>
+          <a:p>
+            <a:r>
+              <a:rPr lang="pt-BR" smtClean="0"/>
+              <a:t>Veris Faculdades TCM/3ADS</a:t>
+            </a:r>
+            <a:endParaRPr lang="pt-BR" dirty="0"/>
+          </a:p>
+        </p:txBody>
+      </p:sp>
+      <p:sp>
+        <p:nvSpPr>
+          <p:cNvPr id="6" name="Espaço Reservado para Número de Slide 5"/>
+          <p:cNvSpPr>
+            <a:spLocks noGrp="1"/>
+          </p:cNvSpPr>
+          <p:nvPr>
+            <p:ph type="sldNum" sz="quarter" idx="12"/>
+          </p:nvPr>
+        </p:nvSpPr>
+        <p:spPr/>
+        <p:txBody>
+          <a:bodyPr/>
+          <a:lstStyle/>
+          <a:p>
+            <a:fld id="{516476CB-12D4-456A-BCEE-8469A8C40045}" type="slidenum">
+              <a:rPr lang="pt-BR" smtClean="0"/>
+              <a:pPr/>
+              <a:t>13</a:t>
+            </a:fld>
+            <a:endParaRPr lang="pt-BR"/>
+          </a:p>
+        </p:txBody>
+      </p:sp>
+    </p:spTree>
+    <p:extLst>
+      <p:ext uri="{BB962C8B-B14F-4D97-AF65-F5344CB8AC3E}">
+        <p14:creationId xmlns:p14="http://schemas.microsoft.com/office/powerpoint/2010/main" val="1492974733"/>
+      </p:ext>
+    </p:extLst>
+  </p:cSld>
+  <p:clrMapOvr>
+    <a:masterClrMapping/>
+  </p:clrMapOvr>
+  <mc:AlternateContent xmlns:mc="http://schemas.openxmlformats.org/markup-compatibility/2006">
+    <mc:Choice xmlns:p14="http://schemas.microsoft.com/office/powerpoint/2010/main" Requires="p14">
+      <p:transition p14:dur="0"/>
+    </mc:Choice>
+    <mc:Fallback>
+      <p:transition/>
+    </mc:Fallback>
+  </mc:AlternateContent>
+  <p:timing>
+    <p:tnLst>
+      <p:par>
+        <p:cTn id="1" dur="indefinite" restart="never" nodeType="tmRoot"/>
+      </p:par>
+    </p:tnLst>
+  </p:timing>
+</p:sld>
+</file>
+
+<file path=ppt/slides/slide14.xml><?xml version="1.0" encoding="utf-8"?>
+<p:sld xmlns:a="http://schemas.openxmlformats.org/drawingml/2006/main" xmlns:r="http://schemas.openxmlformats.org/officeDocument/2006/relationships" xmlns:p="http://schemas.openxmlformats.org/presentationml/2006/main">
+  <p:cSld>
+    <p:spTree>
+      <p:nvGrpSpPr>
+        <p:cNvPr id="1" name=""/>
+        <p:cNvGrpSpPr/>
+        <p:nvPr/>
+      </p:nvGrpSpPr>
+      <p:grpSpPr>
+        <a:xfrm>
+          <a:off x="0" y="0"/>
+          <a:ext cx="0" cy="0"/>
+          <a:chOff x="0" y="0"/>
+          <a:chExt cx="0" cy="0"/>
+        </a:xfrm>
+      </p:grpSpPr>
+      <p:sp>
+        <p:nvSpPr>
+          <p:cNvPr id="19458" name="Rectangle 2"/>
+          <p:cNvSpPr>
+            <a:spLocks noGrp="1" noChangeArrowheads="1"/>
+          </p:cNvSpPr>
+          <p:nvPr>
+            <p:ph type="title"/>
+          </p:nvPr>
+        </p:nvSpPr>
+        <p:spPr/>
+        <p:txBody>
+          <a:bodyPr/>
+          <a:lstStyle/>
+          <a:p>
+            <a:r>
+              <a:rPr lang="pt-BR" dirty="0" smtClean="0"/>
+              <a:t>Conclusão</a:t>
+            </a:r>
+            <a:endParaRPr lang="pt-BR" dirty="0"/>
+          </a:p>
+        </p:txBody>
+      </p:sp>
+      <p:sp>
+        <p:nvSpPr>
+          <p:cNvPr id="19459" name="Rectangle 3"/>
+          <p:cNvSpPr>
+            <a:spLocks noGrp="1" noChangeArrowheads="1"/>
+          </p:cNvSpPr>
+          <p:nvPr>
+            <p:ph type="body" idx="1"/>
+          </p:nvPr>
+        </p:nvSpPr>
+        <p:spPr/>
+        <p:txBody>
+          <a:bodyPr/>
+          <a:lstStyle/>
+          <a:p>
+            <a:r>
+              <a:rPr lang="pt-BR" sz="2700" dirty="0"/>
+              <a:t>Podemos concluir que o sistema é uma grande ferramenta, que contribuirá para melhor acompanhamento dos pais/responsáveis na vida escolar de seus filhos, e para melhor desempenho dos profissionais que utilizarão essa ferramenta</a:t>
+            </a:r>
+            <a:r>
+              <a:rPr lang="pt-BR" sz="2700" dirty="0" smtClean="0"/>
+              <a:t>.</a:t>
+            </a:r>
+          </a:p>
+          <a:p>
+            <a:r>
+              <a:rPr lang="pt-BR" sz="2700" dirty="0" smtClean="0"/>
+              <a:t> </a:t>
+            </a:r>
+            <a:r>
+              <a:rPr lang="pt-BR" sz="2700" dirty="0"/>
+              <a:t>Para evolução do sistema será muito importante a inserção dos dados, para que o sistema fique sempre atualizado, pois se trata de informações importantes aos responsáveis e também para a escola.</a:t>
+            </a:r>
+          </a:p>
+          <a:p>
+            <a:endParaRPr lang="pt-BR" dirty="0" smtClean="0"/>
+          </a:p>
+        </p:txBody>
+      </p:sp>
+      <p:sp>
+        <p:nvSpPr>
+          <p:cNvPr id="6" name="Espaço Reservado para Data 5"/>
+          <p:cNvSpPr>
+            <a:spLocks noGrp="1"/>
+          </p:cNvSpPr>
+          <p:nvPr>
+            <p:ph type="dt" sz="half" idx="10"/>
+          </p:nvPr>
+        </p:nvSpPr>
+        <p:spPr/>
+        <p:txBody>
+          <a:bodyPr/>
+          <a:lstStyle/>
+          <a:p>
+            <a:r>
+              <a:rPr lang="pt-BR" dirty="0" smtClean="0"/>
+              <a:t>10/06/2014</a:t>
+            </a:r>
+          </a:p>
+          <a:p>
+            <a:endParaRPr lang="pt-BR" dirty="0" smtClean="0"/>
+          </a:p>
+          <a:p>
+            <a:endParaRPr lang="pt-BR" dirty="0" smtClean="0"/>
+          </a:p>
+          <a:p>
+            <a:endParaRPr lang="pt-BR" dirty="0"/>
+          </a:p>
+        </p:txBody>
+      </p:sp>
+      <p:sp>
+        <p:nvSpPr>
+          <p:cNvPr id="7" name="Espaço Reservado para Número de Slide 6"/>
+          <p:cNvSpPr>
+            <a:spLocks noGrp="1"/>
+          </p:cNvSpPr>
+          <p:nvPr>
+            <p:ph type="sldNum" sz="quarter" idx="12"/>
+          </p:nvPr>
+        </p:nvSpPr>
+        <p:spPr/>
+        <p:txBody>
+          <a:bodyPr/>
+          <a:lstStyle/>
+          <a:p>
+            <a:fld id="{516476CB-12D4-456A-BCEE-8469A8C40045}" type="slidenum">
+              <a:rPr lang="pt-BR" smtClean="0"/>
+              <a:pPr/>
+              <a:t>14</a:t>
+            </a:fld>
+            <a:endParaRPr lang="pt-BR" dirty="0"/>
+          </a:p>
+        </p:txBody>
+      </p:sp>
+      <p:sp>
+        <p:nvSpPr>
+          <p:cNvPr id="8" name="Espaço Reservado para Rodapé 7"/>
+          <p:cNvSpPr>
+            <a:spLocks noGrp="1"/>
+          </p:cNvSpPr>
+          <p:nvPr>
+            <p:ph type="ftr" sz="quarter" idx="11"/>
+          </p:nvPr>
+        </p:nvSpPr>
+        <p:spPr/>
+        <p:txBody>
+          <a:bodyPr/>
+          <a:lstStyle/>
+          <a:p>
+            <a:r>
+              <a:rPr lang="pt-BR" dirty="0" err="1"/>
+              <a:t>Metrocamp</a:t>
+            </a:r>
+            <a:r>
+              <a:rPr lang="pt-BR" dirty="0"/>
+              <a:t> </a:t>
+            </a:r>
+            <a:r>
+              <a:rPr lang="pt-BR" dirty="0" smtClean="0"/>
+              <a:t> Faculdades TCM/3ADS</a:t>
+            </a:r>
+            <a:endParaRPr lang="pt-BR" dirty="0"/>
+          </a:p>
+        </p:txBody>
+      </p:sp>
+    </p:spTree>
+  </p:cSld>
+  <p:clrMapOvr>
+    <a:masterClrMapping/>
+  </p:clrMapOvr>
+  <mc:AlternateContent xmlns:mc="http://schemas.openxmlformats.org/markup-compatibility/2006">
+    <mc:Choice xmlns:p14="http://schemas.microsoft.com/office/powerpoint/2010/main" Requires="p14">
+      <p:transition p14:dur="0"/>
+    </mc:Choice>
+    <mc:Fallback>
+      <p:transition/>
+    </mc:Fallback>
+  </mc:AlternateContent>
+  <p:timing>
+    <p:tnLst>
+      <p:par>
+        <p:cTn id="1" dur="indefinite" restart="never" nodeType="tmRoot">
+          <p:childTnLst>
+            <p:seq concurrent="1" nextAc="seek">
+              <p:cTn id="2" dur="indefinite" nodeType="mainSeq">
+                <p:childTnLst>
+                  <p:par>
+                    <p:cTn id="3" fill="hold">
+                      <p:stCondLst>
+                        <p:cond delay="indefinite"/>
+                      </p:stCondLst>
+                      <p:childTnLst>
+                        <p:par>
+                          <p:cTn id="4" fill="hold">
+                            <p:stCondLst>
+                              <p:cond delay="0"/>
+                            </p:stCondLst>
+                            <p:childTnLst>
+                              <p:par>
+                                <p:cTn id="5" presetID="21" presetClass="exit" presetSubtype="4" fill="hold" grpId="0" nodeType="clickEffect">
+                                  <p:stCondLst>
+                                    <p:cond delay="0"/>
+                                  </p:stCondLst>
+                                  <p:childTnLst>
+                                    <p:animEffect transition="out" filter="wheel(4)">
+                                      <p:cBhvr>
+                                        <p:cTn id="6" dur="2000"/>
+                                        <p:tgtEl>
+                                          <p:spTgt spid="19458"/>
+                                        </p:tgtEl>
+                                      </p:cBhvr>
+                                    </p:animEffect>
+                                    <p:set>
+                                      <p:cBhvr>
+                                        <p:cTn id="7" dur="1" fill="hold">
+                                          <p:stCondLst>
+                                            <p:cond delay="1999"/>
+                                          </p:stCondLst>
+                                        </p:cTn>
+                                        <p:tgtEl>
+                                          <p:spTgt spid="19458"/>
+                                        </p:tgtEl>
+                                        <p:attrNameLst>
+                                          <p:attrName>style.visibility</p:attrName>
+                                        </p:attrNameLst>
+                                      </p:cBhvr>
+                                      <p:to>
+                                        <p:strVal val="hidden"/>
+                                      </p:to>
+                                    </p:set>
+                                  </p:childTnLst>
+                                </p:cTn>
+                              </p:par>
+                            </p:childTnLst>
+                          </p:cTn>
+                        </p:par>
+                      </p:childTnLst>
+                    </p:cTn>
+                  </p:par>
+                </p:childTnLst>
+              </p:cTn>
+              <p:prevCondLst>
+                <p:cond evt="onPrev" delay="0">
+                  <p:tgtEl>
+                    <p:sldTgt/>
+                  </p:tgtEl>
+                </p:cond>
+              </p:prevCondLst>
+              <p:nextCondLst>
+                <p:cond evt="onNext" delay="0">
+                  <p:tgtEl>
+                    <p:sldTgt/>
+                  </p:tgtEl>
+                </p:cond>
+              </p:nextCondLst>
+            </p:seq>
+          </p:childTnLst>
+        </p:cTn>
+      </p:par>
+    </p:tnLst>
+    <p:bldLst>
+      <p:bldP spid="19458" grpId="0"/>
+    </p:bldLst>
   </p:timing>
 </p:sld>
 </file>
@@ -5210,9 +6233,12 @@
             </a:r>
             <a:r>
               <a:rPr lang="pt-BR" sz="2400" dirty="0" smtClean="0"/>
-              <a:t>Ocorrência, Cadastro de turmas e alunos”.</a:t>
-            </a:r>
-            <a:endParaRPr lang="pt-BR" sz="2400" dirty="0" smtClean="0"/>
+              <a:t>Ocorrências, Cadastros </a:t>
+            </a:r>
+            <a:r>
+              <a:rPr lang="pt-BR" sz="2400" dirty="0" smtClean="0"/>
+              <a:t>de turmas e alunos”.</a:t>
+            </a:r>
           </a:p>
           <a:p>
             <a:pPr marL="0" indent="0">
@@ -5226,15 +6252,7 @@
             </a:pPr>
             <a:r>
               <a:rPr lang="pt-BR" sz="2400" dirty="0" smtClean="0"/>
-              <a:t>“ Facilidade de acompanhamento dos pais a vida escolar dos filhos, trazendo </a:t>
-            </a:r>
-            <a:r>
-              <a:rPr lang="pt-BR" sz="2400" dirty="0" smtClean="0"/>
-              <a:t>comodidade, facilidade </a:t>
-            </a:r>
-            <a:r>
-              <a:rPr lang="pt-BR" sz="2400" dirty="0" smtClean="0"/>
-              <a:t>e segurança.”</a:t>
+              <a:t>“ Facilidade de acompanhamento dos pais a vida escolar dos filhos, trazendo comodidade, facilidade e segurança.”</a:t>
             </a:r>
           </a:p>
           <a:p>
@@ -5255,7 +6273,15 @@
           <a:p>
             <a:r>
               <a:rPr lang="pt-BR" sz="2400" dirty="0" smtClean="0"/>
-              <a:t>Gestores, Professores, Secretários, Pais e Alunos</a:t>
+              <a:t>Gestores, Professores, </a:t>
+            </a:r>
+            <a:r>
+              <a:rPr lang="pt-BR" sz="2400" dirty="0" smtClean="0"/>
+              <a:t>Secretários (a), </a:t>
+            </a:r>
+            <a:r>
+              <a:rPr lang="pt-BR" sz="2400" dirty="0" smtClean="0"/>
+              <a:t>Pais e Alunos</a:t>
             </a:r>
             <a:endParaRPr lang="pt-BR" sz="2400" dirty="0"/>
           </a:p>
@@ -5344,9 +6370,14 @@
   <p:clrMapOvr>
     <a:masterClrMapping/>
   </p:clrMapOvr>
-  <p:transition spd="slow">
-    <p:wipe dir="r"/>
-  </p:transition>
+  <mc:AlternateContent xmlns:mc="http://schemas.openxmlformats.org/markup-compatibility/2006">
+    <mc:Choice xmlns:p14="http://schemas.microsoft.com/office/powerpoint/2010/main" Requires="p14">
+      <p:transition p14:dur="0"/>
+    </mc:Choice>
+    <mc:Fallback>
+      <p:transition/>
+    </mc:Fallback>
+  </mc:AlternateContent>
   <p:timing>
     <p:tnLst>
       <p:par>
@@ -5386,8 +6417,8 @@
         </p:nvSpPr>
         <p:spPr>
           <a:xfrm>
-            <a:off x="360227" y="529295"/>
-            <a:ext cx="8229600" cy="785964"/>
+            <a:off x="440060" y="131664"/>
+            <a:ext cx="8229600" cy="1353710"/>
           </a:xfrm>
         </p:spPr>
         <p:txBody>
@@ -5396,17 +6427,27 @@
           <a:p>
             <a:r>
               <a:rPr lang="pt-BR" dirty="0" smtClean="0"/>
-              <a:t>Diagrama Caso </a:t>
+              <a:t>Diagrama </a:t>
             </a:r>
             <a:r>
               <a:rPr lang="pt-BR" dirty="0" smtClean="0"/>
-              <a:t>Uso - Visão </a:t>
-            </a:r>
-            <a:r>
-              <a:rPr lang="pt-BR" dirty="0"/>
+              <a:t>de Caso de Uso</a:t>
+            </a:r>
+            <a:br>
+              <a:rPr lang="pt-BR" dirty="0" smtClean="0"/>
+            </a:br>
+            <a:r>
+              <a:rPr lang="pt-BR" dirty="0" smtClean="0"/>
+              <a:t> </a:t>
+            </a:r>
+            <a:r>
+              <a:rPr lang="pt-BR" sz="3600" dirty="0" smtClean="0"/>
+              <a:t>Visão </a:t>
+            </a:r>
+            <a:r>
+              <a:rPr lang="pt-BR" sz="3600" dirty="0"/>
               <a:t>Geral</a:t>
             </a:r>
-            <a:endParaRPr lang="pt-BR" dirty="0"/>
           </a:p>
         </p:txBody>
       </p:sp>
@@ -5450,7 +6491,6 @@
               <a:rPr lang="pt-BR" dirty="0" smtClean="0"/>
               <a:t>Aluno</a:t>
             </a:r>
-            <a:endParaRPr lang="pt-BR" dirty="0" smtClean="0"/>
           </a:p>
           <a:p>
             <a:r>
@@ -5593,9 +6633,14 @@
   <p:clrMapOvr>
     <a:masterClrMapping/>
   </p:clrMapOvr>
-  <p:transition spd="slow">
-    <p:wipe dir="r"/>
-  </p:transition>
+  <mc:AlternateContent xmlns:mc="http://schemas.openxmlformats.org/markup-compatibility/2006">
+    <mc:Choice xmlns:p14="http://schemas.microsoft.com/office/powerpoint/2010/main" Requires="p14">
+      <p:transition p14:dur="0"/>
+    </mc:Choice>
+    <mc:Fallback>
+      <p:transition/>
+    </mc:Fallback>
+  </mc:AlternateContent>
   <p:timing>
     <p:tnLst>
       <p:par>
@@ -5645,7 +6690,11 @@
           <a:p>
             <a:r>
               <a:rPr lang="pt-BR" dirty="0" smtClean="0"/>
-              <a:t>Diagrama Caso de Uso</a:t>
+              <a:t>Diagrama de </a:t>
+            </a:r>
+            <a:r>
+              <a:rPr lang="pt-BR" dirty="0" smtClean="0"/>
+              <a:t>Caso de Uso</a:t>
             </a:r>
             <a:br>
               <a:rPr lang="pt-BR" dirty="0" smtClean="0"/>
@@ -5797,9 +6846,14 @@
   <p:clrMapOvr>
     <a:masterClrMapping/>
   </p:clrMapOvr>
-  <p:transition spd="slow">
-    <p:wipe dir="r"/>
-  </p:transition>
+  <mc:AlternateContent xmlns:mc="http://schemas.openxmlformats.org/markup-compatibility/2006">
+    <mc:Choice xmlns:p14="http://schemas.microsoft.com/office/powerpoint/2010/main" Requires="p14">
+      <p:transition p14:dur="0"/>
+    </mc:Choice>
+    <mc:Fallback>
+      <p:transition/>
+    </mc:Fallback>
+  </mc:AlternateContent>
   <p:timing>
     <p:tnLst>
       <p:par>
@@ -5849,7 +6903,15 @@
           <a:p>
             <a:r>
               <a:rPr lang="pt-BR" dirty="0" smtClean="0"/>
-              <a:t>Diagrama Caso de Uso</a:t>
+              <a:t>Diagrama </a:t>
+            </a:r>
+            <a:r>
+              <a:rPr lang="pt-BR" dirty="0" smtClean="0"/>
+              <a:t>de Caso </a:t>
+            </a:r>
+            <a:r>
+              <a:rPr lang="pt-BR" dirty="0" smtClean="0"/>
+              <a:t>de Uso</a:t>
             </a:r>
             <a:br>
               <a:rPr lang="pt-BR" dirty="0" smtClean="0"/>
@@ -6004,9 +7066,14 @@
   <p:clrMapOvr>
     <a:masterClrMapping/>
   </p:clrMapOvr>
-  <p:transition spd="slow">
-    <p:wipe dir="r"/>
-  </p:transition>
+  <mc:AlternateContent xmlns:mc="http://schemas.openxmlformats.org/markup-compatibility/2006">
+    <mc:Choice xmlns:p14="http://schemas.microsoft.com/office/powerpoint/2010/main" Requires="p14">
+      <p:transition p14:dur="0"/>
+    </mc:Choice>
+    <mc:Fallback>
+      <p:transition/>
+    </mc:Fallback>
+  </mc:AlternateContent>
   <p:timing>
     <p:tnLst>
       <p:par>
@@ -6046,8 +7113,8 @@
         </p:nvSpPr>
         <p:spPr>
           <a:xfrm>
-            <a:off x="392832" y="726513"/>
-            <a:ext cx="8229600" cy="1139825"/>
+            <a:off x="392832" y="948053"/>
+            <a:ext cx="8229600" cy="1184803"/>
           </a:xfrm>
         </p:spPr>
         <p:txBody>
@@ -6056,7 +7123,15 @@
           <a:p>
             <a:r>
               <a:rPr lang="pt-BR" dirty="0" smtClean="0"/>
-              <a:t>Diagrama Caso de Uso</a:t>
+              <a:t>Diagrama </a:t>
+            </a:r>
+            <a:r>
+              <a:rPr lang="pt-BR" dirty="0" smtClean="0"/>
+              <a:t>de Caso </a:t>
+            </a:r>
+            <a:r>
+              <a:rPr lang="pt-BR" dirty="0" smtClean="0"/>
+              <a:t>de Uso</a:t>
             </a:r>
             <a:br>
               <a:rPr lang="pt-BR" dirty="0" smtClean="0"/>
@@ -6210,9 +7285,14 @@
   <p:clrMapOvr>
     <a:masterClrMapping/>
   </p:clrMapOvr>
-  <p:transition spd="slow">
-    <p:wipe dir="r"/>
-  </p:transition>
+  <mc:AlternateContent xmlns:mc="http://schemas.openxmlformats.org/markup-compatibility/2006">
+    <mc:Choice xmlns:p14="http://schemas.microsoft.com/office/powerpoint/2010/main" Requires="p14">
+      <p:transition p14:dur="0"/>
+    </mc:Choice>
+    <mc:Fallback>
+      <p:transition/>
+    </mc:Fallback>
+  </mc:AlternateContent>
   <p:timing>
     <p:tnLst>
       <p:par>
@@ -7804,9 +8884,14 @@
   <p:clrMapOvr>
     <a:masterClrMapping/>
   </p:clrMapOvr>
-  <p:transition spd="slow">
-    <p:wipe dir="r"/>
-  </p:transition>
+  <mc:AlternateContent xmlns:mc="http://schemas.openxmlformats.org/markup-compatibility/2006">
+    <mc:Choice xmlns:p14="http://schemas.microsoft.com/office/powerpoint/2010/main" Requires="p14">
+      <p:transition p14:dur="0"/>
+    </mc:Choice>
+    <mc:Fallback>
+      <p:transition/>
+    </mc:Fallback>
+  </mc:AlternateContent>
   <p:timing>
     <p:tnLst>
       <p:par>
@@ -7836,9 +8921,9 @@
       </p:grpSpPr>
       <p:sp>
         <p:nvSpPr>
-          <p:cNvPr id="19458" name="Rectangle 2"/>
-          <p:cNvSpPr>
-            <a:spLocks noGrp="1" noChangeArrowheads="1"/>
+          <p:cNvPr id="2" name="Título 1"/>
+          <p:cNvSpPr>
+            <a:spLocks noGrp="1"/>
           </p:cNvSpPr>
           <p:nvPr>
             <p:ph type="title"/>
@@ -7851,7 +8936,14 @@
           <a:p>
             <a:r>
               <a:rPr lang="pt-BR" dirty="0" smtClean="0"/>
-              <a:t>Conclusão</a:t>
+              <a:t>Diagrama de Comunicação</a:t>
+            </a:r>
+            <a:br>
+              <a:rPr lang="pt-BR" dirty="0" smtClean="0"/>
+            </a:br>
+            <a:r>
+              <a:rPr lang="pt-BR" sz="2800" dirty="0" smtClean="0"/>
+              <a:t>Caso de Uso &lt;Cadastrar Aluno&gt;</a:t>
             </a:r>
             <a:endParaRPr lang="pt-BR" dirty="0"/>
           </a:p>
@@ -7859,46 +8951,7 @@
       </p:sp>
       <p:sp>
         <p:nvSpPr>
-          <p:cNvPr id="19459" name="Rectangle 3"/>
-          <p:cNvSpPr>
-            <a:spLocks noGrp="1" noChangeArrowheads="1"/>
-          </p:cNvSpPr>
-          <p:nvPr>
-            <p:ph type="body" idx="1"/>
-          </p:nvPr>
-        </p:nvSpPr>
-        <p:spPr/>
-        <p:txBody>
-          <a:bodyPr/>
-          <a:lstStyle/>
-          <a:p>
-            <a:r>
-              <a:rPr lang="pt-BR" sz="2700" dirty="0"/>
-              <a:t>Podemos concluir que o sistema é uma grande ferramenta, que contribuirá para melhor acompanhamento dos pais/responsáveis na vida escolar de seus filhos, e para melhor desempenho dos profissionais que utilizarão essa ferramenta</a:t>
-            </a:r>
-            <a:r>
-              <a:rPr lang="pt-BR" sz="2700" dirty="0" smtClean="0"/>
-              <a:t>.</a:t>
-            </a:r>
-          </a:p>
-          <a:p>
-            <a:r>
-              <a:rPr lang="pt-BR" sz="2700" dirty="0" smtClean="0"/>
-              <a:t> </a:t>
-            </a:r>
-            <a:r>
-              <a:rPr lang="pt-BR" sz="2700" dirty="0"/>
-              <a:t>Para evolução do sistema será muito importante a inserção dos dados, para que o sistema fique sempre atualizado, pois se trata de informações importantes aos responsáveis e também para a escola.</a:t>
-            </a:r>
-          </a:p>
-          <a:p>
-            <a:endParaRPr lang="pt-BR" dirty="0" smtClean="0"/>
-          </a:p>
-        </p:txBody>
-      </p:sp>
-      <p:sp>
-        <p:nvSpPr>
-          <p:cNvPr id="6" name="Espaço Reservado para Data 5"/>
+          <p:cNvPr id="4" name="Espaço Reservado para Data 3"/>
           <p:cNvSpPr>
             <a:spLocks noGrp="1"/>
           </p:cNvSpPr>
@@ -7915,22 +8968,40 @@
               <a:rPr lang="pt-BR" dirty="0" smtClean="0"/>
               <a:t>10/06/2014</a:t>
             </a:r>
-            <a:endParaRPr lang="pt-BR" dirty="0" smtClean="0"/>
-          </a:p>
-          <a:p>
-            <a:endParaRPr lang="pt-BR" dirty="0" smtClean="0"/>
-          </a:p>
-          <a:p>
-            <a:endParaRPr lang="pt-BR" dirty="0" smtClean="0"/>
-          </a:p>
-          <a:p>
             <a:endParaRPr lang="pt-BR" dirty="0"/>
           </a:p>
         </p:txBody>
       </p:sp>
       <p:sp>
         <p:nvSpPr>
-          <p:cNvPr id="7" name="Espaço Reservado para Número de Slide 6"/>
+          <p:cNvPr id="5" name="Espaço Reservado para Rodapé 4"/>
+          <p:cNvSpPr>
+            <a:spLocks noGrp="1"/>
+          </p:cNvSpPr>
+          <p:nvPr>
+            <p:ph type="ftr" sz="quarter" idx="11"/>
+          </p:nvPr>
+        </p:nvSpPr>
+        <p:spPr/>
+        <p:txBody>
+          <a:bodyPr/>
+          <a:lstStyle/>
+          <a:p>
+            <a:r>
+              <a:rPr lang="pt-BR" dirty="0" err="1" smtClean="0"/>
+              <a:t>Veris</a:t>
+            </a:r>
+            <a:r>
+              <a:rPr lang="pt-BR" dirty="0" smtClean="0"/>
+              <a:t> Faculdades TCM/3ADS</a:t>
+            </a:r>
+            <a:endParaRPr lang="pt-BR" dirty="0"/>
+          </a:p>
+        </p:txBody>
+      </p:sp>
+      <p:sp>
+        <p:nvSpPr>
+          <p:cNvPr id="6" name="Espaço Reservado para Número de Slide 5"/>
           <p:cNvSpPr>
             <a:spLocks noGrp="1"/>
           </p:cNvSpPr>
@@ -7948,134 +9019,249 @@
               <a:pPr/>
               <a:t>8</a:t>
             </a:fld>
-            <a:endParaRPr lang="pt-BR" dirty="0"/>
-          </a:p>
-        </p:txBody>
-      </p:sp>
-      <p:sp>
-        <p:nvSpPr>
-          <p:cNvPr id="8" name="Espaço Reservado para Rodapé 7"/>
-          <p:cNvSpPr>
-            <a:spLocks noGrp="1"/>
-          </p:cNvSpPr>
-          <p:nvPr>
-            <p:ph type="ftr" sz="quarter" idx="11"/>
-          </p:nvPr>
-        </p:nvSpPr>
-        <p:spPr/>
-        <p:txBody>
-          <a:bodyPr/>
-          <a:lstStyle/>
-          <a:p>
-            <a:r>
-              <a:rPr lang="pt-BR" dirty="0" err="1"/>
-              <a:t>Metrocamp</a:t>
-            </a:r>
-            <a:r>
-              <a:rPr lang="pt-BR" dirty="0"/>
-              <a:t> </a:t>
-            </a:r>
-            <a:r>
-              <a:rPr lang="pt-BR" dirty="0" smtClean="0"/>
-              <a:t> Faculdades TCM/3ADS</a:t>
-            </a:r>
-            <a:endParaRPr lang="pt-BR" dirty="0"/>
-          </a:p>
-        </p:txBody>
-      </p:sp>
+            <a:endParaRPr lang="pt-BR"/>
+          </a:p>
+        </p:txBody>
+      </p:sp>
+      <p:pic>
+        <p:nvPicPr>
+          <p:cNvPr id="9" name="Espaço Reservado para Conteúdo 8"/>
+          <p:cNvPicPr>
+            <a:picLocks noGrp="1" noChangeAspect="1"/>
+          </p:cNvPicPr>
+          <p:nvPr>
+            <p:ph idx="1"/>
+          </p:nvPr>
+        </p:nvPicPr>
+        <p:blipFill>
+          <a:blip r:embed="rId2">
+            <a:extLst>
+              <a:ext uri="{28A0092B-C50C-407E-A947-70E740481C1C}">
+                <a14:useLocalDpi xmlns:a14="http://schemas.microsoft.com/office/drawing/2010/main" val="0"/>
+              </a:ext>
+            </a:extLst>
+          </a:blip>
+          <a:stretch>
+            <a:fillRect/>
+          </a:stretch>
+        </p:blipFill>
+        <p:spPr>
+          <a:xfrm>
+            <a:off x="457199" y="1772816"/>
+            <a:ext cx="8418805" cy="3960439"/>
+          </a:xfrm>
+        </p:spPr>
+      </p:pic>
     </p:spTree>
+    <p:extLst>
+      <p:ext uri="{BB962C8B-B14F-4D97-AF65-F5344CB8AC3E}">
+        <p14:creationId xmlns:p14="http://schemas.microsoft.com/office/powerpoint/2010/main" val="658966904"/>
+      </p:ext>
+    </p:extLst>
   </p:cSld>
   <p:clrMapOvr>
     <a:masterClrMapping/>
   </p:clrMapOvr>
-  <p:transition spd="slow">
-    <p:wedge/>
-  </p:transition>
+  <mc:AlternateContent xmlns:mc="http://schemas.openxmlformats.org/markup-compatibility/2006">
+    <mc:Choice xmlns:p14="http://schemas.microsoft.com/office/powerpoint/2010/main" Requires="p14">
+      <p:transition p14:dur="0"/>
+    </mc:Choice>
+    <mc:Fallback>
+      <p:transition/>
+    </mc:Fallback>
+  </mc:AlternateContent>
   <p:timing>
     <p:tnLst>
       <p:par>
-        <p:cTn id="1" dur="indefinite" restart="never" nodeType="tmRoot">
-          <p:childTnLst>
-            <p:seq concurrent="1" nextAc="seek">
-              <p:cTn id="2" dur="indefinite" nodeType="mainSeq">
-                <p:childTnLst>
-                  <p:par>
-                    <p:cTn id="3" fill="hold">
-                      <p:stCondLst>
-                        <p:cond delay="indefinite"/>
-                      </p:stCondLst>
-                      <p:childTnLst>
-                        <p:par>
-                          <p:cTn id="4" fill="hold">
-                            <p:stCondLst>
-                              <p:cond delay="0"/>
-                            </p:stCondLst>
-                            <p:childTnLst>
-                              <p:par>
-                                <p:cTn id="5" presetID="21" presetClass="exit" presetSubtype="4" fill="hold" grpId="0" nodeType="clickEffect">
-                                  <p:stCondLst>
-                                    <p:cond delay="0"/>
-                                  </p:stCondLst>
-                                  <p:childTnLst>
-                                    <p:animEffect transition="out" filter="wheel(4)">
-                                      <p:cBhvr>
-                                        <p:cTn id="6" dur="2000"/>
-                                        <p:tgtEl>
-                                          <p:spTgt spid="19458"/>
-                                        </p:tgtEl>
-                                      </p:cBhvr>
-                                    </p:animEffect>
-                                    <p:set>
-                                      <p:cBhvr>
-                                        <p:cTn id="7" dur="1" fill="hold">
-                                          <p:stCondLst>
-                                            <p:cond delay="1999"/>
-                                          </p:stCondLst>
-                                        </p:cTn>
-                                        <p:tgtEl>
-                                          <p:spTgt spid="19458"/>
-                                        </p:tgtEl>
-                                        <p:attrNameLst>
-                                          <p:attrName>style.visibility</p:attrName>
-                                        </p:attrNameLst>
-                                      </p:cBhvr>
-                                      <p:to>
-                                        <p:strVal val="hidden"/>
-                                      </p:to>
-                                    </p:set>
-                                  </p:childTnLst>
-                                </p:cTn>
-                              </p:par>
-                            </p:childTnLst>
-                          </p:cTn>
-                        </p:par>
-                      </p:childTnLst>
-                    </p:cTn>
-                  </p:par>
-                </p:childTnLst>
-              </p:cTn>
-              <p:prevCondLst>
-                <p:cond evt="onPrev" delay="0">
-                  <p:tgtEl>
-                    <p:sldTgt/>
-                  </p:tgtEl>
-                </p:cond>
-              </p:prevCondLst>
-              <p:nextCondLst>
-                <p:cond evt="onNext" delay="0">
-                  <p:tgtEl>
-                    <p:sldTgt/>
-                  </p:tgtEl>
-                </p:cond>
-              </p:nextCondLst>
-            </p:seq>
-          </p:childTnLst>
-        </p:cTn>
+        <p:cTn id="1" dur="indefinite" restart="never" nodeType="tmRoot"/>
       </p:par>
     </p:tnLst>
-    <p:bldLst>
-      <p:bldP spid="19458" grpId="0"/>
-    </p:bldLst>
+  </p:timing>
+</p:sld>
+</file>
+
+<file path=ppt/slides/slide9.xml><?xml version="1.0" encoding="utf-8"?>
+<p:sld xmlns:a="http://schemas.openxmlformats.org/drawingml/2006/main" xmlns:r="http://schemas.openxmlformats.org/officeDocument/2006/relationships" xmlns:p="http://schemas.openxmlformats.org/presentationml/2006/main">
+  <p:cSld>
+    <p:spTree>
+      <p:nvGrpSpPr>
+        <p:cNvPr id="1" name=""/>
+        <p:cNvGrpSpPr/>
+        <p:nvPr/>
+      </p:nvGrpSpPr>
+      <p:grpSpPr>
+        <a:xfrm>
+          <a:off x="0" y="0"/>
+          <a:ext cx="0" cy="0"/>
+          <a:chOff x="0" y="0"/>
+          <a:chExt cx="0" cy="0"/>
+        </a:xfrm>
+      </p:grpSpPr>
+      <p:sp>
+        <p:nvSpPr>
+          <p:cNvPr id="2" name="Título 1"/>
+          <p:cNvSpPr>
+            <a:spLocks noGrp="1"/>
+          </p:cNvSpPr>
+          <p:nvPr>
+            <p:ph type="title"/>
+          </p:nvPr>
+        </p:nvSpPr>
+        <p:spPr/>
+        <p:txBody>
+          <a:bodyPr/>
+          <a:lstStyle/>
+          <a:p>
+            <a:r>
+              <a:rPr lang="pt-BR" dirty="0" smtClean="0"/>
+              <a:t>Diagrama de </a:t>
+            </a:r>
+            <a:r>
+              <a:rPr lang="pt-BR" dirty="0"/>
+              <a:t>Comunicação</a:t>
+            </a:r>
+            <a:br>
+              <a:rPr lang="pt-BR" dirty="0"/>
+            </a:br>
+            <a:r>
+              <a:rPr lang="pt-BR" sz="2800" dirty="0"/>
+              <a:t>Caso de Uso </a:t>
+            </a:r>
+            <a:r>
+              <a:rPr lang="pt-BR" sz="2800" dirty="0" smtClean="0"/>
+              <a:t>&lt;Editar </a:t>
+            </a:r>
+            <a:r>
+              <a:rPr lang="pt-BR" sz="2800" dirty="0"/>
+              <a:t>Aluno&gt;</a:t>
+            </a:r>
+            <a:endParaRPr lang="pt-BR" sz="3600" dirty="0"/>
+          </a:p>
+        </p:txBody>
+      </p:sp>
+      <p:sp>
+        <p:nvSpPr>
+          <p:cNvPr id="4" name="Espaço Reservado para Data 3"/>
+          <p:cNvSpPr>
+            <a:spLocks noGrp="1"/>
+          </p:cNvSpPr>
+          <p:nvPr>
+            <p:ph type="dt" sz="half" idx="10"/>
+          </p:nvPr>
+        </p:nvSpPr>
+        <p:spPr/>
+        <p:txBody>
+          <a:bodyPr/>
+          <a:lstStyle/>
+          <a:p>
+            <a:r>
+              <a:rPr lang="pt-BR" dirty="0" smtClean="0"/>
+              <a:t>10/06/2014</a:t>
+            </a:r>
+            <a:endParaRPr lang="pt-BR" dirty="0"/>
+          </a:p>
+        </p:txBody>
+      </p:sp>
+      <p:sp>
+        <p:nvSpPr>
+          <p:cNvPr id="5" name="Espaço Reservado para Rodapé 4"/>
+          <p:cNvSpPr>
+            <a:spLocks noGrp="1"/>
+          </p:cNvSpPr>
+          <p:nvPr>
+            <p:ph type="ftr" sz="quarter" idx="11"/>
+          </p:nvPr>
+        </p:nvSpPr>
+        <p:spPr/>
+        <p:txBody>
+          <a:bodyPr/>
+          <a:lstStyle/>
+          <a:p>
+            <a:r>
+              <a:rPr lang="pt-BR" smtClean="0"/>
+              <a:t>Veris Faculdades TCM/3ADS</a:t>
+            </a:r>
+            <a:endParaRPr lang="pt-BR" dirty="0"/>
+          </a:p>
+        </p:txBody>
+      </p:sp>
+      <p:sp>
+        <p:nvSpPr>
+          <p:cNvPr id="6" name="Espaço Reservado para Número de Slide 5"/>
+          <p:cNvSpPr>
+            <a:spLocks noGrp="1"/>
+          </p:cNvSpPr>
+          <p:nvPr>
+            <p:ph type="sldNum" sz="quarter" idx="12"/>
+          </p:nvPr>
+        </p:nvSpPr>
+        <p:spPr/>
+        <p:txBody>
+          <a:bodyPr/>
+          <a:lstStyle/>
+          <a:p>
+            <a:fld id="{516476CB-12D4-456A-BCEE-8469A8C40045}" type="slidenum">
+              <a:rPr lang="pt-BR" smtClean="0"/>
+              <a:pPr/>
+              <a:t>9</a:t>
+            </a:fld>
+            <a:endParaRPr lang="pt-BR"/>
+          </a:p>
+        </p:txBody>
+      </p:sp>
+      <p:pic>
+        <p:nvPicPr>
+          <p:cNvPr id="9" name="Espaço Reservado para Conteúdo 8"/>
+          <p:cNvPicPr>
+            <a:picLocks noGrp="1" noChangeAspect="1"/>
+          </p:cNvPicPr>
+          <p:nvPr>
+            <p:ph idx="1"/>
+          </p:nvPr>
+        </p:nvPicPr>
+        <p:blipFill>
+          <a:blip r:embed="rId2">
+            <a:extLst>
+              <a:ext uri="{28A0092B-C50C-407E-A947-70E740481C1C}">
+                <a14:useLocalDpi xmlns:a14="http://schemas.microsoft.com/office/drawing/2010/main" val="0"/>
+              </a:ext>
+            </a:extLst>
+          </a:blip>
+          <a:stretch>
+            <a:fillRect/>
+          </a:stretch>
+        </p:blipFill>
+        <p:spPr>
+          <a:xfrm>
+            <a:off x="457200" y="1700808"/>
+            <a:ext cx="8229600" cy="4176464"/>
+          </a:xfrm>
+        </p:spPr>
+      </p:pic>
+    </p:spTree>
+    <p:extLst>
+      <p:ext uri="{BB962C8B-B14F-4D97-AF65-F5344CB8AC3E}">
+        <p14:creationId xmlns:p14="http://schemas.microsoft.com/office/powerpoint/2010/main" val="2116554849"/>
+      </p:ext>
+    </p:extLst>
+  </p:cSld>
+  <p:clrMapOvr>
+    <a:masterClrMapping/>
+  </p:clrMapOvr>
+  <mc:AlternateContent xmlns:mc="http://schemas.openxmlformats.org/markup-compatibility/2006">
+    <mc:Choice xmlns:p14="http://schemas.microsoft.com/office/powerpoint/2010/main" Requires="p14">
+      <p:transition p14:dur="0"/>
+    </mc:Choice>
+    <mc:Fallback>
+      <p:transition/>
+    </mc:Fallback>
+  </mc:AlternateContent>
+  <p:timing>
+    <p:tnLst>
+      <p:par>
+        <p:cTn id="1" dur="indefinite" restart="never" nodeType="tmRoot"/>
+      </p:par>
+    </p:tnLst>
   </p:timing>
 </p:sld>
 </file>

</xml_diff>

<commit_message>
Atualização dos slide da apresentação (data e titulo do rodapé)
</commit_message>
<xml_diff>
--- a/documentacao/G5_Apresentacao1sem2014.pptx
+++ b/documentacao/G5_Apresentacao1sem2014.pptx
@@ -155,7 +155,7 @@
   </p:defaultTextStyle>
   <p:extLst>
     <p:ext uri="{EFAFB233-063F-42B5-8137-9DF3F51BA10A}">
-      <p15:sldGuideLst xmlns:p15="http://schemas.microsoft.com/office/powerpoint/2012/main">
+      <p15:sldGuideLst xmlns:p15="http://schemas.microsoft.com/office/powerpoint/2012/main" xmlns="">
         <p15:guide id="1" orient="horz" pos="2160">
           <p15:clr>
             <a:srgbClr val="A4A3A4"/>
@@ -169,7 +169,7 @@
       </p15:sldGuideLst>
     </p:ext>
     <p:ext uri="{2D200454-40CA-4A62-9FC3-DE9A4176ACB9}">
-      <p15:notesGuideLst xmlns:p15="http://schemas.microsoft.com/office/powerpoint/2012/main">
+      <p15:notesGuideLst xmlns:p15="http://schemas.microsoft.com/office/powerpoint/2012/main" xmlns="">
         <p15:guide id="1" orient="horz" pos="2928">
           <p15:clr>
             <a:srgbClr val="A4A3A4"/>
@@ -269,7 +269,7 @@
             <a:fld id="{387DC7E4-63C1-42C9-AC56-2D8DD4349572}" type="datetimeFigureOut">
               <a:rPr lang="pt-BR" smtClean="0"/>
               <a:pPr/>
-              <a:t>22/05/2014</a:t>
+              <a:t>23/05/2014</a:t>
             </a:fld>
             <a:endParaRPr lang="pt-BR"/>
           </a:p>
@@ -345,7 +345,7 @@
     </p:spTree>
     <p:extLst>
       <p:ext uri="{BB962C8B-B14F-4D97-AF65-F5344CB8AC3E}">
-        <p14:creationId xmlns:p14="http://schemas.microsoft.com/office/powerpoint/2010/main" val="3690707936"/>
+        <p14:creationId xmlns:p14="http://schemas.microsoft.com/office/powerpoint/2010/main" xmlns="" val="3690707936"/>
       </p:ext>
     </p:extLst>
   </p:cSld>
@@ -659,7 +659,7 @@
     </p:spTree>
     <p:extLst>
       <p:ext uri="{BB962C8B-B14F-4D97-AF65-F5344CB8AC3E}">
-        <p14:creationId xmlns:p14="http://schemas.microsoft.com/office/powerpoint/2010/main" val="753547333"/>
+        <p14:creationId xmlns:p14="http://schemas.microsoft.com/office/powerpoint/2010/main" xmlns="" val="753547333"/>
       </p:ext>
     </p:extLst>
   </p:cSld>
@@ -868,7 +868,7 @@
     </p:spTree>
     <p:extLst>
       <p:ext uri="{BB962C8B-B14F-4D97-AF65-F5344CB8AC3E}">
-        <p14:creationId xmlns:p14="http://schemas.microsoft.com/office/powerpoint/2010/main" val="3859550129"/>
+        <p14:creationId xmlns:p14="http://schemas.microsoft.com/office/powerpoint/2010/main" xmlns="" val="3859550129"/>
       </p:ext>
     </p:extLst>
   </p:cSld>
@@ -5072,9 +5072,10 @@
           <a:lstStyle/>
           <a:p>
             <a:r>
-              <a:rPr lang="pt-BR" dirty="0"/>
-              <a:t>17/05/2014</a:t>
-            </a:r>
+              <a:rPr lang="pt-BR" dirty="0" smtClean="0"/>
+              <a:t>10/06/2014</a:t>
+            </a:r>
+            <a:endParaRPr lang="pt-BR" dirty="0"/>
           </a:p>
         </p:txBody>
       </p:sp>
@@ -5118,16 +5119,12 @@
           <a:lstStyle/>
           <a:p>
             <a:r>
-              <a:rPr lang="pt-BR" dirty="0" err="1"/>
+              <a:rPr lang="pt-BR" dirty="0" err="1" smtClean="0"/>
               <a:t>Metrocamp</a:t>
             </a:r>
             <a:r>
-              <a:rPr lang="pt-BR" dirty="0"/>
-              <a:t> </a:t>
-            </a:r>
-            <a:r>
               <a:rPr lang="pt-BR" dirty="0" smtClean="0"/>
-              <a:t>Faculdades TCM/3ADS</a:t>
+              <a:t>  Faculdades TCM/3ADS</a:t>
             </a:r>
             <a:endParaRPr lang="pt-BR" dirty="0"/>
           </a:p>
@@ -5138,11 +5135,11 @@
   <p:clrMapOvr>
     <a:masterClrMapping/>
   </p:clrMapOvr>
-  <mc:AlternateContent xmlns:mc="http://schemas.openxmlformats.org/markup-compatibility/2006" xmlns:p14="http://schemas.microsoft.com/office/powerpoint/2010/main">
-    <mc:Choice Requires="p14">
+  <mc:AlternateContent xmlns:mc="http://schemas.openxmlformats.org/markup-compatibility/2006">
+    <mc:Choice xmlns:p14="http://schemas.microsoft.com/office/powerpoint/2010/main" xmlns="" Requires="p14">
       <p:transition p14:dur="0"/>
     </mc:Choice>
-    <mc:Fallback xmlns="">
+    <mc:Fallback>
       <p:transition/>
     </mc:Fallback>
   </mc:AlternateContent>
@@ -5229,7 +5226,7 @@
           <a:blip r:embed="rId2">
             <a:extLst>
               <a:ext uri="{28A0092B-C50C-407E-A947-70E740481C1C}">
-                <a14:useLocalDpi xmlns:a14="http://schemas.microsoft.com/office/drawing/2010/main" val="0"/>
+                <a14:useLocalDpi xmlns:a14="http://schemas.microsoft.com/office/drawing/2010/main" xmlns="" val="0"/>
               </a:ext>
             </a:extLst>
           </a:blip>
@@ -5282,8 +5279,12 @@
           <a:lstStyle/>
           <a:p>
             <a:r>
-              <a:rPr lang="pt-BR" smtClean="0"/>
-              <a:t>Veris Faculdades TCM/3ADS</a:t>
+              <a:rPr lang="pt-BR" dirty="0" err="1" smtClean="0"/>
+              <a:t>Metrocamp</a:t>
+            </a:r>
+            <a:r>
+              <a:rPr lang="pt-BR" dirty="0" smtClean="0"/>
+              <a:t>  Faculdades TCM/3ADS</a:t>
             </a:r>
             <a:endParaRPr lang="pt-BR" dirty="0"/>
           </a:p>
@@ -5316,18 +5317,18 @@
     </p:spTree>
     <p:extLst>
       <p:ext uri="{BB962C8B-B14F-4D97-AF65-F5344CB8AC3E}">
-        <p14:creationId xmlns:p14="http://schemas.microsoft.com/office/powerpoint/2010/main" val="3208232615"/>
+        <p14:creationId xmlns:p14="http://schemas.microsoft.com/office/powerpoint/2010/main" xmlns="" val="3208232615"/>
       </p:ext>
     </p:extLst>
   </p:cSld>
   <p:clrMapOvr>
     <a:masterClrMapping/>
   </p:clrMapOvr>
-  <mc:AlternateContent xmlns:mc="http://schemas.openxmlformats.org/markup-compatibility/2006" xmlns:p14="http://schemas.microsoft.com/office/powerpoint/2010/main">
-    <mc:Choice Requires="p14">
+  <mc:AlternateContent xmlns:mc="http://schemas.openxmlformats.org/markup-compatibility/2006">
+    <mc:Choice xmlns:p14="http://schemas.microsoft.com/office/powerpoint/2010/main" xmlns="" Requires="p14">
       <p:transition p14:dur="0"/>
     </mc:Choice>
-    <mc:Fallback xmlns="">
+    <mc:Fallback>
       <p:transition/>
     </mc:Fallback>
   </mc:AlternateContent>
@@ -5418,7 +5419,7 @@
           <a:blip r:embed="rId2">
             <a:extLst>
               <a:ext uri="{28A0092B-C50C-407E-A947-70E740481C1C}">
-                <a14:useLocalDpi xmlns:a14="http://schemas.microsoft.com/office/drawing/2010/main" val="0"/>
+                <a14:useLocalDpi xmlns:a14="http://schemas.microsoft.com/office/drawing/2010/main" xmlns="" val="0"/>
               </a:ext>
             </a:extLst>
           </a:blip>
@@ -5471,8 +5472,12 @@
           <a:lstStyle/>
           <a:p>
             <a:r>
-              <a:rPr lang="pt-BR" smtClean="0"/>
-              <a:t>Veris Faculdades TCM/3ADS</a:t>
+              <a:rPr lang="pt-BR" dirty="0" err="1" smtClean="0"/>
+              <a:t>Metrocamp</a:t>
+            </a:r>
+            <a:r>
+              <a:rPr lang="pt-BR" dirty="0" smtClean="0"/>
+              <a:t>  Faculdades TCM/3ADS</a:t>
             </a:r>
             <a:endParaRPr lang="pt-BR" dirty="0"/>
           </a:p>
@@ -5505,18 +5510,18 @@
     </p:spTree>
     <p:extLst>
       <p:ext uri="{BB962C8B-B14F-4D97-AF65-F5344CB8AC3E}">
-        <p14:creationId xmlns:p14="http://schemas.microsoft.com/office/powerpoint/2010/main" val="3652049513"/>
+        <p14:creationId xmlns:p14="http://schemas.microsoft.com/office/powerpoint/2010/main" xmlns="" val="3652049513"/>
       </p:ext>
     </p:extLst>
   </p:cSld>
   <p:clrMapOvr>
     <a:masterClrMapping/>
   </p:clrMapOvr>
-  <mc:AlternateContent xmlns:mc="http://schemas.openxmlformats.org/markup-compatibility/2006" xmlns:p14="http://schemas.microsoft.com/office/powerpoint/2010/main">
-    <mc:Choice Requires="p14">
+  <mc:AlternateContent xmlns:mc="http://schemas.openxmlformats.org/markup-compatibility/2006">
+    <mc:Choice xmlns:p14="http://schemas.microsoft.com/office/powerpoint/2010/main" xmlns="" Requires="p14">
       <p:transition p14:dur="0"/>
     </mc:Choice>
-    <mc:Fallback xmlns="">
+    <mc:Fallback>
       <p:transition/>
     </mc:Fallback>
   </mc:AlternateContent>
@@ -5602,7 +5607,7 @@
           <a:blip r:embed="rId2">
             <a:extLst>
               <a:ext uri="{28A0092B-C50C-407E-A947-70E740481C1C}">
-                <a14:useLocalDpi xmlns:a14="http://schemas.microsoft.com/office/drawing/2010/main" val="0"/>
+                <a14:useLocalDpi xmlns:a14="http://schemas.microsoft.com/office/drawing/2010/main" xmlns="" val="0"/>
               </a:ext>
             </a:extLst>
           </a:blip>
@@ -5650,8 +5655,12 @@
           <a:lstStyle/>
           <a:p>
             <a:r>
-              <a:rPr lang="pt-BR" smtClean="0"/>
-              <a:t>Veris Faculdades TCM/3ADS</a:t>
+              <a:rPr lang="pt-BR" dirty="0" err="1" smtClean="0"/>
+              <a:t>Metrocamp</a:t>
+            </a:r>
+            <a:r>
+              <a:rPr lang="pt-BR" dirty="0" smtClean="0"/>
+              <a:t>  Faculdades TCM/3ADS</a:t>
             </a:r>
             <a:endParaRPr lang="pt-BR" dirty="0"/>
           </a:p>
@@ -5684,18 +5693,18 @@
     </p:spTree>
     <p:extLst>
       <p:ext uri="{BB962C8B-B14F-4D97-AF65-F5344CB8AC3E}">
-        <p14:creationId xmlns:p14="http://schemas.microsoft.com/office/powerpoint/2010/main" val="3789702249"/>
+        <p14:creationId xmlns:p14="http://schemas.microsoft.com/office/powerpoint/2010/main" xmlns="" val="3789702249"/>
       </p:ext>
     </p:extLst>
   </p:cSld>
   <p:clrMapOvr>
     <a:masterClrMapping/>
   </p:clrMapOvr>
-  <mc:AlternateContent xmlns:mc="http://schemas.openxmlformats.org/markup-compatibility/2006" xmlns:p14="http://schemas.microsoft.com/office/powerpoint/2010/main">
-    <mc:Choice Requires="p14">
+  <mc:AlternateContent xmlns:mc="http://schemas.openxmlformats.org/markup-compatibility/2006">
+    <mc:Choice xmlns:p14="http://schemas.microsoft.com/office/powerpoint/2010/main" xmlns="" Requires="p14">
       <p:transition p14:dur="0"/>
     </mc:Choice>
-    <mc:Fallback xmlns="">
+    <mc:Fallback>
       <p:transition/>
     </mc:Fallback>
   </mc:AlternateContent>
@@ -5786,7 +5795,7 @@
           <a:blip r:embed="rId2">
             <a:extLst>
               <a:ext uri="{28A0092B-C50C-407E-A947-70E740481C1C}">
-                <a14:useLocalDpi xmlns:a14="http://schemas.microsoft.com/office/drawing/2010/main" val="0"/>
+                <a14:useLocalDpi xmlns:a14="http://schemas.microsoft.com/office/drawing/2010/main" xmlns="" val="0"/>
               </a:ext>
             </a:extLst>
           </a:blip>
@@ -5839,8 +5848,12 @@
           <a:lstStyle/>
           <a:p>
             <a:r>
-              <a:rPr lang="pt-BR" smtClean="0"/>
-              <a:t>Veris Faculdades TCM/3ADS</a:t>
+              <a:rPr lang="pt-BR" dirty="0" err="1" smtClean="0"/>
+              <a:t>Metrocamp</a:t>
+            </a:r>
+            <a:r>
+              <a:rPr lang="pt-BR" dirty="0" smtClean="0"/>
+              <a:t>  Faculdades TCM/3ADS</a:t>
             </a:r>
             <a:endParaRPr lang="pt-BR" dirty="0"/>
           </a:p>
@@ -5873,18 +5886,18 @@
     </p:spTree>
     <p:extLst>
       <p:ext uri="{BB962C8B-B14F-4D97-AF65-F5344CB8AC3E}">
-        <p14:creationId xmlns:p14="http://schemas.microsoft.com/office/powerpoint/2010/main" val="1492974733"/>
+        <p14:creationId xmlns:p14="http://schemas.microsoft.com/office/powerpoint/2010/main" xmlns="" val="1492974733"/>
       </p:ext>
     </p:extLst>
   </p:cSld>
   <p:clrMapOvr>
     <a:masterClrMapping/>
   </p:clrMapOvr>
-  <mc:AlternateContent xmlns:mc="http://schemas.openxmlformats.org/markup-compatibility/2006" xmlns:p14="http://schemas.microsoft.com/office/powerpoint/2010/main">
-    <mc:Choice Requires="p14">
+  <mc:AlternateContent xmlns:mc="http://schemas.openxmlformats.org/markup-compatibility/2006">
+    <mc:Choice xmlns:p14="http://schemas.microsoft.com/office/powerpoint/2010/main" xmlns="" Requires="p14">
       <p:transition p14:dur="0"/>
     </mc:Choice>
-    <mc:Fallback xmlns="">
+    <mc:Fallback>
       <p:transition/>
     </mc:Fallback>
   </mc:AlternateContent>
@@ -6068,99 +6081,20 @@
   <p:clrMapOvr>
     <a:masterClrMapping/>
   </p:clrMapOvr>
-  <mc:AlternateContent xmlns:mc="http://schemas.openxmlformats.org/markup-compatibility/2006" xmlns:p14="http://schemas.microsoft.com/office/powerpoint/2010/main">
-    <mc:Choice Requires="p14">
+  <mc:AlternateContent xmlns:mc="http://schemas.openxmlformats.org/markup-compatibility/2006">
+    <mc:Choice xmlns:p14="http://schemas.microsoft.com/office/powerpoint/2010/main" xmlns="" Requires="p14">
       <p:transition p14:dur="0"/>
     </mc:Choice>
-    <mc:Fallback xmlns="">
+    <mc:Fallback>
       <p:transition/>
     </mc:Fallback>
   </mc:AlternateContent>
   <p:timing>
     <p:tnLst>
       <p:par>
-        <p:cTn id="1" dur="indefinite" restart="never" nodeType="tmRoot">
-          <p:childTnLst>
-            <p:seq concurrent="1" nextAc="seek">
-              <p:cTn id="2" dur="indefinite" nodeType="mainSeq">
-                <p:childTnLst>
-                  <p:par>
-                    <p:cTn id="3" fill="hold">
-                      <p:stCondLst>
-                        <p:cond delay="indefinite"/>
-                      </p:stCondLst>
-                      <p:childTnLst>
-                        <p:par>
-                          <p:cTn id="4" fill="hold">
-                            <p:stCondLst>
-                              <p:cond delay="0"/>
-                            </p:stCondLst>
-                            <p:childTnLst>
-                              <p:par>
-                                <p:cTn id="5" presetID="21" presetClass="exit" presetSubtype="4" fill="hold" grpId="0" nodeType="clickEffect">
-                                  <p:stCondLst>
-                                    <p:cond delay="0"/>
-                                  </p:stCondLst>
-                                  <p:childTnLst>
-                                    <p:animEffect transition="out" filter="wheel(4)">
-                                      <p:cBhvr>
-                                        <p:cTn id="6" dur="2000"/>
-                                        <p:tgtEl>
-                                          <p:spTgt spid="19458"/>
-                                        </p:tgtEl>
-                                      </p:cBhvr>
-                                    </p:animEffect>
-                                    <p:set>
-                                      <p:cBhvr>
-                                        <p:cTn id="7" dur="1" fill="hold">
-                                          <p:stCondLst>
-                                            <p:cond delay="1999"/>
-                                          </p:stCondLst>
-                                        </p:cTn>
-                                        <p:tgtEl>
-                                          <p:spTgt spid="19458"/>
-                                        </p:tgtEl>
-                                        <p:attrNameLst>
-                                          <p:attrName>style.visibility</p:attrName>
-                                        </p:attrNameLst>
-                                      </p:cBhvr>
-                                      <p:to>
-                                        <p:strVal val="hidden"/>
-                                      </p:to>
-                                    </p:set>
-                                  </p:childTnLst>
-                                </p:cTn>
-                              </p:par>
-                            </p:childTnLst>
-                          </p:cTn>
-                        </p:par>
-                      </p:childTnLst>
-                    </p:cTn>
-                  </p:par>
-                </p:childTnLst>
-              </p:cTn>
-              <p:prevCondLst>
-                <p:cond evt="onPrev" delay="0">
-                  <p:tgtEl>
-                    <p:sldTgt/>
-                  </p:tgtEl>
-                </p:cond>
-              </p:prevCondLst>
-              <p:nextCondLst>
-                <p:cond evt="onNext" delay="0">
-                  <p:tgtEl>
-                    <p:sldTgt/>
-                  </p:tgtEl>
-                </p:cond>
-              </p:nextCondLst>
-            </p:seq>
-          </p:childTnLst>
-        </p:cTn>
+        <p:cTn id="1" dur="indefinite" restart="never" nodeType="tmRoot"/>
       </p:par>
     </p:tnLst>
-    <p:bldLst>
-      <p:bldP spid="19458" grpId="0"/>
-    </p:bldLst>
   </p:timing>
 </p:sld>
 </file>
@@ -6330,16 +6264,12 @@
           <a:lstStyle/>
           <a:p>
             <a:r>
-              <a:rPr lang="pt-BR" dirty="0" err="1"/>
+              <a:rPr lang="pt-BR" dirty="0" err="1" smtClean="0"/>
               <a:t>Metrocamp</a:t>
             </a:r>
             <a:r>
-              <a:rPr lang="pt-BR" dirty="0"/>
-              <a:t> </a:t>
-            </a:r>
-            <a:r>
               <a:rPr lang="pt-BR" dirty="0" smtClean="0"/>
-              <a:t>Faculdades TCM/3ADS</a:t>
+              <a:t>  Faculdades TCM/3ADS</a:t>
             </a:r>
             <a:endParaRPr lang="pt-BR" dirty="0"/>
           </a:p>
@@ -6350,11 +6280,11 @@
   <p:clrMapOvr>
     <a:masterClrMapping/>
   </p:clrMapOvr>
-  <mc:AlternateContent xmlns:mc="http://schemas.openxmlformats.org/markup-compatibility/2006" xmlns:p14="http://schemas.microsoft.com/office/powerpoint/2010/main">
-    <mc:Choice Requires="p14">
+  <mc:AlternateContent xmlns:mc="http://schemas.openxmlformats.org/markup-compatibility/2006">
+    <mc:Choice xmlns:p14="http://schemas.microsoft.com/office/powerpoint/2010/main" xmlns="" Requires="p14">
       <p:transition p14:dur="0"/>
     </mc:Choice>
-    <mc:Fallback xmlns="">
+    <mc:Fallback>
       <p:transition/>
     </mc:Fallback>
   </mc:AlternateContent>
@@ -6529,7 +6459,7 @@
         </p:nvSpPr>
         <p:spPr>
           <a:xfrm>
-            <a:off x="3027227" y="6575941"/>
+            <a:off x="3000364" y="6400800"/>
             <a:ext cx="2895600" cy="457200"/>
           </a:xfrm>
         </p:spPr>
@@ -6585,7 +6515,7 @@
           <a:blip r:embed="rId2">
             <a:extLst>
               <a:ext uri="{28A0092B-C50C-407E-A947-70E740481C1C}">
-                <a14:useLocalDpi xmlns:a14="http://schemas.microsoft.com/office/drawing/2010/main" val="0"/>
+                <a14:useLocalDpi xmlns:a14="http://schemas.microsoft.com/office/drawing/2010/main" xmlns="" val="0"/>
               </a:ext>
             </a:extLst>
           </a:blip>
@@ -6608,11 +6538,11 @@
   <p:clrMapOvr>
     <a:masterClrMapping/>
   </p:clrMapOvr>
-  <mc:AlternateContent xmlns:mc="http://schemas.openxmlformats.org/markup-compatibility/2006" xmlns:p14="http://schemas.microsoft.com/office/powerpoint/2010/main">
-    <mc:Choice Requires="p14">
+  <mc:AlternateContent xmlns:mc="http://schemas.openxmlformats.org/markup-compatibility/2006">
+    <mc:Choice xmlns:p14="http://schemas.microsoft.com/office/powerpoint/2010/main" xmlns="" Requires="p14">
       <p:transition p14:dur="0"/>
     </mc:Choice>
-    <mc:Fallback xmlns="">
+    <mc:Fallback>
       <p:transition/>
     </mc:Fallback>
   </mc:AlternateContent>
@@ -6767,7 +6697,7 @@
           <a:blip r:embed="rId2">
             <a:extLst>
               <a:ext uri="{28A0092B-C50C-407E-A947-70E740481C1C}">
-                <a14:useLocalDpi xmlns:a14="http://schemas.microsoft.com/office/drawing/2010/main" val="0"/>
+                <a14:useLocalDpi xmlns:a14="http://schemas.microsoft.com/office/drawing/2010/main" xmlns="" val="0"/>
               </a:ext>
             </a:extLst>
           </a:blip>
@@ -6817,11 +6747,11 @@
   <p:clrMapOvr>
     <a:masterClrMapping/>
   </p:clrMapOvr>
-  <mc:AlternateContent xmlns:mc="http://schemas.openxmlformats.org/markup-compatibility/2006" xmlns:p14="http://schemas.microsoft.com/office/powerpoint/2010/main">
-    <mc:Choice Requires="p14">
+  <mc:AlternateContent xmlns:mc="http://schemas.openxmlformats.org/markup-compatibility/2006">
+    <mc:Choice xmlns:p14="http://schemas.microsoft.com/office/powerpoint/2010/main" xmlns="" Requires="p14">
       <p:transition p14:dur="0"/>
     </mc:Choice>
-    <mc:Fallback xmlns="">
+    <mc:Fallback>
       <p:transition/>
     </mc:Fallback>
   </mc:AlternateContent>
@@ -6973,7 +6903,7 @@
           <a:blip r:embed="rId2">
             <a:extLst>
               <a:ext uri="{28A0092B-C50C-407E-A947-70E740481C1C}">
-                <a14:useLocalDpi xmlns:a14="http://schemas.microsoft.com/office/drawing/2010/main" val="0"/>
+                <a14:useLocalDpi xmlns:a14="http://schemas.microsoft.com/office/drawing/2010/main" xmlns="" val="0"/>
               </a:ext>
             </a:extLst>
           </a:blip>
@@ -6997,7 +6927,7 @@
         <p:spPr>
           <a:xfrm>
             <a:off x="457200" y="1613594"/>
-            <a:ext cx="2095445" cy="646331"/>
+            <a:ext cx="1967205" cy="646331"/>
           </a:xfrm>
           <a:prstGeom prst="rect">
             <a:avLst/>
@@ -7012,13 +6942,18 @@
           <a:p>
             <a:r>
               <a:rPr lang="pt-BR" dirty="0" smtClean="0"/>
-              <a:t>Atores Professor e</a:t>
-            </a:r>
+              <a:t>Atores Professor </a:t>
+            </a:r>
+            <a:endParaRPr lang="pt-BR" dirty="0" smtClean="0"/>
           </a:p>
           <a:p>
             <a:r>
               <a:rPr lang="pt-BR" dirty="0" smtClean="0"/>
-              <a:t>Secretária</a:t>
+              <a:t>   e</a:t>
+            </a:r>
+            <a:r>
+              <a:rPr lang="pt-BR" dirty="0" smtClean="0"/>
+              <a:t> Secretária</a:t>
             </a:r>
             <a:endParaRPr lang="pt-BR" dirty="0"/>
           </a:p>
@@ -7029,11 +6964,11 @@
   <p:clrMapOvr>
     <a:masterClrMapping/>
   </p:clrMapOvr>
-  <mc:AlternateContent xmlns:mc="http://schemas.openxmlformats.org/markup-compatibility/2006" xmlns:p14="http://schemas.microsoft.com/office/powerpoint/2010/main">
-    <mc:Choice Requires="p14">
+  <mc:AlternateContent xmlns:mc="http://schemas.openxmlformats.org/markup-compatibility/2006">
+    <mc:Choice xmlns:p14="http://schemas.microsoft.com/office/powerpoint/2010/main" xmlns="" Requires="p14">
       <p:transition p14:dur="0"/>
     </mc:Choice>
-    <mc:Fallback xmlns="">
+    <mc:Fallback>
       <p:transition/>
     </mc:Fallback>
   </mc:AlternateContent>
@@ -7190,7 +7125,7 @@
           <a:blip r:embed="rId2">
             <a:extLst>
               <a:ext uri="{28A0092B-C50C-407E-A947-70E740481C1C}">
-                <a14:useLocalDpi xmlns:a14="http://schemas.microsoft.com/office/drawing/2010/main" val="0"/>
+                <a14:useLocalDpi xmlns:a14="http://schemas.microsoft.com/office/drawing/2010/main" xmlns="" val="0"/>
               </a:ext>
             </a:extLst>
           </a:blip>
@@ -7240,11 +7175,11 @@
   <p:clrMapOvr>
     <a:masterClrMapping/>
   </p:clrMapOvr>
-  <mc:AlternateContent xmlns:mc="http://schemas.openxmlformats.org/markup-compatibility/2006" xmlns:p14="http://schemas.microsoft.com/office/powerpoint/2010/main">
-    <mc:Choice Requires="p14">
+  <mc:AlternateContent xmlns:mc="http://schemas.openxmlformats.org/markup-compatibility/2006">
+    <mc:Choice xmlns:p14="http://schemas.microsoft.com/office/powerpoint/2010/main" xmlns="" Requires="p14">
       <p:transition p14:dur="0"/>
     </mc:Choice>
-    <mc:Fallback xmlns="">
+    <mc:Fallback>
       <p:transition/>
     </mc:Fallback>
   </mc:AlternateContent>
@@ -7382,7 +7317,7 @@
             <p:ph idx="1"/>
             <p:extLst>
               <p:ext uri="{D42A27DB-BD31-4B8C-83A1-F6EECF244321}">
-                <p14:modId xmlns:p14="http://schemas.microsoft.com/office/powerpoint/2010/main" val="173213281"/>
+                <p14:modId xmlns:p14="http://schemas.microsoft.com/office/powerpoint/2010/main" xmlns="" val="173213281"/>
               </p:ext>
             </p:extLst>
           </p:nvPr>
@@ -8839,11 +8774,11 @@
   <p:clrMapOvr>
     <a:masterClrMapping/>
   </p:clrMapOvr>
-  <mc:AlternateContent xmlns:mc="http://schemas.openxmlformats.org/markup-compatibility/2006" xmlns:p14="http://schemas.microsoft.com/office/powerpoint/2010/main">
-    <mc:Choice Requires="p14">
+  <mc:AlternateContent xmlns:mc="http://schemas.openxmlformats.org/markup-compatibility/2006">
+    <mc:Choice xmlns:p14="http://schemas.microsoft.com/office/powerpoint/2010/main" xmlns="" Requires="p14">
       <p:transition p14:dur="0"/>
     </mc:Choice>
-    <mc:Fallback xmlns="">
+    <mc:Fallback>
       <p:transition/>
     </mc:Fallback>
   </mc:AlternateContent>
@@ -8944,11 +8879,11 @@
           <a:p>
             <a:r>
               <a:rPr lang="pt-BR" dirty="0" err="1" smtClean="0"/>
-              <a:t>Veris</a:t>
+              <a:t>Metrocamp</a:t>
             </a:r>
             <a:r>
               <a:rPr lang="pt-BR" dirty="0" smtClean="0"/>
-              <a:t> Faculdades TCM/3ADS</a:t>
+              <a:t>  Faculdades TCM/3ADS</a:t>
             </a:r>
             <a:endParaRPr lang="pt-BR" dirty="0"/>
           </a:p>
@@ -8992,7 +8927,7 @@
           <a:blip r:embed="rId2">
             <a:extLst>
               <a:ext uri="{28A0092B-C50C-407E-A947-70E740481C1C}">
-                <a14:useLocalDpi xmlns:a14="http://schemas.microsoft.com/office/drawing/2010/main" val="0"/>
+                <a14:useLocalDpi xmlns:a14="http://schemas.microsoft.com/office/drawing/2010/main" xmlns="" val="0"/>
               </a:ext>
             </a:extLst>
           </a:blip>
@@ -9002,7 +8937,7 @@
         </p:blipFill>
         <p:spPr>
           <a:xfrm>
-            <a:off x="457199" y="1772816"/>
+            <a:off x="457199" y="1826015"/>
             <a:ext cx="8418805" cy="3960439"/>
           </a:xfrm>
         </p:spPr>
@@ -9010,18 +8945,18 @@
     </p:spTree>
     <p:extLst>
       <p:ext uri="{BB962C8B-B14F-4D97-AF65-F5344CB8AC3E}">
-        <p14:creationId xmlns:p14="http://schemas.microsoft.com/office/powerpoint/2010/main" val="658966904"/>
+        <p14:creationId xmlns:p14="http://schemas.microsoft.com/office/powerpoint/2010/main" xmlns="" val="658966904"/>
       </p:ext>
     </p:extLst>
   </p:cSld>
   <p:clrMapOvr>
     <a:masterClrMapping/>
   </p:clrMapOvr>
-  <mc:AlternateContent xmlns:mc="http://schemas.openxmlformats.org/markup-compatibility/2006" xmlns:p14="http://schemas.microsoft.com/office/powerpoint/2010/main">
-    <mc:Choice Requires="p14">
+  <mc:AlternateContent xmlns:mc="http://schemas.openxmlformats.org/markup-compatibility/2006">
+    <mc:Choice xmlns:p14="http://schemas.microsoft.com/office/powerpoint/2010/main" xmlns="" Requires="p14">
       <p:transition p14:dur="0"/>
     </mc:Choice>
-    <mc:Fallback xmlns="">
+    <mc:Fallback>
       <p:transition/>
     </mc:Fallback>
   </mc:AlternateContent>
@@ -9133,8 +9068,12 @@
           <a:lstStyle/>
           <a:p>
             <a:r>
-              <a:rPr lang="pt-BR" smtClean="0"/>
-              <a:t>Veris Faculdades TCM/3ADS</a:t>
+              <a:rPr lang="pt-BR" dirty="0" err="1" smtClean="0"/>
+              <a:t>Metrocamp</a:t>
+            </a:r>
+            <a:r>
+              <a:rPr lang="pt-BR" dirty="0" smtClean="0"/>
+              <a:t>  Faculdades TCM/3ADS</a:t>
             </a:r>
             <a:endParaRPr lang="pt-BR" dirty="0"/>
           </a:p>
@@ -9178,7 +9117,7 @@
           <a:blip r:embed="rId2">
             <a:extLst>
               <a:ext uri="{28A0092B-C50C-407E-A947-70E740481C1C}">
-                <a14:useLocalDpi xmlns:a14="http://schemas.microsoft.com/office/drawing/2010/main" val="0"/>
+                <a14:useLocalDpi xmlns:a14="http://schemas.microsoft.com/office/drawing/2010/main" xmlns="" val="0"/>
               </a:ext>
             </a:extLst>
           </a:blip>
@@ -9196,18 +9135,18 @@
     </p:spTree>
     <p:extLst>
       <p:ext uri="{BB962C8B-B14F-4D97-AF65-F5344CB8AC3E}">
-        <p14:creationId xmlns:p14="http://schemas.microsoft.com/office/powerpoint/2010/main" val="2116554849"/>
+        <p14:creationId xmlns:p14="http://schemas.microsoft.com/office/powerpoint/2010/main" xmlns="" val="2116554849"/>
       </p:ext>
     </p:extLst>
   </p:cSld>
   <p:clrMapOvr>
     <a:masterClrMapping/>
   </p:clrMapOvr>
-  <mc:AlternateContent xmlns:mc="http://schemas.openxmlformats.org/markup-compatibility/2006" xmlns:p14="http://schemas.microsoft.com/office/powerpoint/2010/main">
-    <mc:Choice Requires="p14">
+  <mc:AlternateContent xmlns:mc="http://schemas.openxmlformats.org/markup-compatibility/2006">
+    <mc:Choice xmlns:p14="http://schemas.microsoft.com/office/powerpoint/2010/main" xmlns="" Requires="p14">
       <p:transition p14:dur="0"/>
     </mc:Choice>
-    <mc:Fallback xmlns="">
+    <mc:Fallback>
       <p:transition/>
     </mc:Fallback>
   </mc:AlternateContent>

</xml_diff>